<commit_message>
=Checkpoint, before trying self-attention architecture for senses
Former-commit-id: e3df48e876804c51e4d97ae33fa0e77d1ae35d19 [formerly 2e0c3b48c8c1d640b41fc67e4a5b1cc8827bef60]
Former-commit-id: bbdb2185027337932964f33ac87c238d9a1f5301
Former-commit-id: 68776d7d0cc7fa443b55391970405393d65a7f2a
</commit_message>
<xml_diff>
--- a/Media/SenseArchitecture.pptx
+++ b/Media/SenseArchitecture.pptx
@@ -7,7 +7,8 @@
   <p:sldIdLst>
     <p:sldId id="257" r:id="rId2"/>
     <p:sldId id="258" r:id="rId3"/>
-    <p:sldId id="259" r:id="rId4"/>
+    <p:sldId id="260" r:id="rId4"/>
+    <p:sldId id="259" r:id="rId5"/>
   </p:sldIdLst>
   <p:sldSz cx="12192000" cy="13716000"/>
   <p:notesSz cx="6858000" cy="9144000"/>
@@ -244,7 +245,7 @@
           <a:lstStyle/>
           <a:p>
             <a:fld id="{803220A4-8895-6D46-A558-2CE2469121C7}" type="datetimeFigureOut">
-              <a:t>4/5/20</a:t>
+              <a:t>4/12/20</a:t>
             </a:fld>
             <a:endParaRPr lang="en-US"/>
           </a:p>
@@ -413,7 +414,7 @@
           <a:lstStyle/>
           <a:p>
             <a:fld id="{803220A4-8895-6D46-A558-2CE2469121C7}" type="datetimeFigureOut">
-              <a:t>4/5/20</a:t>
+              <a:t>4/12/20</a:t>
             </a:fld>
             <a:endParaRPr lang="en-US"/>
           </a:p>
@@ -592,7 +593,7 @@
           <a:lstStyle/>
           <a:p>
             <a:fld id="{803220A4-8895-6D46-A558-2CE2469121C7}" type="datetimeFigureOut">
-              <a:t>4/5/20</a:t>
+              <a:t>4/12/20</a:t>
             </a:fld>
             <a:endParaRPr lang="en-US"/>
           </a:p>
@@ -761,7 +762,7 @@
           <a:lstStyle/>
           <a:p>
             <a:fld id="{803220A4-8895-6D46-A558-2CE2469121C7}" type="datetimeFigureOut">
-              <a:t>4/5/20</a:t>
+              <a:t>4/12/20</a:t>
             </a:fld>
             <a:endParaRPr lang="en-US"/>
           </a:p>
@@ -1004,7 +1005,7 @@
           <a:lstStyle/>
           <a:p>
             <a:fld id="{803220A4-8895-6D46-A558-2CE2469121C7}" type="datetimeFigureOut">
-              <a:t>4/5/20</a:t>
+              <a:t>4/12/20</a:t>
             </a:fld>
             <a:endParaRPr lang="en-US"/>
           </a:p>
@@ -1235,7 +1236,7 @@
           <a:lstStyle/>
           <a:p>
             <a:fld id="{803220A4-8895-6D46-A558-2CE2469121C7}" type="datetimeFigureOut">
-              <a:t>4/5/20</a:t>
+              <a:t>4/12/20</a:t>
             </a:fld>
             <a:endParaRPr lang="en-US"/>
           </a:p>
@@ -1601,7 +1602,7 @@
           <a:lstStyle/>
           <a:p>
             <a:fld id="{803220A4-8895-6D46-A558-2CE2469121C7}" type="datetimeFigureOut">
-              <a:t>4/5/20</a:t>
+              <a:t>4/12/20</a:t>
             </a:fld>
             <a:endParaRPr lang="en-US"/>
           </a:p>
@@ -1718,7 +1719,7 @@
           <a:lstStyle/>
           <a:p>
             <a:fld id="{803220A4-8895-6D46-A558-2CE2469121C7}" type="datetimeFigureOut">
-              <a:t>4/5/20</a:t>
+              <a:t>4/12/20</a:t>
             </a:fld>
             <a:endParaRPr lang="en-US"/>
           </a:p>
@@ -1812,7 +1813,7 @@
           <a:lstStyle/>
           <a:p>
             <a:fld id="{803220A4-8895-6D46-A558-2CE2469121C7}" type="datetimeFigureOut">
-              <a:t>4/5/20</a:t>
+              <a:t>4/12/20</a:t>
             </a:fld>
             <a:endParaRPr lang="en-US"/>
           </a:p>
@@ -2088,7 +2089,7 @@
           <a:lstStyle/>
           <a:p>
             <a:fld id="{803220A4-8895-6D46-A558-2CE2469121C7}" type="datetimeFigureOut">
-              <a:t>4/5/20</a:t>
+              <a:t>4/12/20</a:t>
             </a:fld>
             <a:endParaRPr lang="en-US"/>
           </a:p>
@@ -2344,7 +2345,7 @@
           <a:lstStyle/>
           <a:p>
             <a:fld id="{803220A4-8895-6D46-A558-2CE2469121C7}" type="datetimeFigureOut">
-              <a:t>4/5/20</a:t>
+              <a:t>4/12/20</a:t>
             </a:fld>
             <a:endParaRPr lang="en-US"/>
           </a:p>
@@ -2556,7 +2557,7 @@
           </a:lstStyle>
           <a:p>
             <a:fld id="{803220A4-8895-6D46-A558-2CE2469121C7}" type="datetimeFigureOut">
-              <a:t>4/5/20</a:t>
+              <a:t>4/12/20</a:t>
             </a:fld>
             <a:endParaRPr lang="en-US"/>
           </a:p>
@@ -5859,7 +5860,7 @@
         <p:spPr>
           <a:xfrm>
             <a:off x="4297976" y="6022004"/>
-            <a:ext cx="2423155" cy="835996"/>
+            <a:ext cx="2423155" cy="756806"/>
           </a:xfrm>
           <a:prstGeom prst="diamond">
             <a:avLst/>
@@ -5888,14 +5889,7 @@
             <a:pPr algn="ctr"/>
             <a:r>
               <a:rPr lang="en-US"/>
-              <a:t>2-layers</a:t>
-            </a:r>
-            <a:br>
-              <a:rPr lang="en-US"/>
-            </a:br>
-            <a:r>
-              <a:rPr lang="en-US"/>
-              <a:t>GRU</a:t>
+              <a:t>Layer 1 of GRU</a:t>
             </a:r>
           </a:p>
         </p:txBody>
@@ -5914,8 +5908,8 @@
         </p:nvSpPr>
         <p:spPr>
           <a:xfrm>
-            <a:off x="4289485" y="7175531"/>
-            <a:ext cx="1987475" cy="530651"/>
+            <a:off x="4486259" y="6795142"/>
+            <a:ext cx="1987475" cy="299327"/>
           </a:xfrm>
           <a:prstGeom prst="rect">
             <a:avLst/>
@@ -5954,28 +5948,8 @@
                   <a:schemeClr val="tx1"/>
                 </a:solidFill>
               </a:rPr>
-              <a:t>Encoding </a:t>
-            </a:r>
-            <a:br>
-              <a:rPr lang="en-US" sz="1600">
-                <a:solidFill>
-                  <a:schemeClr val="tx1"/>
-                </a:solidFill>
-              </a:rPr>
-            </a:br>
-            <a:r>
-              <a:rPr lang="en-US" sz="1600">
-                <a:solidFill>
-                  <a:schemeClr val="tx1"/>
-                </a:solidFill>
-              </a:rPr>
-              <a:t>(Hidden state 2)</a:t>
-            </a:r>
-            <a:endParaRPr lang="en-US" sz="1600" b="1">
-              <a:solidFill>
-                <a:schemeClr val="tx1"/>
-              </a:solidFill>
-            </a:endParaRPr>
+              <a:t>Hidden state 1</a:t>
+            </a:r>
           </a:p>
         </p:txBody>
       </p:sp>
@@ -5993,7 +5967,7 @@
         </p:nvSpPr>
         <p:spPr>
           <a:xfrm>
-            <a:off x="4071644" y="8151229"/>
+            <a:off x="4297362" y="9021377"/>
             <a:ext cx="2423155" cy="835996"/>
           </a:xfrm>
           <a:prstGeom prst="diamond">
@@ -6050,7 +6024,7 @@
         </p:nvSpPr>
         <p:spPr>
           <a:xfrm>
-            <a:off x="4313750" y="9448428"/>
+            <a:off x="4539468" y="10318576"/>
             <a:ext cx="1987475" cy="530651"/>
           </a:xfrm>
           <a:prstGeom prst="rect">
@@ -6109,7 +6083,7 @@
         </p:nvSpPr>
         <p:spPr>
           <a:xfrm>
-            <a:off x="4907043" y="10404000"/>
+            <a:off x="5132761" y="11274148"/>
             <a:ext cx="752354" cy="755561"/>
           </a:xfrm>
           <a:prstGeom prst="ellipse">
@@ -6142,48 +6116,6 @@
           </a:p>
         </p:txBody>
       </p:sp>
-      <p:cxnSp>
-        <p:nvCxnSpPr>
-          <p:cNvPr id="91" name="Straight Arrow Connector 90">
-            <a:extLst>
-              <a:ext uri="{FF2B5EF4-FFF2-40B4-BE49-F238E27FC236}">
-                <a16:creationId xmlns:a16="http://schemas.microsoft.com/office/drawing/2014/main" id="{9544C424-A1A3-2D40-9806-8B36B62ECA49}"/>
-              </a:ext>
-            </a:extLst>
-          </p:cNvPr>
-          <p:cNvCxnSpPr>
-            <a:cxnSpLocks/>
-            <a:endCxn id="86" idx="0"/>
-          </p:cNvCxnSpPr>
-          <p:nvPr/>
-        </p:nvCxnSpPr>
-        <p:spPr>
-          <a:xfrm flipH="1">
-            <a:off x="5283223" y="6830078"/>
-            <a:ext cx="1" cy="345452"/>
-          </a:xfrm>
-          <a:prstGeom prst="straightConnector1">
-            <a:avLst/>
-          </a:prstGeom>
-          <a:ln>
-            <a:tailEnd type="triangle"/>
-          </a:ln>
-        </p:spPr>
-        <p:style>
-          <a:lnRef idx="1">
-            <a:schemeClr val="dk1"/>
-          </a:lnRef>
-          <a:fillRef idx="0">
-            <a:schemeClr val="dk1"/>
-          </a:fillRef>
-          <a:effectRef idx="0">
-            <a:schemeClr val="dk1"/>
-          </a:effectRef>
-          <a:fontRef idx="minor">
-            <a:schemeClr val="tx1"/>
-          </a:fontRef>
-        </p:style>
-      </p:cxnSp>
       <p:sp>
         <p:nvSpPr>
           <p:cNvPr id="92" name="Down Arrow 91">
@@ -6198,8 +6130,8 @@
         </p:nvSpPr>
         <p:spPr>
           <a:xfrm>
-            <a:off x="5103814" y="7701452"/>
-            <a:ext cx="381964" cy="428262"/>
+            <a:off x="5340143" y="8185382"/>
+            <a:ext cx="381964" cy="835995"/>
           </a:xfrm>
           <a:prstGeom prst="downArrow">
             <a:avLst/>
@@ -6247,7 +6179,7 @@
         </p:nvSpPr>
         <p:spPr>
           <a:xfrm>
-            <a:off x="5103814" y="8987225"/>
+            <a:off x="5329532" y="9857373"/>
             <a:ext cx="381964" cy="428262"/>
           </a:xfrm>
           <a:prstGeom prst="downArrow">
@@ -6296,7 +6228,7 @@
         </p:nvSpPr>
         <p:spPr>
           <a:xfrm>
-            <a:off x="5092238" y="9971701"/>
+            <a:off x="5317956" y="10841849"/>
             <a:ext cx="381964" cy="428262"/>
           </a:xfrm>
           <a:prstGeom prst="downArrow">
@@ -6345,7 +6277,7 @@
         </p:nvSpPr>
         <p:spPr>
           <a:xfrm>
-            <a:off x="5092238" y="11169052"/>
+            <a:off x="5317956" y="12039200"/>
             <a:ext cx="381964" cy="428262"/>
           </a:xfrm>
           <a:prstGeom prst="downArrow">
@@ -6394,7 +6326,7 @@
         </p:nvSpPr>
         <p:spPr>
           <a:xfrm>
-            <a:off x="4289483" y="11597315"/>
+            <a:off x="4515201" y="12467463"/>
             <a:ext cx="1987475" cy="755561"/>
           </a:xfrm>
           <a:prstGeom prst="rect">
@@ -6453,7 +6385,7 @@
         </p:nvSpPr>
         <p:spPr>
           <a:xfrm>
-            <a:off x="8065877" y="9448428"/>
+            <a:off x="7698356" y="10269299"/>
             <a:ext cx="1987475" cy="530651"/>
           </a:xfrm>
           <a:prstGeom prst="rect">
@@ -6512,7 +6444,7 @@
         </p:nvSpPr>
         <p:spPr>
           <a:xfrm>
-            <a:off x="8659170" y="10404000"/>
+            <a:off x="8291649" y="11224871"/>
             <a:ext cx="752354" cy="755561"/>
           </a:xfrm>
           <a:prstGeom prst="ellipse">
@@ -6559,7 +6491,7 @@
         </p:nvSpPr>
         <p:spPr>
           <a:xfrm>
-            <a:off x="8844365" y="9971701"/>
+            <a:off x="8476844" y="10792572"/>
             <a:ext cx="381964" cy="428262"/>
           </a:xfrm>
           <a:prstGeom prst="downArrow">
@@ -6608,7 +6540,7 @@
         </p:nvSpPr>
         <p:spPr>
           <a:xfrm>
-            <a:off x="8844365" y="11169052"/>
+            <a:off x="8476844" y="11989923"/>
             <a:ext cx="381964" cy="428262"/>
           </a:xfrm>
           <a:prstGeom prst="downArrow">
@@ -6657,7 +6589,7 @@
         </p:nvSpPr>
         <p:spPr>
           <a:xfrm>
-            <a:off x="8041610" y="11597315"/>
+            <a:off x="7674089" y="12418186"/>
             <a:ext cx="1987475" cy="755561"/>
           </a:xfrm>
           <a:prstGeom prst="rect">
@@ -6702,29 +6634,68 @@
           </a:p>
         </p:txBody>
       </p:sp>
-      <p:sp>
-        <p:nvSpPr>
-          <p:cNvPr id="102" name="Down Arrow 101">
-            <a:extLst>
-              <a:ext uri="{FF2B5EF4-FFF2-40B4-BE49-F238E27FC236}">
-                <a16:creationId xmlns:a16="http://schemas.microsoft.com/office/drawing/2014/main" id="{31DB659C-D85B-EC47-91A2-A01F8156B42B}"/>
-              </a:ext>
-            </a:extLst>
-          </p:cNvPr>
-          <p:cNvSpPr/>
-          <p:nvPr/>
-        </p:nvSpPr>
-        <p:spPr>
-          <a:xfrm>
-            <a:off x="8844364" y="5843343"/>
-            <a:ext cx="376278" cy="986735"/>
-          </a:xfrm>
-          <a:prstGeom prst="downArrow">
-            <a:avLst/>
-          </a:prstGeom>
-          <a:solidFill>
-            <a:schemeClr val="bg1"/>
-          </a:solidFill>
+      <p:cxnSp>
+        <p:nvCxnSpPr>
+          <p:cNvPr id="103" name="Straight Arrow Connector 102">
+            <a:extLst>
+              <a:ext uri="{FF2B5EF4-FFF2-40B4-BE49-F238E27FC236}">
+                <a16:creationId xmlns:a16="http://schemas.microsoft.com/office/drawing/2014/main" id="{48E82184-43C1-7D46-9834-06EBC665D3F5}"/>
+              </a:ext>
+            </a:extLst>
+          </p:cNvPr>
+          <p:cNvCxnSpPr>
+            <a:cxnSpLocks/>
+            <a:stCxn id="86" idx="3"/>
+          </p:cNvCxnSpPr>
+          <p:nvPr/>
+        </p:nvCxnSpPr>
+        <p:spPr>
+          <a:xfrm>
+            <a:off x="6473734" y="6944806"/>
+            <a:ext cx="1374996" cy="344069"/>
+          </a:xfrm>
+          <a:prstGeom prst="straightConnector1">
+            <a:avLst/>
+          </a:prstGeom>
+          <a:ln>
+            <a:tailEnd type="triangle"/>
+          </a:ln>
+        </p:spPr>
+        <p:style>
+          <a:lnRef idx="1">
+            <a:schemeClr val="dk1"/>
+          </a:lnRef>
+          <a:fillRef idx="0">
+            <a:schemeClr val="dk1"/>
+          </a:fillRef>
+          <a:effectRef idx="0">
+            <a:schemeClr val="dk1"/>
+          </a:effectRef>
+          <a:fontRef idx="minor">
+            <a:schemeClr val="tx1"/>
+          </a:fontRef>
+        </p:style>
+      </p:cxnSp>
+      <p:sp>
+        <p:nvSpPr>
+          <p:cNvPr id="110" name="Diamond 109">
+            <a:extLst>
+              <a:ext uri="{FF2B5EF4-FFF2-40B4-BE49-F238E27FC236}">
+                <a16:creationId xmlns:a16="http://schemas.microsoft.com/office/drawing/2014/main" id="{AE4C2E08-C7CA-1A4F-8A6E-6E8D16B38182}"/>
+              </a:ext>
+            </a:extLst>
+          </p:cNvPr>
+          <p:cNvSpPr/>
+          <p:nvPr/>
+        </p:nvSpPr>
+        <p:spPr>
+          <a:xfrm>
+            <a:off x="7460760" y="9019235"/>
+            <a:ext cx="2423155" cy="835996"/>
+          </a:xfrm>
+          <a:prstGeom prst="diamond">
+            <a:avLst/>
+          </a:prstGeom>
         </p:spPr>
         <p:style>
           <a:lnRef idx="2">
@@ -6743,66 +6714,174 @@
           </a:fontRef>
         </p:style>
         <p:txBody>
-          <a:bodyPr wrap="none" rtlCol="0" anchor="ctr"/>
-          <a:lstStyle/>
-          <a:p>
-            <a:pPr algn="ctr"/>
-            <a:endParaRPr lang="en-US" b="1">
-              <a:solidFill>
-                <a:schemeClr val="tx1"/>
-              </a:solidFill>
-            </a:endParaRPr>
-          </a:p>
-        </p:txBody>
-      </p:sp>
-      <p:cxnSp>
-        <p:nvCxnSpPr>
-          <p:cNvPr id="103" name="Straight Arrow Connector 102">
-            <a:extLst>
-              <a:ext uri="{FF2B5EF4-FFF2-40B4-BE49-F238E27FC236}">
-                <a16:creationId xmlns:a16="http://schemas.microsoft.com/office/drawing/2014/main" id="{48E82184-43C1-7D46-9834-06EBC665D3F5}"/>
-              </a:ext>
-            </a:extLst>
-          </p:cNvPr>
-          <p:cNvCxnSpPr>
-            <a:cxnSpLocks/>
-            <a:stCxn id="86" idx="3"/>
-          </p:cNvCxnSpPr>
-          <p:nvPr/>
-        </p:nvCxnSpPr>
-        <p:spPr>
-          <a:xfrm flipV="1">
-            <a:off x="6276960" y="7421518"/>
-            <a:ext cx="1577403" cy="19338"/>
-          </a:xfrm>
-          <a:prstGeom prst="straightConnector1">
-            <a:avLst/>
-          </a:prstGeom>
-          <a:ln>
-            <a:tailEnd type="triangle"/>
-          </a:ln>
+          <a:bodyPr wrap="none" lIns="36000" rIns="36000" rtlCol="0" anchor="ctr"/>
+          <a:lstStyle/>
+          <a:p>
+            <a:pPr algn="ctr"/>
+            <a:r>
+              <a:rPr lang="en-GB"/>
+              <a:t>FF-NN:</a:t>
+            </a:r>
+            <a:br>
+              <a:rPr lang="en-GB"/>
+            </a:br>
+            <a:r>
+              <a:rPr lang="en-GB"/>
+              <a:t>linear2senses</a:t>
+            </a:r>
+            <a:endParaRPr lang="en-US"/>
+          </a:p>
+        </p:txBody>
+      </p:sp>
+      <p:sp>
+        <p:nvSpPr>
+          <p:cNvPr id="111" name="Down Arrow 110">
+            <a:extLst>
+              <a:ext uri="{FF2B5EF4-FFF2-40B4-BE49-F238E27FC236}">
+                <a16:creationId xmlns:a16="http://schemas.microsoft.com/office/drawing/2014/main" id="{C4A77C34-6AAE-CF4F-9234-5F76595DAA01}"/>
+              </a:ext>
+            </a:extLst>
+          </p:cNvPr>
+          <p:cNvSpPr/>
+          <p:nvPr/>
+        </p:nvSpPr>
+        <p:spPr>
+          <a:xfrm>
+            <a:off x="8472906" y="8163960"/>
+            <a:ext cx="381964" cy="868992"/>
+          </a:xfrm>
+          <a:prstGeom prst="downArrow">
+            <a:avLst/>
+          </a:prstGeom>
+          <a:solidFill>
+            <a:schemeClr val="bg1"/>
+          </a:solidFill>
+        </p:spPr>
+        <p:style>
+          <a:lnRef idx="2">
+            <a:schemeClr val="accent1">
+              <a:shade val="50000"/>
+            </a:schemeClr>
+          </a:lnRef>
+          <a:fillRef idx="1">
+            <a:schemeClr val="accent1"/>
+          </a:fillRef>
+          <a:effectRef idx="0">
+            <a:schemeClr val="accent1"/>
+          </a:effectRef>
+          <a:fontRef idx="minor">
+            <a:schemeClr val="lt1"/>
+          </a:fontRef>
+        </p:style>
+        <p:txBody>
+          <a:bodyPr rtlCol="0" anchor="ctr"/>
+          <a:lstStyle/>
+          <a:p>
+            <a:pPr algn="ctr"/>
+            <a:endParaRPr lang="en-US"/>
+          </a:p>
+        </p:txBody>
+      </p:sp>
+      <p:sp>
+        <p:nvSpPr>
+          <p:cNvPr id="112" name="Down Arrow 111">
+            <a:extLst>
+              <a:ext uri="{FF2B5EF4-FFF2-40B4-BE49-F238E27FC236}">
+                <a16:creationId xmlns:a16="http://schemas.microsoft.com/office/drawing/2014/main" id="{FDC1CB01-C028-6C48-95D2-4C7288B55F66}"/>
+              </a:ext>
+            </a:extLst>
+          </p:cNvPr>
+          <p:cNvSpPr/>
+          <p:nvPr/>
+        </p:nvSpPr>
+        <p:spPr>
+          <a:xfrm>
+            <a:off x="8471157" y="9833871"/>
+            <a:ext cx="381964" cy="428262"/>
+          </a:xfrm>
+          <a:prstGeom prst="downArrow">
+            <a:avLst/>
+          </a:prstGeom>
+          <a:solidFill>
+            <a:schemeClr val="bg1"/>
+          </a:solidFill>
+        </p:spPr>
+        <p:style>
+          <a:lnRef idx="2">
+            <a:schemeClr val="accent1">
+              <a:shade val="50000"/>
+            </a:schemeClr>
+          </a:lnRef>
+          <a:fillRef idx="1">
+            <a:schemeClr val="accent1"/>
+          </a:fillRef>
+          <a:effectRef idx="0">
+            <a:schemeClr val="accent1"/>
+          </a:effectRef>
+          <a:fontRef idx="minor">
+            <a:schemeClr val="lt1"/>
+          </a:fontRef>
+        </p:style>
+        <p:txBody>
+          <a:bodyPr rtlCol="0" anchor="ctr"/>
+          <a:lstStyle/>
+          <a:p>
+            <a:pPr algn="ctr"/>
+            <a:endParaRPr lang="en-US"/>
+          </a:p>
+        </p:txBody>
+      </p:sp>
+      <p:sp>
+        <p:nvSpPr>
+          <p:cNvPr id="114" name="Left Bracket 113">
+            <a:extLst>
+              <a:ext uri="{FF2B5EF4-FFF2-40B4-BE49-F238E27FC236}">
+                <a16:creationId xmlns:a16="http://schemas.microsoft.com/office/drawing/2014/main" id="{D6FA0586-C9C1-0645-96D3-C580A6E207AE}"/>
+              </a:ext>
+            </a:extLst>
+          </p:cNvPr>
+          <p:cNvSpPr/>
+          <p:nvPr/>
+        </p:nvSpPr>
+        <p:spPr>
+          <a:xfrm>
+            <a:off x="2942194" y="6227180"/>
+            <a:ext cx="299326" cy="1111170"/>
+          </a:xfrm>
+          <a:prstGeom prst="leftBracket">
+            <a:avLst/>
+          </a:prstGeom>
+          <a:ln w="12700"/>
         </p:spPr>
         <p:style>
           <a:lnRef idx="1">
-            <a:schemeClr val="dk1"/>
+            <a:schemeClr val="accent1"/>
           </a:lnRef>
           <a:fillRef idx="0">
-            <a:schemeClr val="dk1"/>
-          </a:fillRef>
-          <a:effectRef idx="0">
-            <a:schemeClr val="dk1"/>
+            <a:schemeClr val="accent1"/>
+          </a:fillRef>
+          <a:effectRef idx="0">
+            <a:schemeClr val="accent1"/>
           </a:effectRef>
           <a:fontRef idx="minor">
             <a:schemeClr val="tx1"/>
           </a:fontRef>
         </p:style>
-      </p:cxnSp>
-      <p:sp>
-        <p:nvSpPr>
-          <p:cNvPr id="104" name="TextBox 103">
-            <a:extLst>
-              <a:ext uri="{FF2B5EF4-FFF2-40B4-BE49-F238E27FC236}">
-                <a16:creationId xmlns:a16="http://schemas.microsoft.com/office/drawing/2014/main" id="{B33B7106-170F-2048-9067-00A2AF81F8F8}"/>
+        <p:txBody>
+          <a:bodyPr rtlCol="0" anchor="ctr"/>
+          <a:lstStyle/>
+          <a:p>
+            <a:pPr algn="ctr"/>
+            <a:endParaRPr lang="en-US"/>
+          </a:p>
+        </p:txBody>
+      </p:sp>
+      <p:sp>
+        <p:nvSpPr>
+          <p:cNvPr id="2" name="TextBox 1">
+            <a:extLst>
+              <a:ext uri="{FF2B5EF4-FFF2-40B4-BE49-F238E27FC236}">
+                <a16:creationId xmlns:a16="http://schemas.microsoft.com/office/drawing/2014/main" id="{CD51F447-4C90-B042-B3E2-0278C3F50ABF}"/>
               </a:ext>
             </a:extLst>
           </p:cNvPr>
@@ -6811,8 +6890,8 @@
         </p:nvSpPr>
         <p:spPr>
           <a:xfrm>
-            <a:off x="8400397" y="6755730"/>
-            <a:ext cx="1602487" cy="369332"/>
+            <a:off x="1967696" y="6493397"/>
+            <a:ext cx="1040022" cy="369332"/>
           </a:xfrm>
           <a:prstGeom prst="rect">
             <a:avLst/>
@@ -6826,50 +6905,44 @@
           <a:lstStyle/>
           <a:p>
             <a:r>
-              <a:rPr lang="en-US"/>
-              <a:t>Concatenate:</a:t>
-            </a:r>
-          </a:p>
-        </p:txBody>
-      </p:sp>
-      <p:sp>
-        <p:nvSpPr>
-          <p:cNvPr id="105" name="Rectangle 104">
-            <a:extLst>
-              <a:ext uri="{FF2B5EF4-FFF2-40B4-BE49-F238E27FC236}">
-                <a16:creationId xmlns:a16="http://schemas.microsoft.com/office/drawing/2014/main" id="{E1E9A32B-88D5-BC41-B7A7-6C28DBA64B0E}"/>
-              </a:ext>
-            </a:extLst>
-          </p:cNvPr>
-          <p:cNvSpPr/>
-          <p:nvPr/>
-        </p:nvSpPr>
-        <p:spPr>
-          <a:xfrm>
-            <a:off x="8748175" y="7186340"/>
-            <a:ext cx="906930" cy="554077"/>
-          </a:xfrm>
-          <a:prstGeom prst="rect">
-            <a:avLst/>
-          </a:prstGeom>
-          <a:solidFill>
-            <a:schemeClr val="accent2">
-              <a:lumMod val="60000"/>
-              <a:lumOff val="40000"/>
-            </a:schemeClr>
-          </a:solidFill>
+              <a:rPr lang="en-US" b="1"/>
+              <a:t>GRU</a:t>
+            </a:r>
+          </a:p>
+        </p:txBody>
+      </p:sp>
+      <p:sp>
+        <p:nvSpPr>
+          <p:cNvPr id="115" name="Diamond 114">
+            <a:extLst>
+              <a:ext uri="{FF2B5EF4-FFF2-40B4-BE49-F238E27FC236}">
+                <a16:creationId xmlns:a16="http://schemas.microsoft.com/office/drawing/2014/main" id="{F069E149-BA77-2B4D-A2C9-3C304350BADE}"/>
+              </a:ext>
+            </a:extLst>
+          </p:cNvPr>
+          <p:cNvSpPr/>
+          <p:nvPr/>
+        </p:nvSpPr>
+        <p:spPr>
+          <a:xfrm>
+            <a:off x="4308067" y="7100480"/>
+            <a:ext cx="2423155" cy="756806"/>
+          </a:xfrm>
+          <a:prstGeom prst="diamond">
+            <a:avLst/>
+          </a:prstGeom>
         </p:spPr>
         <p:style>
           <a:lnRef idx="2">
-            <a:schemeClr val="accent4">
+            <a:schemeClr val="accent1">
               <a:shade val="50000"/>
             </a:schemeClr>
           </a:lnRef>
           <a:fillRef idx="1">
-            <a:schemeClr val="accent4"/>
-          </a:fillRef>
-          <a:effectRef idx="0">
-            <a:schemeClr val="accent4"/>
+            <a:schemeClr val="accent1"/>
+          </a:fillRef>
+          <a:effectRef idx="0">
+            <a:schemeClr val="accent1"/>
           </a:effectRef>
           <a:fontRef idx="minor">
             <a:schemeClr val="lt1"/>
@@ -6881,190 +6954,28 @@
           <a:p>
             <a:pPr algn="ctr"/>
             <a:r>
-              <a:rPr lang="en-US" sz="1200" b="1">
-                <a:solidFill>
-                  <a:schemeClr val="tx1"/>
-                </a:solidFill>
-              </a:rPr>
-              <a:t>Word Embedding</a:t>
-            </a:r>
-          </a:p>
-        </p:txBody>
-      </p:sp>
-      <p:sp>
-        <p:nvSpPr>
-          <p:cNvPr id="106" name="Rectangle 105">
-            <a:extLst>
-              <a:ext uri="{FF2B5EF4-FFF2-40B4-BE49-F238E27FC236}">
-                <a16:creationId xmlns:a16="http://schemas.microsoft.com/office/drawing/2014/main" id="{A1AFB24C-B026-AA4E-9DBF-3DD0369BCF40}"/>
-              </a:ext>
-            </a:extLst>
-          </p:cNvPr>
-          <p:cNvSpPr/>
-          <p:nvPr/>
-        </p:nvSpPr>
-        <p:spPr>
-          <a:xfrm>
-            <a:off x="9655105" y="7175531"/>
-            <a:ext cx="973594" cy="564886"/>
-          </a:xfrm>
-          <a:prstGeom prst="rect">
-            <a:avLst/>
-          </a:prstGeom>
-        </p:spPr>
-        <p:style>
-          <a:lnRef idx="2">
-            <a:schemeClr val="accent4">
-              <a:shade val="50000"/>
-            </a:schemeClr>
-          </a:lnRef>
-          <a:fillRef idx="1">
-            <a:schemeClr val="accent4"/>
-          </a:fillRef>
-          <a:effectRef idx="0">
-            <a:schemeClr val="accent4"/>
-          </a:effectRef>
-          <a:fontRef idx="minor">
-            <a:schemeClr val="lt1"/>
-          </a:fontRef>
-        </p:style>
-        <p:txBody>
-          <a:bodyPr rtlCol="0" anchor="ctr"/>
-          <a:lstStyle/>
-          <a:p>
-            <a:pPr algn="ctr"/>
-            <a:r>
-              <a:rPr lang="en-US" sz="1200" b="1">
-                <a:solidFill>
-                  <a:schemeClr val="tx1"/>
-                </a:solidFill>
-              </a:rPr>
-              <a:t>Word Node State</a:t>
-            </a:r>
-          </a:p>
-        </p:txBody>
-      </p:sp>
-      <p:sp>
-        <p:nvSpPr>
-          <p:cNvPr id="107" name="Rectangle 106">
-            <a:extLst>
-              <a:ext uri="{FF2B5EF4-FFF2-40B4-BE49-F238E27FC236}">
-                <a16:creationId xmlns:a16="http://schemas.microsoft.com/office/drawing/2014/main" id="{C3CB9358-0B5D-6E40-8A48-6D51B9AFC752}"/>
-              </a:ext>
-            </a:extLst>
-          </p:cNvPr>
-          <p:cNvSpPr/>
-          <p:nvPr/>
-        </p:nvSpPr>
-        <p:spPr>
-          <a:xfrm>
-            <a:off x="10628700" y="7174366"/>
-            <a:ext cx="732793" cy="564884"/>
-          </a:xfrm>
-          <a:prstGeom prst="rect">
-            <a:avLst/>
-          </a:prstGeom>
-        </p:spPr>
-        <p:style>
-          <a:lnRef idx="1">
-            <a:schemeClr val="accent6"/>
-          </a:lnRef>
-          <a:fillRef idx="2">
-            <a:schemeClr val="accent6"/>
-          </a:fillRef>
-          <a:effectRef idx="1">
-            <a:schemeClr val="accent6"/>
-          </a:effectRef>
-          <a:fontRef idx="minor">
-            <a:schemeClr val="dk1"/>
-          </a:fontRef>
-        </p:style>
-        <p:txBody>
-          <a:bodyPr rtlCol="0" anchor="ctr"/>
-          <a:lstStyle/>
-          <a:p>
-            <a:pPr algn="ctr"/>
-            <a:r>
-              <a:rPr lang="en-US" sz="1200" b="1"/>
-              <a:t>Sense </a:t>
-            </a:r>
-            <a:r>
-              <a:rPr lang="en-US" sz="1200" b="1">
-                <a:solidFill>
-                  <a:schemeClr val="tx1"/>
-                </a:solidFill>
-              </a:rPr>
-              <a:t>Node State</a:t>
-            </a:r>
-          </a:p>
-        </p:txBody>
-      </p:sp>
-      <p:sp>
-        <p:nvSpPr>
-          <p:cNvPr id="108" name="TextBox 107">
-            <a:extLst>
-              <a:ext uri="{FF2B5EF4-FFF2-40B4-BE49-F238E27FC236}">
-                <a16:creationId xmlns:a16="http://schemas.microsoft.com/office/drawing/2014/main" id="{6B8B41D5-2792-E24C-9120-30F5AFCFD7B4}"/>
-              </a:ext>
-            </a:extLst>
-          </p:cNvPr>
-          <p:cNvSpPr txBox="1"/>
-          <p:nvPr/>
-        </p:nvSpPr>
-        <p:spPr>
-          <a:xfrm>
-            <a:off x="6367463" y="6963803"/>
-            <a:ext cx="1490636" cy="954107"/>
-          </a:xfrm>
-          <a:prstGeom prst="rect">
-            <a:avLst/>
-          </a:prstGeom>
-          <a:noFill/>
-        </p:spPr>
-        <p:txBody>
-          <a:bodyPr wrap="square" rtlCol="0">
-            <a:spAutoFit/>
-          </a:bodyPr>
-          <a:lstStyle/>
-          <a:p>
-            <a:r>
-              <a:rPr lang="en-US" sz="1400"/>
-              <a:t>Copy without gradient</a:t>
-            </a:r>
-            <a:br>
-              <a:rPr lang="en-US" sz="1400"/>
-            </a:br>
-            <a:r>
-              <a:rPr lang="en-US" sz="1400"/>
-              <a:t>(</a:t>
-            </a:r>
-            <a:r>
-              <a:rPr lang="en-US" sz="1400" b="1"/>
-              <a:t>“photo” of the current context</a:t>
-            </a:r>
-            <a:r>
-              <a:rPr lang="en-US" sz="1400"/>
-              <a:t>)</a:t>
-            </a:r>
-          </a:p>
-        </p:txBody>
-      </p:sp>
-      <p:sp>
-        <p:nvSpPr>
-          <p:cNvPr id="109" name="Rectangle 108">
-            <a:extLst>
-              <a:ext uri="{FF2B5EF4-FFF2-40B4-BE49-F238E27FC236}">
-                <a16:creationId xmlns:a16="http://schemas.microsoft.com/office/drawing/2014/main" id="{D58BB6DA-9694-6C45-8407-9C3126FD32A4}"/>
-              </a:ext>
-            </a:extLst>
-          </p:cNvPr>
-          <p:cNvSpPr/>
-          <p:nvPr/>
-        </p:nvSpPr>
-        <p:spPr>
-          <a:xfrm>
-            <a:off x="7851715" y="7186958"/>
-            <a:ext cx="896461" cy="552292"/>
+              <a:rPr lang="en-US"/>
+              <a:t>Layer 2 of GRU</a:t>
+            </a:r>
+          </a:p>
+        </p:txBody>
+      </p:sp>
+      <p:sp>
+        <p:nvSpPr>
+          <p:cNvPr id="116" name="Rectangle 115">
+            <a:extLst>
+              <a:ext uri="{FF2B5EF4-FFF2-40B4-BE49-F238E27FC236}">
+                <a16:creationId xmlns:a16="http://schemas.microsoft.com/office/drawing/2014/main" id="{DFA289A8-0F99-5146-8DC5-32B647A8B770}"/>
+              </a:ext>
+            </a:extLst>
+          </p:cNvPr>
+          <p:cNvSpPr/>
+          <p:nvPr/>
+        </p:nvSpPr>
+        <p:spPr>
+          <a:xfrm>
+            <a:off x="4486258" y="7876565"/>
+            <a:ext cx="1987475" cy="299327"/>
           </a:xfrm>
           <a:prstGeom prst="rect">
             <a:avLst/>
@@ -7098,286 +7009,121 @@
           <a:p>
             <a:pPr algn="ctr"/>
             <a:r>
-              <a:rPr lang="en-US" sz="1400">
+              <a:rPr lang="en-US" sz="1600">
                 <a:solidFill>
                   <a:schemeClr val="tx1"/>
                 </a:solidFill>
               </a:rPr>
-              <a:t>Encoding </a:t>
-            </a:r>
-            <a:br>
-              <a:rPr lang="en-US" sz="1400">
+              <a:t>Hidden state 2</a:t>
+            </a:r>
+          </a:p>
+        </p:txBody>
+      </p:sp>
+      <p:sp>
+        <p:nvSpPr>
+          <p:cNvPr id="117" name="Diamond 116">
+            <a:extLst>
+              <a:ext uri="{FF2B5EF4-FFF2-40B4-BE49-F238E27FC236}">
+                <a16:creationId xmlns:a16="http://schemas.microsoft.com/office/drawing/2014/main" id="{FA4779EC-9A0D-CB41-868F-70F7E232C442}"/>
+              </a:ext>
+            </a:extLst>
+          </p:cNvPr>
+          <p:cNvSpPr/>
+          <p:nvPr/>
+        </p:nvSpPr>
+        <p:spPr>
+          <a:xfrm>
+            <a:off x="7452311" y="7085503"/>
+            <a:ext cx="2423155" cy="756806"/>
+          </a:xfrm>
+          <a:prstGeom prst="diamond">
+            <a:avLst/>
+          </a:prstGeom>
+        </p:spPr>
+        <p:style>
+          <a:lnRef idx="2">
+            <a:schemeClr val="accent1">
+              <a:shade val="50000"/>
+            </a:schemeClr>
+          </a:lnRef>
+          <a:fillRef idx="1">
+            <a:schemeClr val="accent1"/>
+          </a:fillRef>
+          <a:effectRef idx="0">
+            <a:schemeClr val="accent1"/>
+          </a:effectRef>
+          <a:fontRef idx="minor">
+            <a:schemeClr val="lt1"/>
+          </a:fontRef>
+        </p:style>
+        <p:txBody>
+          <a:bodyPr rtlCol="0" anchor="ctr"/>
+          <a:lstStyle/>
+          <a:p>
+            <a:pPr algn="ctr"/>
+            <a:r>
+              <a:rPr lang="en-US"/>
+              <a:t>Layer 2b of GRU</a:t>
+            </a:r>
+          </a:p>
+        </p:txBody>
+      </p:sp>
+      <p:sp>
+        <p:nvSpPr>
+          <p:cNvPr id="118" name="Rectangle 117">
+            <a:extLst>
+              <a:ext uri="{FF2B5EF4-FFF2-40B4-BE49-F238E27FC236}">
+                <a16:creationId xmlns:a16="http://schemas.microsoft.com/office/drawing/2014/main" id="{1D7FA5EB-8E41-BE4A-9971-CF1924145332}"/>
+              </a:ext>
+            </a:extLst>
+          </p:cNvPr>
+          <p:cNvSpPr/>
+          <p:nvPr/>
+        </p:nvSpPr>
+        <p:spPr>
+          <a:xfrm>
+            <a:off x="7670890" y="7849475"/>
+            <a:ext cx="1987475" cy="299327"/>
+          </a:xfrm>
+          <a:prstGeom prst="rect">
+            <a:avLst/>
+          </a:prstGeom>
+          <a:solidFill>
+            <a:schemeClr val="accent5">
+              <a:lumMod val="40000"/>
+              <a:lumOff val="60000"/>
+            </a:schemeClr>
+          </a:solidFill>
+        </p:spPr>
+        <p:style>
+          <a:lnRef idx="2">
+            <a:schemeClr val="accent5">
+              <a:shade val="50000"/>
+            </a:schemeClr>
+          </a:lnRef>
+          <a:fillRef idx="1">
+            <a:schemeClr val="accent5"/>
+          </a:fillRef>
+          <a:effectRef idx="0">
+            <a:schemeClr val="accent5"/>
+          </a:effectRef>
+          <a:fontRef idx="minor">
+            <a:schemeClr val="lt1"/>
+          </a:fontRef>
+        </p:style>
+        <p:txBody>
+          <a:bodyPr rtlCol="0" anchor="ctr"/>
+          <a:lstStyle/>
+          <a:p>
+            <a:pPr algn="ctr"/>
+            <a:r>
+              <a:rPr lang="en-US" sz="1600">
                 <a:solidFill>
                   <a:schemeClr val="tx1"/>
                 </a:solidFill>
               </a:rPr>
-            </a:br>
-            <a:r>
-              <a:rPr lang="en-US" sz="1400">
-                <a:solidFill>
-                  <a:schemeClr val="tx1"/>
-                </a:solidFill>
-              </a:rPr>
-              <a:t>(Hidden state 2)</a:t>
-            </a:r>
-            <a:endParaRPr lang="en-US" sz="1400" b="1">
-              <a:solidFill>
-                <a:schemeClr val="tx1"/>
-              </a:solidFill>
-            </a:endParaRPr>
-          </a:p>
-        </p:txBody>
-      </p:sp>
-      <p:sp>
-        <p:nvSpPr>
-          <p:cNvPr id="110" name="Diamond 109">
-            <a:extLst>
-              <a:ext uri="{FF2B5EF4-FFF2-40B4-BE49-F238E27FC236}">
-                <a16:creationId xmlns:a16="http://schemas.microsoft.com/office/drawing/2014/main" id="{AE4C2E08-C7CA-1A4F-8A6E-6E8D16B38182}"/>
-              </a:ext>
-            </a:extLst>
-          </p:cNvPr>
-          <p:cNvSpPr/>
-          <p:nvPr/>
-        </p:nvSpPr>
-        <p:spPr>
-          <a:xfrm>
-            <a:off x="7806508" y="8177004"/>
-            <a:ext cx="2423155" cy="835996"/>
-          </a:xfrm>
-          <a:prstGeom prst="diamond">
-            <a:avLst/>
-          </a:prstGeom>
-        </p:spPr>
-        <p:style>
-          <a:lnRef idx="2">
-            <a:schemeClr val="accent1">
-              <a:shade val="50000"/>
-            </a:schemeClr>
-          </a:lnRef>
-          <a:fillRef idx="1">
-            <a:schemeClr val="accent1"/>
-          </a:fillRef>
-          <a:effectRef idx="0">
-            <a:schemeClr val="accent1"/>
-          </a:effectRef>
-          <a:fontRef idx="minor">
-            <a:schemeClr val="lt1"/>
-          </a:fontRef>
-        </p:style>
-        <p:txBody>
-          <a:bodyPr wrap="none" lIns="36000" rIns="36000" rtlCol="0" anchor="ctr"/>
-          <a:lstStyle/>
-          <a:p>
-            <a:pPr algn="ctr"/>
-            <a:r>
-              <a:rPr lang="en-GB"/>
-              <a:t>FF-NN:</a:t>
-            </a:r>
-            <a:br>
-              <a:rPr lang="en-GB"/>
-            </a:br>
-            <a:r>
-              <a:rPr lang="en-GB"/>
-              <a:t>linear2senses</a:t>
-            </a:r>
-            <a:endParaRPr lang="en-US"/>
-          </a:p>
-        </p:txBody>
-      </p:sp>
-      <p:sp>
-        <p:nvSpPr>
-          <p:cNvPr id="111" name="Down Arrow 110">
-            <a:extLst>
-              <a:ext uri="{FF2B5EF4-FFF2-40B4-BE49-F238E27FC236}">
-                <a16:creationId xmlns:a16="http://schemas.microsoft.com/office/drawing/2014/main" id="{C4A77C34-6AAE-CF4F-9234-5F76595DAA01}"/>
-              </a:ext>
-            </a:extLst>
-          </p:cNvPr>
-          <p:cNvSpPr/>
-          <p:nvPr/>
-        </p:nvSpPr>
-        <p:spPr>
-          <a:xfrm>
-            <a:off x="8838678" y="7727227"/>
-            <a:ext cx="381964" cy="428262"/>
-          </a:xfrm>
-          <a:prstGeom prst="downArrow">
-            <a:avLst/>
-          </a:prstGeom>
-          <a:solidFill>
-            <a:schemeClr val="bg1"/>
-          </a:solidFill>
-        </p:spPr>
-        <p:style>
-          <a:lnRef idx="2">
-            <a:schemeClr val="accent1">
-              <a:shade val="50000"/>
-            </a:schemeClr>
-          </a:lnRef>
-          <a:fillRef idx="1">
-            <a:schemeClr val="accent1"/>
-          </a:fillRef>
-          <a:effectRef idx="0">
-            <a:schemeClr val="accent1"/>
-          </a:effectRef>
-          <a:fontRef idx="minor">
-            <a:schemeClr val="lt1"/>
-          </a:fontRef>
-        </p:style>
-        <p:txBody>
-          <a:bodyPr rtlCol="0" anchor="ctr"/>
-          <a:lstStyle/>
-          <a:p>
-            <a:pPr algn="ctr"/>
-            <a:endParaRPr lang="en-US"/>
-          </a:p>
-        </p:txBody>
-      </p:sp>
-      <p:sp>
-        <p:nvSpPr>
-          <p:cNvPr id="112" name="Down Arrow 111">
-            <a:extLst>
-              <a:ext uri="{FF2B5EF4-FFF2-40B4-BE49-F238E27FC236}">
-                <a16:creationId xmlns:a16="http://schemas.microsoft.com/office/drawing/2014/main" id="{FDC1CB01-C028-6C48-95D2-4C7288B55F66}"/>
-              </a:ext>
-            </a:extLst>
-          </p:cNvPr>
-          <p:cNvSpPr/>
-          <p:nvPr/>
-        </p:nvSpPr>
-        <p:spPr>
-          <a:xfrm>
-            <a:off x="8838678" y="9013000"/>
-            <a:ext cx="381964" cy="428262"/>
-          </a:xfrm>
-          <a:prstGeom prst="downArrow">
-            <a:avLst/>
-          </a:prstGeom>
-          <a:solidFill>
-            <a:schemeClr val="bg1"/>
-          </a:solidFill>
-        </p:spPr>
-        <p:style>
-          <a:lnRef idx="2">
-            <a:schemeClr val="accent1">
-              <a:shade val="50000"/>
-            </a:schemeClr>
-          </a:lnRef>
-          <a:fillRef idx="1">
-            <a:schemeClr val="accent1"/>
-          </a:fillRef>
-          <a:effectRef idx="0">
-            <a:schemeClr val="accent1"/>
-          </a:effectRef>
-          <a:fontRef idx="minor">
-            <a:schemeClr val="lt1"/>
-          </a:fontRef>
-        </p:style>
-        <p:txBody>
-          <a:bodyPr rtlCol="0" anchor="ctr"/>
-          <a:lstStyle/>
-          <a:p>
-            <a:pPr algn="ctr"/>
-            <a:endParaRPr lang="en-US"/>
-          </a:p>
-        </p:txBody>
-      </p:sp>
-      <p:sp>
-        <p:nvSpPr>
-          <p:cNvPr id="3" name="Rectangle 2">
-            <a:extLst>
-              <a:ext uri="{FF2B5EF4-FFF2-40B4-BE49-F238E27FC236}">
-                <a16:creationId xmlns:a16="http://schemas.microsoft.com/office/drawing/2014/main" id="{191F51C0-B77D-3F44-8E75-00DE001A271E}"/>
-              </a:ext>
-            </a:extLst>
-          </p:cNvPr>
-          <p:cNvSpPr/>
-          <p:nvPr/>
-        </p:nvSpPr>
-        <p:spPr>
-          <a:xfrm>
-            <a:off x="6878320" y="5843343"/>
-            <a:ext cx="2251488" cy="170984"/>
-          </a:xfrm>
-          <a:prstGeom prst="rect">
-            <a:avLst/>
-          </a:prstGeom>
-          <a:solidFill>
-            <a:schemeClr val="bg1"/>
-          </a:solidFill>
-        </p:spPr>
-        <p:style>
-          <a:lnRef idx="2">
-            <a:schemeClr val="accent1">
-              <a:shade val="50000"/>
-            </a:schemeClr>
-          </a:lnRef>
-          <a:fillRef idx="1">
-            <a:schemeClr val="accent1"/>
-          </a:fillRef>
-          <a:effectRef idx="0">
-            <a:schemeClr val="accent1"/>
-          </a:effectRef>
-          <a:fontRef idx="minor">
-            <a:schemeClr val="lt1"/>
-          </a:fontRef>
-        </p:style>
-        <p:txBody>
-          <a:bodyPr rtlCol="0" anchor="ctr"/>
-          <a:lstStyle/>
-          <a:p>
-            <a:pPr algn="ctr"/>
-            <a:endParaRPr lang="en-US"/>
-          </a:p>
-        </p:txBody>
-      </p:sp>
-      <p:sp>
-        <p:nvSpPr>
-          <p:cNvPr id="113" name="Rectangle 112">
-            <a:extLst>
-              <a:ext uri="{FF2B5EF4-FFF2-40B4-BE49-F238E27FC236}">
-                <a16:creationId xmlns:a16="http://schemas.microsoft.com/office/drawing/2014/main" id="{A38E439A-B180-D542-8369-90B5E0DA3F17}"/>
-              </a:ext>
-            </a:extLst>
-          </p:cNvPr>
-          <p:cNvSpPr/>
-          <p:nvPr/>
-        </p:nvSpPr>
-        <p:spPr>
-          <a:xfrm rot="5400000">
-            <a:off x="6707289" y="5682970"/>
-            <a:ext cx="506226" cy="164164"/>
-          </a:xfrm>
-          <a:prstGeom prst="rect">
-            <a:avLst/>
-          </a:prstGeom>
-          <a:solidFill>
-            <a:schemeClr val="bg1"/>
-          </a:solidFill>
-        </p:spPr>
-        <p:style>
-          <a:lnRef idx="2">
-            <a:schemeClr val="accent1">
-              <a:shade val="50000"/>
-            </a:schemeClr>
-          </a:lnRef>
-          <a:fillRef idx="1">
-            <a:schemeClr val="accent1"/>
-          </a:fillRef>
-          <a:effectRef idx="0">
-            <a:schemeClr val="accent1"/>
-          </a:effectRef>
-          <a:fontRef idx="minor">
-            <a:schemeClr val="lt1"/>
-          </a:fontRef>
-        </p:style>
-        <p:txBody>
-          <a:bodyPr rtlCol="0" anchor="ctr"/>
-          <a:lstStyle/>
-          <a:p>
-            <a:pPr algn="ctr"/>
-            <a:endParaRPr lang="en-US"/>
+              <a:t>Hidden state 2b</a:t>
+            </a:r>
           </a:p>
         </p:txBody>
       </p:sp>
@@ -8915,6 +8661,663 @@
 </file>
 
 <file path=ppt/slides/slide3.xml><?xml version="1.0" encoding="utf-8"?>
+<p:sld xmlns:a="http://schemas.openxmlformats.org/drawingml/2006/main" xmlns:r="http://schemas.openxmlformats.org/officeDocument/2006/relationships" xmlns:p="http://schemas.openxmlformats.org/presentationml/2006/main">
+  <p:cSld>
+    <p:spTree>
+      <p:nvGrpSpPr>
+        <p:cNvPr id="1" name=""/>
+        <p:cNvGrpSpPr/>
+        <p:nvPr/>
+      </p:nvGrpSpPr>
+      <p:grpSpPr>
+        <a:xfrm>
+          <a:off x="0" y="0"/>
+          <a:ext cx="0" cy="0"/>
+          <a:chOff x="0" y="0"/>
+          <a:chExt cx="0" cy="0"/>
+        </a:xfrm>
+      </p:grpSpPr>
+      <p:sp>
+        <p:nvSpPr>
+          <p:cNvPr id="4" name="Down Arrow 3">
+            <a:extLst>
+              <a:ext uri="{FF2B5EF4-FFF2-40B4-BE49-F238E27FC236}">
+                <a16:creationId xmlns:a16="http://schemas.microsoft.com/office/drawing/2014/main" id="{F4553749-CBD8-9A42-9051-4EFBAC54EFB5}"/>
+              </a:ext>
+            </a:extLst>
+          </p:cNvPr>
+          <p:cNvSpPr/>
+          <p:nvPr/>
+        </p:nvSpPr>
+        <p:spPr>
+          <a:xfrm>
+            <a:off x="5268895" y="4072602"/>
+            <a:ext cx="381964" cy="473605"/>
+          </a:xfrm>
+          <a:prstGeom prst="downArrow">
+            <a:avLst/>
+          </a:prstGeom>
+          <a:solidFill>
+            <a:schemeClr val="bg1"/>
+          </a:solidFill>
+        </p:spPr>
+        <p:style>
+          <a:lnRef idx="2">
+            <a:schemeClr val="accent1">
+              <a:shade val="50000"/>
+            </a:schemeClr>
+          </a:lnRef>
+          <a:fillRef idx="1">
+            <a:schemeClr val="accent1"/>
+          </a:fillRef>
+          <a:effectRef idx="0">
+            <a:schemeClr val="accent1"/>
+          </a:effectRef>
+          <a:fontRef idx="minor">
+            <a:schemeClr val="lt1"/>
+          </a:fontRef>
+        </p:style>
+        <p:txBody>
+          <a:bodyPr rtlCol="0" anchor="ctr"/>
+          <a:lstStyle/>
+          <a:p>
+            <a:pPr algn="ctr"/>
+            <a:endParaRPr lang="en-US"/>
+          </a:p>
+        </p:txBody>
+      </p:sp>
+      <p:sp>
+        <p:nvSpPr>
+          <p:cNvPr id="5" name="Diamond 4">
+            <a:extLst>
+              <a:ext uri="{FF2B5EF4-FFF2-40B4-BE49-F238E27FC236}">
+                <a16:creationId xmlns:a16="http://schemas.microsoft.com/office/drawing/2014/main" id="{8291E682-7B0C-964B-BB00-E9FC1E6B5E72}"/>
+              </a:ext>
+            </a:extLst>
+          </p:cNvPr>
+          <p:cNvSpPr/>
+          <p:nvPr/>
+        </p:nvSpPr>
+        <p:spPr>
+          <a:xfrm>
+            <a:off x="4247176" y="4574204"/>
+            <a:ext cx="2423155" cy="756806"/>
+          </a:xfrm>
+          <a:prstGeom prst="diamond">
+            <a:avLst/>
+          </a:prstGeom>
+        </p:spPr>
+        <p:style>
+          <a:lnRef idx="2">
+            <a:schemeClr val="accent1">
+              <a:shade val="50000"/>
+            </a:schemeClr>
+          </a:lnRef>
+          <a:fillRef idx="1">
+            <a:schemeClr val="accent1"/>
+          </a:fillRef>
+          <a:effectRef idx="0">
+            <a:schemeClr val="accent1"/>
+          </a:effectRef>
+          <a:fontRef idx="minor">
+            <a:schemeClr val="lt1"/>
+          </a:fontRef>
+        </p:style>
+        <p:txBody>
+          <a:bodyPr rtlCol="0" anchor="ctr"/>
+          <a:lstStyle/>
+          <a:p>
+            <a:pPr algn="ctr"/>
+            <a:r>
+              <a:rPr lang="en-US"/>
+              <a:t>Layer 1 of GRU</a:t>
+            </a:r>
+          </a:p>
+        </p:txBody>
+      </p:sp>
+      <p:sp>
+        <p:nvSpPr>
+          <p:cNvPr id="6" name="Rectangle 5">
+            <a:extLst>
+              <a:ext uri="{FF2B5EF4-FFF2-40B4-BE49-F238E27FC236}">
+                <a16:creationId xmlns:a16="http://schemas.microsoft.com/office/drawing/2014/main" id="{44C41CE1-A288-E847-94B0-9D08AF9CCF38}"/>
+              </a:ext>
+            </a:extLst>
+          </p:cNvPr>
+          <p:cNvSpPr/>
+          <p:nvPr/>
+        </p:nvSpPr>
+        <p:spPr>
+          <a:xfrm>
+            <a:off x="4435459" y="5347342"/>
+            <a:ext cx="1987475" cy="299327"/>
+          </a:xfrm>
+          <a:prstGeom prst="rect">
+            <a:avLst/>
+          </a:prstGeom>
+          <a:solidFill>
+            <a:schemeClr val="accent5">
+              <a:lumMod val="40000"/>
+              <a:lumOff val="60000"/>
+            </a:schemeClr>
+          </a:solidFill>
+        </p:spPr>
+        <p:style>
+          <a:lnRef idx="2">
+            <a:schemeClr val="accent5">
+              <a:shade val="50000"/>
+            </a:schemeClr>
+          </a:lnRef>
+          <a:fillRef idx="1">
+            <a:schemeClr val="accent5"/>
+          </a:fillRef>
+          <a:effectRef idx="0">
+            <a:schemeClr val="accent5"/>
+          </a:effectRef>
+          <a:fontRef idx="minor">
+            <a:schemeClr val="lt1"/>
+          </a:fontRef>
+        </p:style>
+        <p:txBody>
+          <a:bodyPr rtlCol="0" anchor="ctr"/>
+          <a:lstStyle/>
+          <a:p>
+            <a:pPr algn="ctr"/>
+            <a:r>
+              <a:rPr lang="en-US" sz="1600">
+                <a:solidFill>
+                  <a:schemeClr val="tx1"/>
+                </a:solidFill>
+              </a:rPr>
+              <a:t>Hidden state 1</a:t>
+            </a:r>
+          </a:p>
+        </p:txBody>
+      </p:sp>
+      <p:sp>
+        <p:nvSpPr>
+          <p:cNvPr id="7" name="Diamond 6">
+            <a:extLst>
+              <a:ext uri="{FF2B5EF4-FFF2-40B4-BE49-F238E27FC236}">
+                <a16:creationId xmlns:a16="http://schemas.microsoft.com/office/drawing/2014/main" id="{F704BE73-4914-7A44-84D6-FB34338AC5C2}"/>
+              </a:ext>
+            </a:extLst>
+          </p:cNvPr>
+          <p:cNvSpPr/>
+          <p:nvPr/>
+        </p:nvSpPr>
+        <p:spPr>
+          <a:xfrm>
+            <a:off x="4246562" y="7573577"/>
+            <a:ext cx="2423155" cy="835996"/>
+          </a:xfrm>
+          <a:prstGeom prst="diamond">
+            <a:avLst/>
+          </a:prstGeom>
+        </p:spPr>
+        <p:style>
+          <a:lnRef idx="2">
+            <a:schemeClr val="accent1">
+              <a:shade val="50000"/>
+            </a:schemeClr>
+          </a:lnRef>
+          <a:fillRef idx="1">
+            <a:schemeClr val="accent1"/>
+          </a:fillRef>
+          <a:effectRef idx="0">
+            <a:schemeClr val="accent1"/>
+          </a:effectRef>
+          <a:fontRef idx="minor">
+            <a:schemeClr val="lt1"/>
+          </a:fontRef>
+        </p:style>
+        <p:txBody>
+          <a:bodyPr wrap="none" lIns="36000" rIns="36000" rtlCol="0" anchor="ctr"/>
+          <a:lstStyle/>
+          <a:p>
+            <a:pPr algn="ctr"/>
+            <a:r>
+              <a:rPr lang="en-GB"/>
+              <a:t>FF-NN:</a:t>
+            </a:r>
+            <a:br>
+              <a:rPr lang="en-GB"/>
+            </a:br>
+            <a:r>
+              <a:rPr lang="en-GB"/>
+              <a:t>linear2global</a:t>
+            </a:r>
+            <a:endParaRPr lang="en-US"/>
+          </a:p>
+        </p:txBody>
+      </p:sp>
+      <p:sp>
+        <p:nvSpPr>
+          <p:cNvPr id="8" name="Down Arrow 7">
+            <a:extLst>
+              <a:ext uri="{FF2B5EF4-FFF2-40B4-BE49-F238E27FC236}">
+                <a16:creationId xmlns:a16="http://schemas.microsoft.com/office/drawing/2014/main" id="{6C75A9D1-6CA4-104B-B26C-A83BDFF58C7F}"/>
+              </a:ext>
+            </a:extLst>
+          </p:cNvPr>
+          <p:cNvSpPr/>
+          <p:nvPr/>
+        </p:nvSpPr>
+        <p:spPr>
+          <a:xfrm>
+            <a:off x="5289343" y="6737582"/>
+            <a:ext cx="381964" cy="835995"/>
+          </a:xfrm>
+          <a:prstGeom prst="downArrow">
+            <a:avLst/>
+          </a:prstGeom>
+          <a:solidFill>
+            <a:schemeClr val="bg1"/>
+          </a:solidFill>
+        </p:spPr>
+        <p:style>
+          <a:lnRef idx="2">
+            <a:schemeClr val="accent1">
+              <a:shade val="50000"/>
+            </a:schemeClr>
+          </a:lnRef>
+          <a:fillRef idx="1">
+            <a:schemeClr val="accent1"/>
+          </a:fillRef>
+          <a:effectRef idx="0">
+            <a:schemeClr val="accent1"/>
+          </a:effectRef>
+          <a:fontRef idx="minor">
+            <a:schemeClr val="lt1"/>
+          </a:fontRef>
+        </p:style>
+        <p:txBody>
+          <a:bodyPr rtlCol="0" anchor="ctr"/>
+          <a:lstStyle/>
+          <a:p>
+            <a:pPr algn="ctr"/>
+            <a:endParaRPr lang="en-US"/>
+          </a:p>
+        </p:txBody>
+      </p:sp>
+      <p:cxnSp>
+        <p:nvCxnSpPr>
+          <p:cNvPr id="9" name="Straight Arrow Connector 8">
+            <a:extLst>
+              <a:ext uri="{FF2B5EF4-FFF2-40B4-BE49-F238E27FC236}">
+                <a16:creationId xmlns:a16="http://schemas.microsoft.com/office/drawing/2014/main" id="{521343C1-64A6-ED4B-A577-85AAB09B8863}"/>
+              </a:ext>
+            </a:extLst>
+          </p:cNvPr>
+          <p:cNvCxnSpPr>
+            <a:cxnSpLocks/>
+            <a:stCxn id="6" idx="3"/>
+          </p:cNvCxnSpPr>
+          <p:nvPr/>
+        </p:nvCxnSpPr>
+        <p:spPr>
+          <a:xfrm>
+            <a:off x="6422934" y="5497006"/>
+            <a:ext cx="1374996" cy="344069"/>
+          </a:xfrm>
+          <a:prstGeom prst="straightConnector1">
+            <a:avLst/>
+          </a:prstGeom>
+          <a:ln>
+            <a:tailEnd type="triangle"/>
+          </a:ln>
+        </p:spPr>
+        <p:style>
+          <a:lnRef idx="1">
+            <a:schemeClr val="dk1"/>
+          </a:lnRef>
+          <a:fillRef idx="0">
+            <a:schemeClr val="dk1"/>
+          </a:fillRef>
+          <a:effectRef idx="0">
+            <a:schemeClr val="dk1"/>
+          </a:effectRef>
+          <a:fontRef idx="minor">
+            <a:schemeClr val="tx1"/>
+          </a:fontRef>
+        </p:style>
+      </p:cxnSp>
+      <p:sp>
+        <p:nvSpPr>
+          <p:cNvPr id="10" name="Diamond 9">
+            <a:extLst>
+              <a:ext uri="{FF2B5EF4-FFF2-40B4-BE49-F238E27FC236}">
+                <a16:creationId xmlns:a16="http://schemas.microsoft.com/office/drawing/2014/main" id="{2477C978-998B-F64C-B520-674745B74FE1}"/>
+              </a:ext>
+            </a:extLst>
+          </p:cNvPr>
+          <p:cNvSpPr/>
+          <p:nvPr/>
+        </p:nvSpPr>
+        <p:spPr>
+          <a:xfrm>
+            <a:off x="7409960" y="7571435"/>
+            <a:ext cx="2423155" cy="835996"/>
+          </a:xfrm>
+          <a:prstGeom prst="diamond">
+            <a:avLst/>
+          </a:prstGeom>
+        </p:spPr>
+        <p:style>
+          <a:lnRef idx="2">
+            <a:schemeClr val="accent1">
+              <a:shade val="50000"/>
+            </a:schemeClr>
+          </a:lnRef>
+          <a:fillRef idx="1">
+            <a:schemeClr val="accent1"/>
+          </a:fillRef>
+          <a:effectRef idx="0">
+            <a:schemeClr val="accent1"/>
+          </a:effectRef>
+          <a:fontRef idx="minor">
+            <a:schemeClr val="lt1"/>
+          </a:fontRef>
+        </p:style>
+        <p:txBody>
+          <a:bodyPr wrap="none" lIns="36000" rIns="36000" rtlCol="0" anchor="ctr"/>
+          <a:lstStyle/>
+          <a:p>
+            <a:pPr algn="ctr"/>
+            <a:r>
+              <a:rPr lang="en-GB"/>
+              <a:t>FF-NN:</a:t>
+            </a:r>
+            <a:br>
+              <a:rPr lang="en-GB"/>
+            </a:br>
+            <a:r>
+              <a:rPr lang="en-GB"/>
+              <a:t>linear2senses</a:t>
+            </a:r>
+            <a:endParaRPr lang="en-US"/>
+          </a:p>
+        </p:txBody>
+      </p:sp>
+      <p:sp>
+        <p:nvSpPr>
+          <p:cNvPr id="11" name="Down Arrow 10">
+            <a:extLst>
+              <a:ext uri="{FF2B5EF4-FFF2-40B4-BE49-F238E27FC236}">
+                <a16:creationId xmlns:a16="http://schemas.microsoft.com/office/drawing/2014/main" id="{F12928D0-A34C-E547-A76C-1A40E294DD9B}"/>
+              </a:ext>
+            </a:extLst>
+          </p:cNvPr>
+          <p:cNvSpPr/>
+          <p:nvPr/>
+        </p:nvSpPr>
+        <p:spPr>
+          <a:xfrm>
+            <a:off x="8422106" y="6716160"/>
+            <a:ext cx="381964" cy="868992"/>
+          </a:xfrm>
+          <a:prstGeom prst="downArrow">
+            <a:avLst/>
+          </a:prstGeom>
+          <a:solidFill>
+            <a:schemeClr val="bg1"/>
+          </a:solidFill>
+        </p:spPr>
+        <p:style>
+          <a:lnRef idx="2">
+            <a:schemeClr val="accent1">
+              <a:shade val="50000"/>
+            </a:schemeClr>
+          </a:lnRef>
+          <a:fillRef idx="1">
+            <a:schemeClr val="accent1"/>
+          </a:fillRef>
+          <a:effectRef idx="0">
+            <a:schemeClr val="accent1"/>
+          </a:effectRef>
+          <a:fontRef idx="minor">
+            <a:schemeClr val="lt1"/>
+          </a:fontRef>
+        </p:style>
+        <p:txBody>
+          <a:bodyPr rtlCol="0" anchor="ctr"/>
+          <a:lstStyle/>
+          <a:p>
+            <a:pPr algn="ctr"/>
+            <a:endParaRPr lang="en-US"/>
+          </a:p>
+        </p:txBody>
+      </p:sp>
+      <p:sp>
+        <p:nvSpPr>
+          <p:cNvPr id="12" name="Diamond 11">
+            <a:extLst>
+              <a:ext uri="{FF2B5EF4-FFF2-40B4-BE49-F238E27FC236}">
+                <a16:creationId xmlns:a16="http://schemas.microsoft.com/office/drawing/2014/main" id="{B0547D60-0157-A94A-AFD8-EEE9E51D3C06}"/>
+              </a:ext>
+            </a:extLst>
+          </p:cNvPr>
+          <p:cNvSpPr/>
+          <p:nvPr/>
+        </p:nvSpPr>
+        <p:spPr>
+          <a:xfrm>
+            <a:off x="4257267" y="5652680"/>
+            <a:ext cx="2423155" cy="756806"/>
+          </a:xfrm>
+          <a:prstGeom prst="diamond">
+            <a:avLst/>
+          </a:prstGeom>
+        </p:spPr>
+        <p:style>
+          <a:lnRef idx="2">
+            <a:schemeClr val="accent1">
+              <a:shade val="50000"/>
+            </a:schemeClr>
+          </a:lnRef>
+          <a:fillRef idx="1">
+            <a:schemeClr val="accent1"/>
+          </a:fillRef>
+          <a:effectRef idx="0">
+            <a:schemeClr val="accent1"/>
+          </a:effectRef>
+          <a:fontRef idx="minor">
+            <a:schemeClr val="lt1"/>
+          </a:fontRef>
+        </p:style>
+        <p:txBody>
+          <a:bodyPr rtlCol="0" anchor="ctr"/>
+          <a:lstStyle/>
+          <a:p>
+            <a:pPr algn="ctr"/>
+            <a:r>
+              <a:rPr lang="en-US"/>
+              <a:t>Layer 2 of GRU</a:t>
+            </a:r>
+          </a:p>
+        </p:txBody>
+      </p:sp>
+      <p:sp>
+        <p:nvSpPr>
+          <p:cNvPr id="13" name="Rectangle 12">
+            <a:extLst>
+              <a:ext uri="{FF2B5EF4-FFF2-40B4-BE49-F238E27FC236}">
+                <a16:creationId xmlns:a16="http://schemas.microsoft.com/office/drawing/2014/main" id="{6847FF22-6F21-5340-BD44-5331D7EC51DF}"/>
+              </a:ext>
+            </a:extLst>
+          </p:cNvPr>
+          <p:cNvSpPr/>
+          <p:nvPr/>
+        </p:nvSpPr>
+        <p:spPr>
+          <a:xfrm>
+            <a:off x="4435458" y="6428765"/>
+            <a:ext cx="1987475" cy="299327"/>
+          </a:xfrm>
+          <a:prstGeom prst="rect">
+            <a:avLst/>
+          </a:prstGeom>
+          <a:solidFill>
+            <a:schemeClr val="accent5">
+              <a:lumMod val="40000"/>
+              <a:lumOff val="60000"/>
+            </a:schemeClr>
+          </a:solidFill>
+        </p:spPr>
+        <p:style>
+          <a:lnRef idx="2">
+            <a:schemeClr val="accent5">
+              <a:shade val="50000"/>
+            </a:schemeClr>
+          </a:lnRef>
+          <a:fillRef idx="1">
+            <a:schemeClr val="accent5"/>
+          </a:fillRef>
+          <a:effectRef idx="0">
+            <a:schemeClr val="accent5"/>
+          </a:effectRef>
+          <a:fontRef idx="minor">
+            <a:schemeClr val="lt1"/>
+          </a:fontRef>
+        </p:style>
+        <p:txBody>
+          <a:bodyPr rtlCol="0" anchor="ctr"/>
+          <a:lstStyle/>
+          <a:p>
+            <a:pPr algn="ctr"/>
+            <a:r>
+              <a:rPr lang="en-US" sz="1600">
+                <a:solidFill>
+                  <a:schemeClr val="tx1"/>
+                </a:solidFill>
+              </a:rPr>
+              <a:t>Hidden state 2</a:t>
+            </a:r>
+          </a:p>
+        </p:txBody>
+      </p:sp>
+      <p:sp>
+        <p:nvSpPr>
+          <p:cNvPr id="14" name="Diamond 13">
+            <a:extLst>
+              <a:ext uri="{FF2B5EF4-FFF2-40B4-BE49-F238E27FC236}">
+                <a16:creationId xmlns:a16="http://schemas.microsoft.com/office/drawing/2014/main" id="{C5EE5228-EF5D-2F49-A083-7ED7067E87C3}"/>
+              </a:ext>
+            </a:extLst>
+          </p:cNvPr>
+          <p:cNvSpPr/>
+          <p:nvPr/>
+        </p:nvSpPr>
+        <p:spPr>
+          <a:xfrm>
+            <a:off x="7401511" y="5637703"/>
+            <a:ext cx="2423155" cy="756806"/>
+          </a:xfrm>
+          <a:prstGeom prst="diamond">
+            <a:avLst/>
+          </a:prstGeom>
+        </p:spPr>
+        <p:style>
+          <a:lnRef idx="2">
+            <a:schemeClr val="accent1">
+              <a:shade val="50000"/>
+            </a:schemeClr>
+          </a:lnRef>
+          <a:fillRef idx="1">
+            <a:schemeClr val="accent1"/>
+          </a:fillRef>
+          <a:effectRef idx="0">
+            <a:schemeClr val="accent1"/>
+          </a:effectRef>
+          <a:fontRef idx="minor">
+            <a:schemeClr val="lt1"/>
+          </a:fontRef>
+        </p:style>
+        <p:txBody>
+          <a:bodyPr rtlCol="0" anchor="ctr"/>
+          <a:lstStyle/>
+          <a:p>
+            <a:pPr algn="ctr"/>
+            <a:r>
+              <a:rPr lang="en-US"/>
+              <a:t>Layer 2b of GRU</a:t>
+            </a:r>
+          </a:p>
+        </p:txBody>
+      </p:sp>
+      <p:sp>
+        <p:nvSpPr>
+          <p:cNvPr id="15" name="Rectangle 14">
+            <a:extLst>
+              <a:ext uri="{FF2B5EF4-FFF2-40B4-BE49-F238E27FC236}">
+                <a16:creationId xmlns:a16="http://schemas.microsoft.com/office/drawing/2014/main" id="{22CB8D79-60B5-7A44-A644-2E1603902D2F}"/>
+              </a:ext>
+            </a:extLst>
+          </p:cNvPr>
+          <p:cNvSpPr/>
+          <p:nvPr/>
+        </p:nvSpPr>
+        <p:spPr>
+          <a:xfrm>
+            <a:off x="7620090" y="6401675"/>
+            <a:ext cx="1987475" cy="299327"/>
+          </a:xfrm>
+          <a:prstGeom prst="rect">
+            <a:avLst/>
+          </a:prstGeom>
+          <a:solidFill>
+            <a:schemeClr val="accent5">
+              <a:lumMod val="40000"/>
+              <a:lumOff val="60000"/>
+            </a:schemeClr>
+          </a:solidFill>
+        </p:spPr>
+        <p:style>
+          <a:lnRef idx="2">
+            <a:schemeClr val="accent5">
+              <a:shade val="50000"/>
+            </a:schemeClr>
+          </a:lnRef>
+          <a:fillRef idx="1">
+            <a:schemeClr val="accent5"/>
+          </a:fillRef>
+          <a:effectRef idx="0">
+            <a:schemeClr val="accent5"/>
+          </a:effectRef>
+          <a:fontRef idx="minor">
+            <a:schemeClr val="lt1"/>
+          </a:fontRef>
+        </p:style>
+        <p:txBody>
+          <a:bodyPr rtlCol="0" anchor="ctr"/>
+          <a:lstStyle/>
+          <a:p>
+            <a:pPr algn="ctr"/>
+            <a:r>
+              <a:rPr lang="en-US" sz="1600">
+                <a:solidFill>
+                  <a:schemeClr val="tx1"/>
+                </a:solidFill>
+              </a:rPr>
+              <a:t>Hidden state 2b</a:t>
+            </a:r>
+          </a:p>
+        </p:txBody>
+      </p:sp>
+    </p:spTree>
+    <p:extLst>
+      <p:ext uri="{BB962C8B-B14F-4D97-AF65-F5344CB8AC3E}">
+        <p14:creationId xmlns:p14="http://schemas.microsoft.com/office/powerpoint/2010/main" val="3454238088"/>
+      </p:ext>
+    </p:extLst>
+  </p:cSld>
+  <p:clrMapOvr>
+    <a:masterClrMapping/>
+  </p:clrMapOvr>
+</p:sld>
+</file>
+
+<file path=ppt/slides/slide4.xml><?xml version="1.0" encoding="utf-8"?>
 <p:sld xmlns:a="http://schemas.openxmlformats.org/drawingml/2006/main" xmlns:r="http://schemas.openxmlformats.org/officeDocument/2006/relationships" xmlns:p="http://schemas.openxmlformats.org/presentationml/2006/main">
   <p:cSld>
     <p:spTree>

</xml_diff>

<commit_message>
=Building the self-attention mechanism for the senses...
Former-commit-id: 1203d6232cc69fd7b6a2c9947dc5271e6f892c63 [formerly 1c71a86dc2b2b6c19c205bcf8f8f5a183f377653]
Former-commit-id: 73541a1a111dd15addab7cafda6aa6fd10c43a91
Former-commit-id: 451b877989604847c31b05d413fffe64dbe3a09d
</commit_message>
<xml_diff>
--- a/Media/SenseArchitecture.pptx
+++ b/Media/SenseArchitecture.pptx
@@ -2964,6 +2964,55 @@
       </p:grpSpPr>
       <p:sp>
         <p:nvSpPr>
+          <p:cNvPr id="91" name="Down Arrow 90">
+            <a:extLst>
+              <a:ext uri="{FF2B5EF4-FFF2-40B4-BE49-F238E27FC236}">
+                <a16:creationId xmlns:a16="http://schemas.microsoft.com/office/drawing/2014/main" id="{302CAB8D-38F7-5847-8966-4A1B4B63D0C4}"/>
+              </a:ext>
+            </a:extLst>
+          </p:cNvPr>
+          <p:cNvSpPr/>
+          <p:nvPr/>
+        </p:nvSpPr>
+        <p:spPr>
+          <a:xfrm rot="20063934">
+            <a:off x="2243273" y="1355207"/>
+            <a:ext cx="381964" cy="2464001"/>
+          </a:xfrm>
+          <a:prstGeom prst="downArrow">
+            <a:avLst/>
+          </a:prstGeom>
+          <a:solidFill>
+            <a:schemeClr val="bg1"/>
+          </a:solidFill>
+        </p:spPr>
+        <p:style>
+          <a:lnRef idx="2">
+            <a:schemeClr val="accent1">
+              <a:shade val="50000"/>
+            </a:schemeClr>
+          </a:lnRef>
+          <a:fillRef idx="1">
+            <a:schemeClr val="accent1"/>
+          </a:fillRef>
+          <a:effectRef idx="0">
+            <a:schemeClr val="accent1"/>
+          </a:effectRef>
+          <a:fontRef idx="minor">
+            <a:schemeClr val="lt1"/>
+          </a:fontRef>
+        </p:style>
+        <p:txBody>
+          <a:bodyPr rtlCol="0" anchor="ctr"/>
+          <a:lstStyle/>
+          <a:p>
+            <a:pPr algn="ctr"/>
+            <a:endParaRPr lang="en-US"/>
+          </a:p>
+        </p:txBody>
+      </p:sp>
+      <p:sp>
+        <p:nvSpPr>
           <p:cNvPr id="57" name="Rectangle 56">
             <a:extLst>
               <a:ext uri="{FF2B5EF4-FFF2-40B4-BE49-F238E27FC236}">
@@ -4466,20 +4515,508 @@
       </p:sp>
       <p:sp>
         <p:nvSpPr>
-          <p:cNvPr id="222" name="Rectangle 221">
-            <a:extLst>
-              <a:ext uri="{FF2B5EF4-FFF2-40B4-BE49-F238E27FC236}">
-                <a16:creationId xmlns:a16="http://schemas.microsoft.com/office/drawing/2014/main" id="{2E1DD145-7CA2-7246-A594-BE42D4917926}"/>
-              </a:ext>
-            </a:extLst>
-          </p:cNvPr>
-          <p:cNvSpPr/>
-          <p:nvPr/>
-        </p:nvSpPr>
-        <p:spPr>
-          <a:xfrm>
-            <a:off x="4502181" y="3526197"/>
-            <a:ext cx="1987475" cy="645277"/>
+          <p:cNvPr id="223" name="Down Arrow 222">
+            <a:extLst>
+              <a:ext uri="{FF2B5EF4-FFF2-40B4-BE49-F238E27FC236}">
+                <a16:creationId xmlns:a16="http://schemas.microsoft.com/office/drawing/2014/main" id="{B90D40EA-4A66-1E4B-BF12-5C820A66DDAB}"/>
+              </a:ext>
+            </a:extLst>
+          </p:cNvPr>
+          <p:cNvSpPr/>
+          <p:nvPr/>
+        </p:nvSpPr>
+        <p:spPr>
+          <a:xfrm>
+            <a:off x="5293360" y="3042761"/>
+            <a:ext cx="381964" cy="637651"/>
+          </a:xfrm>
+          <a:prstGeom prst="downArrow">
+            <a:avLst/>
+          </a:prstGeom>
+          <a:solidFill>
+            <a:schemeClr val="bg1"/>
+          </a:solidFill>
+        </p:spPr>
+        <p:style>
+          <a:lnRef idx="2">
+            <a:schemeClr val="accent1">
+              <a:shade val="50000"/>
+            </a:schemeClr>
+          </a:lnRef>
+          <a:fillRef idx="1">
+            <a:schemeClr val="accent1"/>
+          </a:fillRef>
+          <a:effectRef idx="0">
+            <a:schemeClr val="accent1"/>
+          </a:effectRef>
+          <a:fontRef idx="minor">
+            <a:schemeClr val="lt1"/>
+          </a:fontRef>
+        </p:style>
+        <p:txBody>
+          <a:bodyPr rtlCol="0" anchor="ctr"/>
+          <a:lstStyle/>
+          <a:p>
+            <a:pPr algn="ctr"/>
+            <a:endParaRPr lang="en-US"/>
+          </a:p>
+        </p:txBody>
+      </p:sp>
+      <p:sp>
+        <p:nvSpPr>
+          <p:cNvPr id="224" name="Hexagon 223">
+            <a:extLst>
+              <a:ext uri="{FF2B5EF4-FFF2-40B4-BE49-F238E27FC236}">
+                <a16:creationId xmlns:a16="http://schemas.microsoft.com/office/drawing/2014/main" id="{2777E972-23C8-FA43-9165-EAD57AA551C8}"/>
+              </a:ext>
+            </a:extLst>
+          </p:cNvPr>
+          <p:cNvSpPr/>
+          <p:nvPr/>
+        </p:nvSpPr>
+        <p:spPr>
+          <a:xfrm>
+            <a:off x="9880105" y="849083"/>
+            <a:ext cx="831749" cy="386178"/>
+          </a:xfrm>
+          <a:prstGeom prst="hexagon">
+            <a:avLst/>
+          </a:prstGeom>
+        </p:spPr>
+        <p:style>
+          <a:lnRef idx="1">
+            <a:schemeClr val="accent6"/>
+          </a:lnRef>
+          <a:fillRef idx="2">
+            <a:schemeClr val="accent6"/>
+          </a:fillRef>
+          <a:effectRef idx="1">
+            <a:schemeClr val="accent6"/>
+          </a:effectRef>
+          <a:fontRef idx="minor">
+            <a:schemeClr val="dk1"/>
+          </a:fontRef>
+        </p:style>
+        <p:txBody>
+          <a:bodyPr rtlCol="0" anchor="ctr"/>
+          <a:lstStyle/>
+          <a:p>
+            <a:pPr algn="ctr"/>
+            <a:r>
+              <a:rPr lang="en-US" sz="1400" b="1"/>
+              <a:t>Move.v.2</a:t>
+            </a:r>
+          </a:p>
+        </p:txBody>
+      </p:sp>
+      <p:sp>
+        <p:nvSpPr>
+          <p:cNvPr id="225" name="Oval 224">
+            <a:extLst>
+              <a:ext uri="{FF2B5EF4-FFF2-40B4-BE49-F238E27FC236}">
+                <a16:creationId xmlns:a16="http://schemas.microsoft.com/office/drawing/2014/main" id="{1B3D2C30-97B2-D740-B26C-AF6247189B3C}"/>
+              </a:ext>
+            </a:extLst>
+          </p:cNvPr>
+          <p:cNvSpPr/>
+          <p:nvPr/>
+        </p:nvSpPr>
+        <p:spPr>
+          <a:xfrm>
+            <a:off x="10922367" y="646330"/>
+            <a:ext cx="226868" cy="239229"/>
+          </a:xfrm>
+          <a:prstGeom prst="ellipse">
+            <a:avLst/>
+          </a:prstGeom>
+        </p:spPr>
+        <p:style>
+          <a:lnRef idx="1">
+            <a:schemeClr val="accent5"/>
+          </a:lnRef>
+          <a:fillRef idx="2">
+            <a:schemeClr val="accent5"/>
+          </a:fillRef>
+          <a:effectRef idx="1">
+            <a:schemeClr val="accent5"/>
+          </a:effectRef>
+          <a:fontRef idx="minor">
+            <a:schemeClr val="dk1"/>
+          </a:fontRef>
+        </p:style>
+        <p:txBody>
+          <a:bodyPr rtlCol="0" anchor="ctr"/>
+          <a:lstStyle/>
+          <a:p>
+            <a:pPr algn="ctr"/>
+            <a:r>
+              <a:rPr lang="en-US" sz="1400"/>
+              <a:t>d</a:t>
+            </a:r>
+          </a:p>
+        </p:txBody>
+      </p:sp>
+      <p:sp>
+        <p:nvSpPr>
+          <p:cNvPr id="226" name="Oval 225">
+            <a:extLst>
+              <a:ext uri="{FF2B5EF4-FFF2-40B4-BE49-F238E27FC236}">
+                <a16:creationId xmlns:a16="http://schemas.microsoft.com/office/drawing/2014/main" id="{2B3EBBBE-E05F-DC43-B2C1-D85F890C9770}"/>
+              </a:ext>
+            </a:extLst>
+          </p:cNvPr>
+          <p:cNvSpPr/>
+          <p:nvPr/>
+        </p:nvSpPr>
+        <p:spPr>
+          <a:xfrm>
+            <a:off x="11259858" y="656122"/>
+            <a:ext cx="226868" cy="239229"/>
+          </a:xfrm>
+          <a:prstGeom prst="ellipse">
+            <a:avLst/>
+          </a:prstGeom>
+        </p:spPr>
+        <p:style>
+          <a:lnRef idx="1">
+            <a:schemeClr val="accent5"/>
+          </a:lnRef>
+          <a:fillRef idx="2">
+            <a:schemeClr val="accent5"/>
+          </a:fillRef>
+          <a:effectRef idx="1">
+            <a:schemeClr val="accent5"/>
+          </a:effectRef>
+          <a:fontRef idx="minor">
+            <a:schemeClr val="dk1"/>
+          </a:fontRef>
+        </p:style>
+        <p:txBody>
+          <a:bodyPr rtlCol="0" anchor="ctr"/>
+          <a:lstStyle/>
+          <a:p>
+            <a:pPr algn="ctr"/>
+            <a:endParaRPr lang="en-US"/>
+          </a:p>
+        </p:txBody>
+      </p:sp>
+      <p:sp>
+        <p:nvSpPr>
+          <p:cNvPr id="227" name="Oval 226">
+            <a:extLst>
+              <a:ext uri="{FF2B5EF4-FFF2-40B4-BE49-F238E27FC236}">
+                <a16:creationId xmlns:a16="http://schemas.microsoft.com/office/drawing/2014/main" id="{12F2E03F-34BA-A144-847C-CA8D2059B613}"/>
+              </a:ext>
+            </a:extLst>
+          </p:cNvPr>
+          <p:cNvSpPr/>
+          <p:nvPr/>
+        </p:nvSpPr>
+        <p:spPr>
+          <a:xfrm>
+            <a:off x="10893554" y="1077520"/>
+            <a:ext cx="196753" cy="194887"/>
+          </a:xfrm>
+          <a:prstGeom prst="ellipse">
+            <a:avLst/>
+          </a:prstGeom>
+        </p:spPr>
+        <p:style>
+          <a:lnRef idx="1">
+            <a:schemeClr val="accent5"/>
+          </a:lnRef>
+          <a:fillRef idx="3">
+            <a:schemeClr val="accent5"/>
+          </a:fillRef>
+          <a:effectRef idx="2">
+            <a:schemeClr val="accent5"/>
+          </a:effectRef>
+          <a:fontRef idx="minor">
+            <a:schemeClr val="lt1"/>
+          </a:fontRef>
+        </p:style>
+        <p:txBody>
+          <a:bodyPr rtlCol="0" anchor="ctr"/>
+          <a:lstStyle/>
+          <a:p>
+            <a:pPr algn="ctr"/>
+            <a:r>
+              <a:rPr lang="en-US" sz="1400"/>
+              <a:t>e</a:t>
+            </a:r>
+          </a:p>
+        </p:txBody>
+      </p:sp>
+      <p:sp>
+        <p:nvSpPr>
+          <p:cNvPr id="228" name="Oval 227">
+            <a:extLst>
+              <a:ext uri="{FF2B5EF4-FFF2-40B4-BE49-F238E27FC236}">
+                <a16:creationId xmlns:a16="http://schemas.microsoft.com/office/drawing/2014/main" id="{63E4CE92-87A7-5545-9173-2A9BEF4C0373}"/>
+              </a:ext>
+            </a:extLst>
+          </p:cNvPr>
+          <p:cNvSpPr/>
+          <p:nvPr/>
+        </p:nvSpPr>
+        <p:spPr>
+          <a:xfrm>
+            <a:off x="11259858" y="1063564"/>
+            <a:ext cx="198642" cy="208172"/>
+          </a:xfrm>
+          <a:prstGeom prst="ellipse">
+            <a:avLst/>
+          </a:prstGeom>
+        </p:spPr>
+        <p:style>
+          <a:lnRef idx="1">
+            <a:schemeClr val="accent5"/>
+          </a:lnRef>
+          <a:fillRef idx="3">
+            <a:schemeClr val="accent5"/>
+          </a:fillRef>
+          <a:effectRef idx="2">
+            <a:schemeClr val="accent5"/>
+          </a:effectRef>
+          <a:fontRef idx="minor">
+            <a:schemeClr val="lt1"/>
+          </a:fontRef>
+        </p:style>
+        <p:txBody>
+          <a:bodyPr rtlCol="0" anchor="ctr"/>
+          <a:lstStyle/>
+          <a:p>
+            <a:pPr algn="ctr"/>
+            <a:endParaRPr lang="en-US"/>
+          </a:p>
+        </p:txBody>
+      </p:sp>
+      <p:cxnSp>
+        <p:nvCxnSpPr>
+          <p:cNvPr id="229" name="Straight Arrow Connector 228">
+            <a:extLst>
+              <a:ext uri="{FF2B5EF4-FFF2-40B4-BE49-F238E27FC236}">
+                <a16:creationId xmlns:a16="http://schemas.microsoft.com/office/drawing/2014/main" id="{68838763-39CE-4041-9C89-F21108F36FED}"/>
+              </a:ext>
+            </a:extLst>
+          </p:cNvPr>
+          <p:cNvCxnSpPr>
+            <a:cxnSpLocks/>
+            <a:stCxn id="225" idx="3"/>
+          </p:cNvCxnSpPr>
+          <p:nvPr/>
+        </p:nvCxnSpPr>
+        <p:spPr>
+          <a:xfrm flipH="1" flipV="1">
+            <a:off x="10609175" y="838292"/>
+            <a:ext cx="346416" cy="12233"/>
+          </a:xfrm>
+          <a:prstGeom prst="straightConnector1">
+            <a:avLst/>
+          </a:prstGeom>
+          <a:ln>
+            <a:tailEnd type="triangle"/>
+          </a:ln>
+        </p:spPr>
+        <p:style>
+          <a:lnRef idx="1">
+            <a:schemeClr val="accent1"/>
+          </a:lnRef>
+          <a:fillRef idx="0">
+            <a:schemeClr val="accent1"/>
+          </a:fillRef>
+          <a:effectRef idx="0">
+            <a:schemeClr val="accent1"/>
+          </a:effectRef>
+          <a:fontRef idx="minor">
+            <a:schemeClr val="tx1"/>
+          </a:fontRef>
+        </p:style>
+      </p:cxnSp>
+      <p:cxnSp>
+        <p:nvCxnSpPr>
+          <p:cNvPr id="230" name="Straight Arrow Connector 229">
+            <a:extLst>
+              <a:ext uri="{FF2B5EF4-FFF2-40B4-BE49-F238E27FC236}">
+                <a16:creationId xmlns:a16="http://schemas.microsoft.com/office/drawing/2014/main" id="{E20C38B8-0422-2748-B844-6A35EE786435}"/>
+              </a:ext>
+            </a:extLst>
+          </p:cNvPr>
+          <p:cNvCxnSpPr>
+            <a:cxnSpLocks/>
+            <a:stCxn id="226" idx="3"/>
+          </p:cNvCxnSpPr>
+          <p:nvPr/>
+        </p:nvCxnSpPr>
+        <p:spPr>
+          <a:xfrm flipH="1" flipV="1">
+            <a:off x="10609176" y="838292"/>
+            <a:ext cx="683907" cy="22025"/>
+          </a:xfrm>
+          <a:prstGeom prst="straightConnector1">
+            <a:avLst/>
+          </a:prstGeom>
+          <a:ln>
+            <a:tailEnd type="triangle"/>
+          </a:ln>
+        </p:spPr>
+        <p:style>
+          <a:lnRef idx="1">
+            <a:schemeClr val="accent1"/>
+          </a:lnRef>
+          <a:fillRef idx="0">
+            <a:schemeClr val="accent1"/>
+          </a:fillRef>
+          <a:effectRef idx="0">
+            <a:schemeClr val="accent1"/>
+          </a:effectRef>
+          <a:fontRef idx="minor">
+            <a:schemeClr val="tx1"/>
+          </a:fontRef>
+        </p:style>
+      </p:cxnSp>
+      <p:cxnSp>
+        <p:nvCxnSpPr>
+          <p:cNvPr id="231" name="Straight Arrow Connector 230">
+            <a:extLst>
+              <a:ext uri="{FF2B5EF4-FFF2-40B4-BE49-F238E27FC236}">
+                <a16:creationId xmlns:a16="http://schemas.microsoft.com/office/drawing/2014/main" id="{86FA59E4-E6C9-5B42-8C55-4FEAEBA14718}"/>
+              </a:ext>
+            </a:extLst>
+          </p:cNvPr>
+          <p:cNvCxnSpPr>
+            <a:cxnSpLocks/>
+            <a:stCxn id="227" idx="1"/>
+          </p:cNvCxnSpPr>
+          <p:nvPr/>
+        </p:nvCxnSpPr>
+        <p:spPr>
+          <a:xfrm flipH="1" flipV="1">
+            <a:off x="10705719" y="1031380"/>
+            <a:ext cx="216648" cy="74680"/>
+          </a:xfrm>
+          <a:prstGeom prst="straightConnector1">
+            <a:avLst/>
+          </a:prstGeom>
+          <a:ln>
+            <a:tailEnd type="triangle"/>
+          </a:ln>
+        </p:spPr>
+        <p:style>
+          <a:lnRef idx="1">
+            <a:schemeClr val="accent1"/>
+          </a:lnRef>
+          <a:fillRef idx="0">
+            <a:schemeClr val="accent1"/>
+          </a:fillRef>
+          <a:effectRef idx="0">
+            <a:schemeClr val="accent1"/>
+          </a:effectRef>
+          <a:fontRef idx="minor">
+            <a:schemeClr val="tx1"/>
+          </a:fontRef>
+        </p:style>
+      </p:cxnSp>
+      <p:cxnSp>
+        <p:nvCxnSpPr>
+          <p:cNvPr id="232" name="Straight Arrow Connector 231">
+            <a:extLst>
+              <a:ext uri="{FF2B5EF4-FFF2-40B4-BE49-F238E27FC236}">
+                <a16:creationId xmlns:a16="http://schemas.microsoft.com/office/drawing/2014/main" id="{A1017439-0FCA-7849-A4DF-70F37FFE81FE}"/>
+              </a:ext>
+            </a:extLst>
+          </p:cNvPr>
+          <p:cNvCxnSpPr>
+            <a:cxnSpLocks/>
+            <a:stCxn id="228" idx="3"/>
+          </p:cNvCxnSpPr>
+          <p:nvPr/>
+        </p:nvCxnSpPr>
+        <p:spPr>
+          <a:xfrm flipH="1" flipV="1">
+            <a:off x="10609176" y="1224470"/>
+            <a:ext cx="679773" cy="16781"/>
+          </a:xfrm>
+          <a:prstGeom prst="straightConnector1">
+            <a:avLst/>
+          </a:prstGeom>
+          <a:ln>
+            <a:tailEnd type="triangle"/>
+          </a:ln>
+        </p:spPr>
+        <p:style>
+          <a:lnRef idx="1">
+            <a:schemeClr val="accent1"/>
+          </a:lnRef>
+          <a:fillRef idx="0">
+            <a:schemeClr val="accent1"/>
+          </a:fillRef>
+          <a:effectRef idx="0">
+            <a:schemeClr val="accent1"/>
+          </a:effectRef>
+          <a:fontRef idx="minor">
+            <a:schemeClr val="tx1"/>
+          </a:fontRef>
+        </p:style>
+      </p:cxnSp>
+      <p:cxnSp>
+        <p:nvCxnSpPr>
+          <p:cNvPr id="233" name="Straight Arrow Connector 232">
+            <a:extLst>
+              <a:ext uri="{FF2B5EF4-FFF2-40B4-BE49-F238E27FC236}">
+                <a16:creationId xmlns:a16="http://schemas.microsoft.com/office/drawing/2014/main" id="{11762662-A11A-0949-84F2-3B49DFDEB360}"/>
+              </a:ext>
+            </a:extLst>
+          </p:cNvPr>
+          <p:cNvCxnSpPr>
+            <a:cxnSpLocks/>
+            <a:stCxn id="225" idx="2"/>
+          </p:cNvCxnSpPr>
+          <p:nvPr/>
+        </p:nvCxnSpPr>
+        <p:spPr>
+          <a:xfrm flipH="1">
+            <a:off x="10609175" y="765945"/>
+            <a:ext cx="313192" cy="72347"/>
+          </a:xfrm>
+          <a:prstGeom prst="straightConnector1">
+            <a:avLst/>
+          </a:prstGeom>
+          <a:ln>
+            <a:tailEnd type="triangle"/>
+          </a:ln>
+        </p:spPr>
+        <p:style>
+          <a:lnRef idx="1">
+            <a:schemeClr val="accent1"/>
+          </a:lnRef>
+          <a:fillRef idx="0">
+            <a:schemeClr val="accent1"/>
+          </a:fillRef>
+          <a:effectRef idx="0">
+            <a:schemeClr val="accent1"/>
+          </a:effectRef>
+          <a:fontRef idx="minor">
+            <a:schemeClr val="tx1"/>
+          </a:fontRef>
+        </p:style>
+      </p:cxnSp>
+      <p:sp>
+        <p:nvSpPr>
+          <p:cNvPr id="234" name="Rectangle 233">
+            <a:extLst>
+              <a:ext uri="{FF2B5EF4-FFF2-40B4-BE49-F238E27FC236}">
+                <a16:creationId xmlns:a16="http://schemas.microsoft.com/office/drawing/2014/main" id="{C617B3BA-87C6-5445-8DFA-3B8D3AB6A878}"/>
+              </a:ext>
+            </a:extLst>
+          </p:cNvPr>
+          <p:cNvSpPr/>
+          <p:nvPr/>
+        </p:nvSpPr>
+        <p:spPr>
+          <a:xfrm>
+            <a:off x="8803716" y="404095"/>
+            <a:ext cx="696864" cy="512923"/>
           </a:xfrm>
           <a:prstGeom prst="rect">
             <a:avLst/>
@@ -4507,7 +5044,405 @@
           <a:p>
             <a:pPr algn="ctr"/>
             <a:r>
+              <a:rPr lang="en-US" sz="1400"/>
+              <a:t>move.</a:t>
+            </a:r>
+            <a:br>
+              <a:rPr lang="en-US" sz="1400"/>
+            </a:br>
+            <a:r>
+              <a:rPr lang="en-US" sz="1400"/>
+              <a:t>global</a:t>
+            </a:r>
+          </a:p>
+        </p:txBody>
+      </p:sp>
+      <p:cxnSp>
+        <p:nvCxnSpPr>
+          <p:cNvPr id="235" name="Straight Arrow Connector 234">
+            <a:extLst>
+              <a:ext uri="{FF2B5EF4-FFF2-40B4-BE49-F238E27FC236}">
+                <a16:creationId xmlns:a16="http://schemas.microsoft.com/office/drawing/2014/main" id="{182B2BBF-6FBA-1145-84C5-0F86E1FDD8D4}"/>
+              </a:ext>
+            </a:extLst>
+          </p:cNvPr>
+          <p:cNvCxnSpPr>
+            <a:cxnSpLocks/>
+            <a:stCxn id="234" idx="3"/>
+          </p:cNvCxnSpPr>
+          <p:nvPr/>
+        </p:nvCxnSpPr>
+        <p:spPr>
+          <a:xfrm>
+            <a:off x="9500580" y="660557"/>
+            <a:ext cx="361562" cy="334125"/>
+          </a:xfrm>
+          <a:prstGeom prst="straightConnector1">
+            <a:avLst/>
+          </a:prstGeom>
+          <a:ln>
+            <a:tailEnd type="triangle"/>
+          </a:ln>
+        </p:spPr>
+        <p:style>
+          <a:lnRef idx="1">
+            <a:schemeClr val="accent1"/>
+          </a:lnRef>
+          <a:fillRef idx="0">
+            <a:schemeClr val="accent1"/>
+          </a:fillRef>
+          <a:effectRef idx="0">
+            <a:schemeClr val="accent1"/>
+          </a:effectRef>
+          <a:fontRef idx="minor">
+            <a:schemeClr val="tx1"/>
+          </a:fontRef>
+        </p:style>
+      </p:cxnSp>
+      <p:sp>
+        <p:nvSpPr>
+          <p:cNvPr id="239" name="Left Bracket 238">
+            <a:extLst>
+              <a:ext uri="{FF2B5EF4-FFF2-40B4-BE49-F238E27FC236}">
+                <a16:creationId xmlns:a16="http://schemas.microsoft.com/office/drawing/2014/main" id="{1CBB1B64-9BE6-E54A-AF79-A12BB63015CA}"/>
+              </a:ext>
+            </a:extLst>
+          </p:cNvPr>
+          <p:cNvSpPr/>
+          <p:nvPr/>
+        </p:nvSpPr>
+        <p:spPr>
+          <a:xfrm rot="-5400000">
+            <a:off x="9725204" y="-165489"/>
+            <a:ext cx="794092" cy="3020996"/>
+          </a:xfrm>
+          <a:prstGeom prst="leftBracket">
+            <a:avLst/>
+          </a:prstGeom>
+          <a:ln w="12700"/>
+        </p:spPr>
+        <p:style>
+          <a:lnRef idx="1">
+            <a:schemeClr val="accent1"/>
+          </a:lnRef>
+          <a:fillRef idx="0">
+            <a:schemeClr val="accent1"/>
+          </a:fillRef>
+          <a:effectRef idx="0">
+            <a:schemeClr val="accent1"/>
+          </a:effectRef>
+          <a:fontRef idx="minor">
+            <a:schemeClr val="tx1"/>
+          </a:fontRef>
+        </p:style>
+        <p:txBody>
+          <a:bodyPr rtlCol="0" anchor="ctr"/>
+          <a:lstStyle/>
+          <a:p>
+            <a:pPr algn="ctr"/>
+            <a:endParaRPr lang="en-US"/>
+          </a:p>
+        </p:txBody>
+      </p:sp>
+      <p:sp>
+        <p:nvSpPr>
+          <p:cNvPr id="240" name="TextBox 239">
+            <a:extLst>
+              <a:ext uri="{FF2B5EF4-FFF2-40B4-BE49-F238E27FC236}">
+                <a16:creationId xmlns:a16="http://schemas.microsoft.com/office/drawing/2014/main" id="{39A53C50-D96B-5C49-8E40-F2A306AE2511}"/>
+              </a:ext>
+            </a:extLst>
+          </p:cNvPr>
+          <p:cNvSpPr txBox="1"/>
+          <p:nvPr/>
+        </p:nvSpPr>
+        <p:spPr>
+          <a:xfrm>
+            <a:off x="9578537" y="1453020"/>
+            <a:ext cx="1137913" cy="338554"/>
+          </a:xfrm>
+          <a:prstGeom prst="rect">
+            <a:avLst/>
+          </a:prstGeom>
+          <a:noFill/>
+        </p:spPr>
+        <p:txBody>
+          <a:bodyPr wrap="square" rtlCol="0">
+            <a:spAutoFit/>
+          </a:bodyPr>
+          <a:lstStyle/>
+          <a:p>
+            <a:r>
+              <a:rPr lang="en-US" sz="1600"/>
+              <a:t>Graph area</a:t>
+            </a:r>
+          </a:p>
+        </p:txBody>
+      </p:sp>
+      <p:sp>
+        <p:nvSpPr>
+          <p:cNvPr id="241" name="Down Arrow 240">
+            <a:extLst>
+              <a:ext uri="{FF2B5EF4-FFF2-40B4-BE49-F238E27FC236}">
+                <a16:creationId xmlns:a16="http://schemas.microsoft.com/office/drawing/2014/main" id="{0D603E07-2E51-CF43-BD73-F94D5DF3ABAD}"/>
+              </a:ext>
+            </a:extLst>
+          </p:cNvPr>
+          <p:cNvSpPr/>
+          <p:nvPr/>
+        </p:nvSpPr>
+        <p:spPr>
+          <a:xfrm>
+            <a:off x="10055940" y="1738782"/>
+            <a:ext cx="381964" cy="473604"/>
+          </a:xfrm>
+          <a:prstGeom prst="downArrow">
+            <a:avLst/>
+          </a:prstGeom>
+          <a:solidFill>
+            <a:schemeClr val="bg1"/>
+          </a:solidFill>
+        </p:spPr>
+        <p:style>
+          <a:lnRef idx="2">
+            <a:schemeClr val="accent1">
+              <a:shade val="50000"/>
+            </a:schemeClr>
+          </a:lnRef>
+          <a:fillRef idx="1">
+            <a:schemeClr val="accent1"/>
+          </a:fillRef>
+          <a:effectRef idx="0">
+            <a:schemeClr val="accent1"/>
+          </a:effectRef>
+          <a:fontRef idx="minor">
+            <a:schemeClr val="lt1"/>
+          </a:fontRef>
+        </p:style>
+        <p:txBody>
+          <a:bodyPr rtlCol="0" anchor="ctr"/>
+          <a:lstStyle/>
+          <a:p>
+            <a:pPr algn="ctr"/>
+            <a:endParaRPr lang="en-US"/>
+          </a:p>
+        </p:txBody>
+      </p:sp>
+      <p:sp>
+        <p:nvSpPr>
+          <p:cNvPr id="242" name="Diamond 241">
+            <a:extLst>
+              <a:ext uri="{FF2B5EF4-FFF2-40B4-BE49-F238E27FC236}">
+                <a16:creationId xmlns:a16="http://schemas.microsoft.com/office/drawing/2014/main" id="{C9EFA4D8-F60E-FC4A-8A68-0742E6108DA5}"/>
+              </a:ext>
+            </a:extLst>
+          </p:cNvPr>
+          <p:cNvSpPr/>
+          <p:nvPr/>
+        </p:nvSpPr>
+        <p:spPr>
+          <a:xfrm>
+            <a:off x="9035346" y="2207722"/>
+            <a:ext cx="2423155" cy="835996"/>
+          </a:xfrm>
+          <a:prstGeom prst="diamond">
+            <a:avLst/>
+          </a:prstGeom>
+        </p:spPr>
+        <p:style>
+          <a:lnRef idx="2">
+            <a:schemeClr val="accent1">
+              <a:shade val="50000"/>
+            </a:schemeClr>
+          </a:lnRef>
+          <a:fillRef idx="1">
+            <a:schemeClr val="accent1"/>
+          </a:fillRef>
+          <a:effectRef idx="0">
+            <a:schemeClr val="accent1"/>
+          </a:effectRef>
+          <a:fontRef idx="minor">
+            <a:schemeClr val="lt1"/>
+          </a:fontRef>
+        </p:style>
+        <p:txBody>
+          <a:bodyPr rtlCol="0" anchor="ctr"/>
+          <a:lstStyle/>
+          <a:p>
+            <a:pPr algn="ctr"/>
+            <a:r>
+              <a:rPr lang="en-US"/>
+              <a:t>GNN 2</a:t>
+            </a:r>
+            <a:br>
+              <a:rPr lang="en-US"/>
+            </a:br>
+            <a:r>
+              <a:rPr lang="en-US"/>
+              <a:t>(e.g. GAT)</a:t>
+            </a:r>
+          </a:p>
+        </p:txBody>
+      </p:sp>
+      <p:sp>
+        <p:nvSpPr>
+          <p:cNvPr id="244" name="Down Arrow 243">
+            <a:extLst>
+              <a:ext uri="{FF2B5EF4-FFF2-40B4-BE49-F238E27FC236}">
+                <a16:creationId xmlns:a16="http://schemas.microsoft.com/office/drawing/2014/main" id="{0DA49BFB-6749-8843-9177-952B3C468E60}"/>
+              </a:ext>
+            </a:extLst>
+          </p:cNvPr>
+          <p:cNvSpPr/>
+          <p:nvPr/>
+        </p:nvSpPr>
+        <p:spPr>
+          <a:xfrm rot="1550679">
+            <a:off x="8699874" y="2601648"/>
+            <a:ext cx="381964" cy="1136502"/>
+          </a:xfrm>
+          <a:prstGeom prst="downArrow">
+            <a:avLst/>
+          </a:prstGeom>
+          <a:solidFill>
+            <a:schemeClr val="bg1"/>
+          </a:solidFill>
+        </p:spPr>
+        <p:style>
+          <a:lnRef idx="2">
+            <a:schemeClr val="accent1">
+              <a:shade val="50000"/>
+            </a:schemeClr>
+          </a:lnRef>
+          <a:fillRef idx="1">
+            <a:schemeClr val="accent1"/>
+          </a:fillRef>
+          <a:effectRef idx="0">
+            <a:schemeClr val="accent1"/>
+          </a:effectRef>
+          <a:fontRef idx="minor">
+            <a:schemeClr val="lt1"/>
+          </a:fontRef>
+        </p:style>
+        <p:txBody>
+          <a:bodyPr rtlCol="0" anchor="ctr"/>
+          <a:lstStyle/>
+          <a:p>
+            <a:pPr algn="ctr"/>
+            <a:endParaRPr lang="en-US"/>
+          </a:p>
+        </p:txBody>
+      </p:sp>
+      <p:sp>
+        <p:nvSpPr>
+          <p:cNvPr id="246" name="Rectangle 245">
+            <a:extLst>
+              <a:ext uri="{FF2B5EF4-FFF2-40B4-BE49-F238E27FC236}">
+                <a16:creationId xmlns:a16="http://schemas.microsoft.com/office/drawing/2014/main" id="{21EBD558-2A2F-AE47-AA00-988700403061}"/>
+              </a:ext>
+            </a:extLst>
+          </p:cNvPr>
+          <p:cNvSpPr/>
+          <p:nvPr/>
+        </p:nvSpPr>
+        <p:spPr>
+          <a:xfrm>
+            <a:off x="2636928" y="3680413"/>
+            <a:ext cx="1987475" cy="645277"/>
+          </a:xfrm>
+          <a:prstGeom prst="rect">
+            <a:avLst/>
+          </a:prstGeom>
+          <a:solidFill>
+            <a:schemeClr val="accent2">
+              <a:lumMod val="60000"/>
+              <a:lumOff val="40000"/>
+            </a:schemeClr>
+          </a:solidFill>
+        </p:spPr>
+        <p:style>
+          <a:lnRef idx="2">
+            <a:schemeClr val="accent4">
+              <a:shade val="50000"/>
+            </a:schemeClr>
+          </a:lnRef>
+          <a:fillRef idx="1">
+            <a:schemeClr val="accent4"/>
+          </a:fillRef>
+          <a:effectRef idx="0">
+            <a:schemeClr val="accent4"/>
+          </a:effectRef>
+          <a:fontRef idx="minor">
+            <a:schemeClr val="lt1"/>
+          </a:fontRef>
+        </p:style>
+        <p:txBody>
+          <a:bodyPr rtlCol="0" anchor="ctr"/>
+          <a:lstStyle/>
+          <a:p>
+            <a:pPr algn="ctr"/>
+            <a:r>
+              <a:rPr lang="en-US" sz="1600"/>
+              <a:t>move.global</a:t>
+            </a:r>
+            <a:br>
               <a:rPr lang="en-US" sz="1600" b="1"/>
+            </a:br>
+            <a:r>
+              <a:rPr lang="en-US" sz="1600" b="1">
+                <a:solidFill>
+                  <a:schemeClr val="tx1"/>
+                </a:solidFill>
+              </a:rPr>
+              <a:t>Word Embedding</a:t>
+            </a:r>
+          </a:p>
+        </p:txBody>
+      </p:sp>
+      <p:sp>
+        <p:nvSpPr>
+          <p:cNvPr id="247" name="Rectangle 246">
+            <a:extLst>
+              <a:ext uri="{FF2B5EF4-FFF2-40B4-BE49-F238E27FC236}">
+                <a16:creationId xmlns:a16="http://schemas.microsoft.com/office/drawing/2014/main" id="{4FE39300-1A73-8E45-BF1A-6C75B44DC8C0}"/>
+              </a:ext>
+            </a:extLst>
+          </p:cNvPr>
+          <p:cNvSpPr/>
+          <p:nvPr/>
+        </p:nvSpPr>
+        <p:spPr>
+          <a:xfrm>
+            <a:off x="4647772" y="3680413"/>
+            <a:ext cx="1987475" cy="645277"/>
+          </a:xfrm>
+          <a:prstGeom prst="rect">
+            <a:avLst/>
+          </a:prstGeom>
+        </p:spPr>
+        <p:style>
+          <a:lnRef idx="2">
+            <a:schemeClr val="accent4">
+              <a:shade val="50000"/>
+            </a:schemeClr>
+          </a:lnRef>
+          <a:fillRef idx="1">
+            <a:schemeClr val="accent4"/>
+          </a:fillRef>
+          <a:effectRef idx="0">
+            <a:schemeClr val="accent4"/>
+          </a:effectRef>
+          <a:fontRef idx="minor">
+            <a:schemeClr val="lt1"/>
+          </a:fontRef>
+        </p:style>
+        <p:txBody>
+          <a:bodyPr rtlCol="0" anchor="ctr"/>
+          <a:lstStyle/>
+          <a:p>
+            <a:pPr algn="ctr"/>
+            <a:r>
+              <a:rPr lang="en-US" sz="1600"/>
               <a:t>move.global</a:t>
             </a:r>
             <a:br>
@@ -4526,1010 +5461,6 @@
       </p:sp>
       <p:sp>
         <p:nvSpPr>
-          <p:cNvPr id="223" name="Down Arrow 222">
-            <a:extLst>
-              <a:ext uri="{FF2B5EF4-FFF2-40B4-BE49-F238E27FC236}">
-                <a16:creationId xmlns:a16="http://schemas.microsoft.com/office/drawing/2014/main" id="{B90D40EA-4A66-1E4B-BF12-5C820A66DDAB}"/>
-              </a:ext>
-            </a:extLst>
-          </p:cNvPr>
-          <p:cNvSpPr/>
-          <p:nvPr/>
-        </p:nvSpPr>
-        <p:spPr>
-          <a:xfrm>
-            <a:off x="5293360" y="3042761"/>
-            <a:ext cx="381964" cy="473605"/>
-          </a:xfrm>
-          <a:prstGeom prst="downArrow">
-            <a:avLst/>
-          </a:prstGeom>
-          <a:solidFill>
-            <a:schemeClr val="bg1"/>
-          </a:solidFill>
-        </p:spPr>
-        <p:style>
-          <a:lnRef idx="2">
-            <a:schemeClr val="accent1">
-              <a:shade val="50000"/>
-            </a:schemeClr>
-          </a:lnRef>
-          <a:fillRef idx="1">
-            <a:schemeClr val="accent1"/>
-          </a:fillRef>
-          <a:effectRef idx="0">
-            <a:schemeClr val="accent1"/>
-          </a:effectRef>
-          <a:fontRef idx="minor">
-            <a:schemeClr val="lt1"/>
-          </a:fontRef>
-        </p:style>
-        <p:txBody>
-          <a:bodyPr rtlCol="0" anchor="ctr"/>
-          <a:lstStyle/>
-          <a:p>
-            <a:pPr algn="ctr"/>
-            <a:endParaRPr lang="en-US"/>
-          </a:p>
-        </p:txBody>
-      </p:sp>
-      <p:sp>
-        <p:nvSpPr>
-          <p:cNvPr id="224" name="Hexagon 223">
-            <a:extLst>
-              <a:ext uri="{FF2B5EF4-FFF2-40B4-BE49-F238E27FC236}">
-                <a16:creationId xmlns:a16="http://schemas.microsoft.com/office/drawing/2014/main" id="{2777E972-23C8-FA43-9165-EAD57AA551C8}"/>
-              </a:ext>
-            </a:extLst>
-          </p:cNvPr>
-          <p:cNvSpPr/>
-          <p:nvPr/>
-        </p:nvSpPr>
-        <p:spPr>
-          <a:xfrm>
-            <a:off x="9880105" y="849083"/>
-            <a:ext cx="831749" cy="386178"/>
-          </a:xfrm>
-          <a:prstGeom prst="hexagon">
-            <a:avLst/>
-          </a:prstGeom>
-        </p:spPr>
-        <p:style>
-          <a:lnRef idx="1">
-            <a:schemeClr val="accent6"/>
-          </a:lnRef>
-          <a:fillRef idx="2">
-            <a:schemeClr val="accent6"/>
-          </a:fillRef>
-          <a:effectRef idx="1">
-            <a:schemeClr val="accent6"/>
-          </a:effectRef>
-          <a:fontRef idx="minor">
-            <a:schemeClr val="dk1"/>
-          </a:fontRef>
-        </p:style>
-        <p:txBody>
-          <a:bodyPr rtlCol="0" anchor="ctr"/>
-          <a:lstStyle/>
-          <a:p>
-            <a:pPr algn="ctr"/>
-            <a:r>
-              <a:rPr lang="en-US" sz="1400" b="1"/>
-              <a:t>Move.v.2</a:t>
-            </a:r>
-          </a:p>
-        </p:txBody>
-      </p:sp>
-      <p:sp>
-        <p:nvSpPr>
-          <p:cNvPr id="225" name="Oval 224">
-            <a:extLst>
-              <a:ext uri="{FF2B5EF4-FFF2-40B4-BE49-F238E27FC236}">
-                <a16:creationId xmlns:a16="http://schemas.microsoft.com/office/drawing/2014/main" id="{1B3D2C30-97B2-D740-B26C-AF6247189B3C}"/>
-              </a:ext>
-            </a:extLst>
-          </p:cNvPr>
-          <p:cNvSpPr/>
-          <p:nvPr/>
-        </p:nvSpPr>
-        <p:spPr>
-          <a:xfrm>
-            <a:off x="10922367" y="646330"/>
-            <a:ext cx="226868" cy="239229"/>
-          </a:xfrm>
-          <a:prstGeom prst="ellipse">
-            <a:avLst/>
-          </a:prstGeom>
-        </p:spPr>
-        <p:style>
-          <a:lnRef idx="1">
-            <a:schemeClr val="accent5"/>
-          </a:lnRef>
-          <a:fillRef idx="2">
-            <a:schemeClr val="accent5"/>
-          </a:fillRef>
-          <a:effectRef idx="1">
-            <a:schemeClr val="accent5"/>
-          </a:effectRef>
-          <a:fontRef idx="minor">
-            <a:schemeClr val="dk1"/>
-          </a:fontRef>
-        </p:style>
-        <p:txBody>
-          <a:bodyPr rtlCol="0" anchor="ctr"/>
-          <a:lstStyle/>
-          <a:p>
-            <a:pPr algn="ctr"/>
-            <a:r>
-              <a:rPr lang="en-US" sz="1400"/>
-              <a:t>d</a:t>
-            </a:r>
-          </a:p>
-        </p:txBody>
-      </p:sp>
-      <p:sp>
-        <p:nvSpPr>
-          <p:cNvPr id="226" name="Oval 225">
-            <a:extLst>
-              <a:ext uri="{FF2B5EF4-FFF2-40B4-BE49-F238E27FC236}">
-                <a16:creationId xmlns:a16="http://schemas.microsoft.com/office/drawing/2014/main" id="{2B3EBBBE-E05F-DC43-B2C1-D85F890C9770}"/>
-              </a:ext>
-            </a:extLst>
-          </p:cNvPr>
-          <p:cNvSpPr/>
-          <p:nvPr/>
-        </p:nvSpPr>
-        <p:spPr>
-          <a:xfrm>
-            <a:off x="11259858" y="656122"/>
-            <a:ext cx="226868" cy="239229"/>
-          </a:xfrm>
-          <a:prstGeom prst="ellipse">
-            <a:avLst/>
-          </a:prstGeom>
-        </p:spPr>
-        <p:style>
-          <a:lnRef idx="1">
-            <a:schemeClr val="accent5"/>
-          </a:lnRef>
-          <a:fillRef idx="2">
-            <a:schemeClr val="accent5"/>
-          </a:fillRef>
-          <a:effectRef idx="1">
-            <a:schemeClr val="accent5"/>
-          </a:effectRef>
-          <a:fontRef idx="minor">
-            <a:schemeClr val="dk1"/>
-          </a:fontRef>
-        </p:style>
-        <p:txBody>
-          <a:bodyPr rtlCol="0" anchor="ctr"/>
-          <a:lstStyle/>
-          <a:p>
-            <a:pPr algn="ctr"/>
-            <a:endParaRPr lang="en-US"/>
-          </a:p>
-        </p:txBody>
-      </p:sp>
-      <p:sp>
-        <p:nvSpPr>
-          <p:cNvPr id="227" name="Oval 226">
-            <a:extLst>
-              <a:ext uri="{FF2B5EF4-FFF2-40B4-BE49-F238E27FC236}">
-                <a16:creationId xmlns:a16="http://schemas.microsoft.com/office/drawing/2014/main" id="{12F2E03F-34BA-A144-847C-CA8D2059B613}"/>
-              </a:ext>
-            </a:extLst>
-          </p:cNvPr>
-          <p:cNvSpPr/>
-          <p:nvPr/>
-        </p:nvSpPr>
-        <p:spPr>
-          <a:xfrm>
-            <a:off x="10893554" y="1077520"/>
-            <a:ext cx="196753" cy="194887"/>
-          </a:xfrm>
-          <a:prstGeom prst="ellipse">
-            <a:avLst/>
-          </a:prstGeom>
-        </p:spPr>
-        <p:style>
-          <a:lnRef idx="1">
-            <a:schemeClr val="accent5"/>
-          </a:lnRef>
-          <a:fillRef idx="3">
-            <a:schemeClr val="accent5"/>
-          </a:fillRef>
-          <a:effectRef idx="2">
-            <a:schemeClr val="accent5"/>
-          </a:effectRef>
-          <a:fontRef idx="minor">
-            <a:schemeClr val="lt1"/>
-          </a:fontRef>
-        </p:style>
-        <p:txBody>
-          <a:bodyPr rtlCol="0" anchor="ctr"/>
-          <a:lstStyle/>
-          <a:p>
-            <a:pPr algn="ctr"/>
-            <a:r>
-              <a:rPr lang="en-US" sz="1400"/>
-              <a:t>e</a:t>
-            </a:r>
-          </a:p>
-        </p:txBody>
-      </p:sp>
-      <p:sp>
-        <p:nvSpPr>
-          <p:cNvPr id="228" name="Oval 227">
-            <a:extLst>
-              <a:ext uri="{FF2B5EF4-FFF2-40B4-BE49-F238E27FC236}">
-                <a16:creationId xmlns:a16="http://schemas.microsoft.com/office/drawing/2014/main" id="{63E4CE92-87A7-5545-9173-2A9BEF4C0373}"/>
-              </a:ext>
-            </a:extLst>
-          </p:cNvPr>
-          <p:cNvSpPr/>
-          <p:nvPr/>
-        </p:nvSpPr>
-        <p:spPr>
-          <a:xfrm>
-            <a:off x="11259858" y="1063564"/>
-            <a:ext cx="198642" cy="208172"/>
-          </a:xfrm>
-          <a:prstGeom prst="ellipse">
-            <a:avLst/>
-          </a:prstGeom>
-        </p:spPr>
-        <p:style>
-          <a:lnRef idx="1">
-            <a:schemeClr val="accent5"/>
-          </a:lnRef>
-          <a:fillRef idx="3">
-            <a:schemeClr val="accent5"/>
-          </a:fillRef>
-          <a:effectRef idx="2">
-            <a:schemeClr val="accent5"/>
-          </a:effectRef>
-          <a:fontRef idx="minor">
-            <a:schemeClr val="lt1"/>
-          </a:fontRef>
-        </p:style>
-        <p:txBody>
-          <a:bodyPr rtlCol="0" anchor="ctr"/>
-          <a:lstStyle/>
-          <a:p>
-            <a:pPr algn="ctr"/>
-            <a:endParaRPr lang="en-US"/>
-          </a:p>
-        </p:txBody>
-      </p:sp>
-      <p:cxnSp>
-        <p:nvCxnSpPr>
-          <p:cNvPr id="229" name="Straight Arrow Connector 228">
-            <a:extLst>
-              <a:ext uri="{FF2B5EF4-FFF2-40B4-BE49-F238E27FC236}">
-                <a16:creationId xmlns:a16="http://schemas.microsoft.com/office/drawing/2014/main" id="{68838763-39CE-4041-9C89-F21108F36FED}"/>
-              </a:ext>
-            </a:extLst>
-          </p:cNvPr>
-          <p:cNvCxnSpPr>
-            <a:cxnSpLocks/>
-            <a:stCxn id="225" idx="3"/>
-          </p:cNvCxnSpPr>
-          <p:nvPr/>
-        </p:nvCxnSpPr>
-        <p:spPr>
-          <a:xfrm flipH="1" flipV="1">
-            <a:off x="10609175" y="838292"/>
-            <a:ext cx="346416" cy="12233"/>
-          </a:xfrm>
-          <a:prstGeom prst="straightConnector1">
-            <a:avLst/>
-          </a:prstGeom>
-          <a:ln>
-            <a:tailEnd type="triangle"/>
-          </a:ln>
-        </p:spPr>
-        <p:style>
-          <a:lnRef idx="1">
-            <a:schemeClr val="accent1"/>
-          </a:lnRef>
-          <a:fillRef idx="0">
-            <a:schemeClr val="accent1"/>
-          </a:fillRef>
-          <a:effectRef idx="0">
-            <a:schemeClr val="accent1"/>
-          </a:effectRef>
-          <a:fontRef idx="minor">
-            <a:schemeClr val="tx1"/>
-          </a:fontRef>
-        </p:style>
-      </p:cxnSp>
-      <p:cxnSp>
-        <p:nvCxnSpPr>
-          <p:cNvPr id="230" name="Straight Arrow Connector 229">
-            <a:extLst>
-              <a:ext uri="{FF2B5EF4-FFF2-40B4-BE49-F238E27FC236}">
-                <a16:creationId xmlns:a16="http://schemas.microsoft.com/office/drawing/2014/main" id="{E20C38B8-0422-2748-B844-6A35EE786435}"/>
-              </a:ext>
-            </a:extLst>
-          </p:cNvPr>
-          <p:cNvCxnSpPr>
-            <a:cxnSpLocks/>
-            <a:stCxn id="226" idx="3"/>
-          </p:cNvCxnSpPr>
-          <p:nvPr/>
-        </p:nvCxnSpPr>
-        <p:spPr>
-          <a:xfrm flipH="1" flipV="1">
-            <a:off x="10609176" y="838292"/>
-            <a:ext cx="683907" cy="22025"/>
-          </a:xfrm>
-          <a:prstGeom prst="straightConnector1">
-            <a:avLst/>
-          </a:prstGeom>
-          <a:ln>
-            <a:tailEnd type="triangle"/>
-          </a:ln>
-        </p:spPr>
-        <p:style>
-          <a:lnRef idx="1">
-            <a:schemeClr val="accent1"/>
-          </a:lnRef>
-          <a:fillRef idx="0">
-            <a:schemeClr val="accent1"/>
-          </a:fillRef>
-          <a:effectRef idx="0">
-            <a:schemeClr val="accent1"/>
-          </a:effectRef>
-          <a:fontRef idx="minor">
-            <a:schemeClr val="tx1"/>
-          </a:fontRef>
-        </p:style>
-      </p:cxnSp>
-      <p:cxnSp>
-        <p:nvCxnSpPr>
-          <p:cNvPr id="231" name="Straight Arrow Connector 230">
-            <a:extLst>
-              <a:ext uri="{FF2B5EF4-FFF2-40B4-BE49-F238E27FC236}">
-                <a16:creationId xmlns:a16="http://schemas.microsoft.com/office/drawing/2014/main" id="{86FA59E4-E6C9-5B42-8C55-4FEAEBA14718}"/>
-              </a:ext>
-            </a:extLst>
-          </p:cNvPr>
-          <p:cNvCxnSpPr>
-            <a:cxnSpLocks/>
-            <a:stCxn id="227" idx="1"/>
-          </p:cNvCxnSpPr>
-          <p:nvPr/>
-        </p:nvCxnSpPr>
-        <p:spPr>
-          <a:xfrm flipH="1" flipV="1">
-            <a:off x="10705719" y="1031380"/>
-            <a:ext cx="216648" cy="74680"/>
-          </a:xfrm>
-          <a:prstGeom prst="straightConnector1">
-            <a:avLst/>
-          </a:prstGeom>
-          <a:ln>
-            <a:tailEnd type="triangle"/>
-          </a:ln>
-        </p:spPr>
-        <p:style>
-          <a:lnRef idx="1">
-            <a:schemeClr val="accent1"/>
-          </a:lnRef>
-          <a:fillRef idx="0">
-            <a:schemeClr val="accent1"/>
-          </a:fillRef>
-          <a:effectRef idx="0">
-            <a:schemeClr val="accent1"/>
-          </a:effectRef>
-          <a:fontRef idx="minor">
-            <a:schemeClr val="tx1"/>
-          </a:fontRef>
-        </p:style>
-      </p:cxnSp>
-      <p:cxnSp>
-        <p:nvCxnSpPr>
-          <p:cNvPr id="232" name="Straight Arrow Connector 231">
-            <a:extLst>
-              <a:ext uri="{FF2B5EF4-FFF2-40B4-BE49-F238E27FC236}">
-                <a16:creationId xmlns:a16="http://schemas.microsoft.com/office/drawing/2014/main" id="{A1017439-0FCA-7849-A4DF-70F37FFE81FE}"/>
-              </a:ext>
-            </a:extLst>
-          </p:cNvPr>
-          <p:cNvCxnSpPr>
-            <a:cxnSpLocks/>
-            <a:stCxn id="228" idx="3"/>
-          </p:cNvCxnSpPr>
-          <p:nvPr/>
-        </p:nvCxnSpPr>
-        <p:spPr>
-          <a:xfrm flipH="1" flipV="1">
-            <a:off x="10609176" y="1224470"/>
-            <a:ext cx="679773" cy="16781"/>
-          </a:xfrm>
-          <a:prstGeom prst="straightConnector1">
-            <a:avLst/>
-          </a:prstGeom>
-          <a:ln>
-            <a:tailEnd type="triangle"/>
-          </a:ln>
-        </p:spPr>
-        <p:style>
-          <a:lnRef idx="1">
-            <a:schemeClr val="accent1"/>
-          </a:lnRef>
-          <a:fillRef idx="0">
-            <a:schemeClr val="accent1"/>
-          </a:fillRef>
-          <a:effectRef idx="0">
-            <a:schemeClr val="accent1"/>
-          </a:effectRef>
-          <a:fontRef idx="minor">
-            <a:schemeClr val="tx1"/>
-          </a:fontRef>
-        </p:style>
-      </p:cxnSp>
-      <p:cxnSp>
-        <p:nvCxnSpPr>
-          <p:cNvPr id="233" name="Straight Arrow Connector 232">
-            <a:extLst>
-              <a:ext uri="{FF2B5EF4-FFF2-40B4-BE49-F238E27FC236}">
-                <a16:creationId xmlns:a16="http://schemas.microsoft.com/office/drawing/2014/main" id="{11762662-A11A-0949-84F2-3B49DFDEB360}"/>
-              </a:ext>
-            </a:extLst>
-          </p:cNvPr>
-          <p:cNvCxnSpPr>
-            <a:cxnSpLocks/>
-            <a:stCxn id="225" idx="2"/>
-          </p:cNvCxnSpPr>
-          <p:nvPr/>
-        </p:nvCxnSpPr>
-        <p:spPr>
-          <a:xfrm flipH="1">
-            <a:off x="10609175" y="765945"/>
-            <a:ext cx="313192" cy="72347"/>
-          </a:xfrm>
-          <a:prstGeom prst="straightConnector1">
-            <a:avLst/>
-          </a:prstGeom>
-          <a:ln>
-            <a:tailEnd type="triangle"/>
-          </a:ln>
-        </p:spPr>
-        <p:style>
-          <a:lnRef idx="1">
-            <a:schemeClr val="accent1"/>
-          </a:lnRef>
-          <a:fillRef idx="0">
-            <a:schemeClr val="accent1"/>
-          </a:fillRef>
-          <a:effectRef idx="0">
-            <a:schemeClr val="accent1"/>
-          </a:effectRef>
-          <a:fontRef idx="minor">
-            <a:schemeClr val="tx1"/>
-          </a:fontRef>
-        </p:style>
-      </p:cxnSp>
-      <p:sp>
-        <p:nvSpPr>
-          <p:cNvPr id="234" name="Rectangle 233">
-            <a:extLst>
-              <a:ext uri="{FF2B5EF4-FFF2-40B4-BE49-F238E27FC236}">
-                <a16:creationId xmlns:a16="http://schemas.microsoft.com/office/drawing/2014/main" id="{C617B3BA-87C6-5445-8DFA-3B8D3AB6A878}"/>
-              </a:ext>
-            </a:extLst>
-          </p:cNvPr>
-          <p:cNvSpPr/>
-          <p:nvPr/>
-        </p:nvSpPr>
-        <p:spPr>
-          <a:xfrm>
-            <a:off x="8803716" y="404095"/>
-            <a:ext cx="696864" cy="512923"/>
-          </a:xfrm>
-          <a:prstGeom prst="rect">
-            <a:avLst/>
-          </a:prstGeom>
-        </p:spPr>
-        <p:style>
-          <a:lnRef idx="2">
-            <a:schemeClr val="accent4">
-              <a:shade val="50000"/>
-            </a:schemeClr>
-          </a:lnRef>
-          <a:fillRef idx="1">
-            <a:schemeClr val="accent4"/>
-          </a:fillRef>
-          <a:effectRef idx="0">
-            <a:schemeClr val="accent4"/>
-          </a:effectRef>
-          <a:fontRef idx="minor">
-            <a:schemeClr val="lt1"/>
-          </a:fontRef>
-        </p:style>
-        <p:txBody>
-          <a:bodyPr rtlCol="0" anchor="ctr"/>
-          <a:lstStyle/>
-          <a:p>
-            <a:pPr algn="ctr"/>
-            <a:r>
-              <a:rPr lang="en-US" sz="1400"/>
-              <a:t>move.</a:t>
-            </a:r>
-            <a:br>
-              <a:rPr lang="en-US" sz="1400"/>
-            </a:br>
-            <a:r>
-              <a:rPr lang="en-US" sz="1400"/>
-              <a:t>global</a:t>
-            </a:r>
-          </a:p>
-        </p:txBody>
-      </p:sp>
-      <p:cxnSp>
-        <p:nvCxnSpPr>
-          <p:cNvPr id="235" name="Straight Arrow Connector 234">
-            <a:extLst>
-              <a:ext uri="{FF2B5EF4-FFF2-40B4-BE49-F238E27FC236}">
-                <a16:creationId xmlns:a16="http://schemas.microsoft.com/office/drawing/2014/main" id="{182B2BBF-6FBA-1145-84C5-0F86E1FDD8D4}"/>
-              </a:ext>
-            </a:extLst>
-          </p:cNvPr>
-          <p:cNvCxnSpPr>
-            <a:cxnSpLocks/>
-            <a:stCxn id="234" idx="3"/>
-          </p:cNvCxnSpPr>
-          <p:nvPr/>
-        </p:nvCxnSpPr>
-        <p:spPr>
-          <a:xfrm>
-            <a:off x="9500580" y="660557"/>
-            <a:ext cx="361562" cy="334125"/>
-          </a:xfrm>
-          <a:prstGeom prst="straightConnector1">
-            <a:avLst/>
-          </a:prstGeom>
-          <a:ln>
-            <a:tailEnd type="triangle"/>
-          </a:ln>
-        </p:spPr>
-        <p:style>
-          <a:lnRef idx="1">
-            <a:schemeClr val="accent1"/>
-          </a:lnRef>
-          <a:fillRef idx="0">
-            <a:schemeClr val="accent1"/>
-          </a:fillRef>
-          <a:effectRef idx="0">
-            <a:schemeClr val="accent1"/>
-          </a:effectRef>
-          <a:fontRef idx="minor">
-            <a:schemeClr val="tx1"/>
-          </a:fontRef>
-        </p:style>
-      </p:cxnSp>
-      <p:sp>
-        <p:nvSpPr>
-          <p:cNvPr id="239" name="Left Bracket 238">
-            <a:extLst>
-              <a:ext uri="{FF2B5EF4-FFF2-40B4-BE49-F238E27FC236}">
-                <a16:creationId xmlns:a16="http://schemas.microsoft.com/office/drawing/2014/main" id="{1CBB1B64-9BE6-E54A-AF79-A12BB63015CA}"/>
-              </a:ext>
-            </a:extLst>
-          </p:cNvPr>
-          <p:cNvSpPr/>
-          <p:nvPr/>
-        </p:nvSpPr>
-        <p:spPr>
-          <a:xfrm rot="-5400000">
-            <a:off x="9725204" y="-165489"/>
-            <a:ext cx="794092" cy="3020996"/>
-          </a:xfrm>
-          <a:prstGeom prst="leftBracket">
-            <a:avLst/>
-          </a:prstGeom>
-          <a:ln w="12700"/>
-        </p:spPr>
-        <p:style>
-          <a:lnRef idx="1">
-            <a:schemeClr val="accent1"/>
-          </a:lnRef>
-          <a:fillRef idx="0">
-            <a:schemeClr val="accent1"/>
-          </a:fillRef>
-          <a:effectRef idx="0">
-            <a:schemeClr val="accent1"/>
-          </a:effectRef>
-          <a:fontRef idx="minor">
-            <a:schemeClr val="tx1"/>
-          </a:fontRef>
-        </p:style>
-        <p:txBody>
-          <a:bodyPr rtlCol="0" anchor="ctr"/>
-          <a:lstStyle/>
-          <a:p>
-            <a:pPr algn="ctr"/>
-            <a:endParaRPr lang="en-US"/>
-          </a:p>
-        </p:txBody>
-      </p:sp>
-      <p:sp>
-        <p:nvSpPr>
-          <p:cNvPr id="240" name="TextBox 239">
-            <a:extLst>
-              <a:ext uri="{FF2B5EF4-FFF2-40B4-BE49-F238E27FC236}">
-                <a16:creationId xmlns:a16="http://schemas.microsoft.com/office/drawing/2014/main" id="{39A53C50-D96B-5C49-8E40-F2A306AE2511}"/>
-              </a:ext>
-            </a:extLst>
-          </p:cNvPr>
-          <p:cNvSpPr txBox="1"/>
-          <p:nvPr/>
-        </p:nvSpPr>
-        <p:spPr>
-          <a:xfrm>
-            <a:off x="9578537" y="1453020"/>
-            <a:ext cx="1137913" cy="338554"/>
-          </a:xfrm>
-          <a:prstGeom prst="rect">
-            <a:avLst/>
-          </a:prstGeom>
-          <a:noFill/>
-        </p:spPr>
-        <p:txBody>
-          <a:bodyPr wrap="square" rtlCol="0">
-            <a:spAutoFit/>
-          </a:bodyPr>
-          <a:lstStyle/>
-          <a:p>
-            <a:r>
-              <a:rPr lang="en-US" sz="1600"/>
-              <a:t>Graph area</a:t>
-            </a:r>
-          </a:p>
-        </p:txBody>
-      </p:sp>
-      <p:sp>
-        <p:nvSpPr>
-          <p:cNvPr id="241" name="Down Arrow 240">
-            <a:extLst>
-              <a:ext uri="{FF2B5EF4-FFF2-40B4-BE49-F238E27FC236}">
-                <a16:creationId xmlns:a16="http://schemas.microsoft.com/office/drawing/2014/main" id="{0D603E07-2E51-CF43-BD73-F94D5DF3ABAD}"/>
-              </a:ext>
-            </a:extLst>
-          </p:cNvPr>
-          <p:cNvSpPr/>
-          <p:nvPr/>
-        </p:nvSpPr>
-        <p:spPr>
-          <a:xfrm>
-            <a:off x="10055940" y="1738782"/>
-            <a:ext cx="381964" cy="473604"/>
-          </a:xfrm>
-          <a:prstGeom prst="downArrow">
-            <a:avLst/>
-          </a:prstGeom>
-          <a:solidFill>
-            <a:schemeClr val="bg1"/>
-          </a:solidFill>
-        </p:spPr>
-        <p:style>
-          <a:lnRef idx="2">
-            <a:schemeClr val="accent1">
-              <a:shade val="50000"/>
-            </a:schemeClr>
-          </a:lnRef>
-          <a:fillRef idx="1">
-            <a:schemeClr val="accent1"/>
-          </a:fillRef>
-          <a:effectRef idx="0">
-            <a:schemeClr val="accent1"/>
-          </a:effectRef>
-          <a:fontRef idx="minor">
-            <a:schemeClr val="lt1"/>
-          </a:fontRef>
-        </p:style>
-        <p:txBody>
-          <a:bodyPr rtlCol="0" anchor="ctr"/>
-          <a:lstStyle/>
-          <a:p>
-            <a:pPr algn="ctr"/>
-            <a:endParaRPr lang="en-US"/>
-          </a:p>
-        </p:txBody>
-      </p:sp>
-      <p:sp>
-        <p:nvSpPr>
-          <p:cNvPr id="242" name="Diamond 241">
-            <a:extLst>
-              <a:ext uri="{FF2B5EF4-FFF2-40B4-BE49-F238E27FC236}">
-                <a16:creationId xmlns:a16="http://schemas.microsoft.com/office/drawing/2014/main" id="{C9EFA4D8-F60E-FC4A-8A68-0742E6108DA5}"/>
-              </a:ext>
-            </a:extLst>
-          </p:cNvPr>
-          <p:cNvSpPr/>
-          <p:nvPr/>
-        </p:nvSpPr>
-        <p:spPr>
-          <a:xfrm>
-            <a:off x="9035346" y="2207722"/>
-            <a:ext cx="2423155" cy="835996"/>
-          </a:xfrm>
-          <a:prstGeom prst="diamond">
-            <a:avLst/>
-          </a:prstGeom>
-        </p:spPr>
-        <p:style>
-          <a:lnRef idx="2">
-            <a:schemeClr val="accent1">
-              <a:shade val="50000"/>
-            </a:schemeClr>
-          </a:lnRef>
-          <a:fillRef idx="1">
-            <a:schemeClr val="accent1"/>
-          </a:fillRef>
-          <a:effectRef idx="0">
-            <a:schemeClr val="accent1"/>
-          </a:effectRef>
-          <a:fontRef idx="minor">
-            <a:schemeClr val="lt1"/>
-          </a:fontRef>
-        </p:style>
-        <p:txBody>
-          <a:bodyPr rtlCol="0" anchor="ctr"/>
-          <a:lstStyle/>
-          <a:p>
-            <a:pPr algn="ctr"/>
-            <a:r>
-              <a:rPr lang="en-US"/>
-              <a:t>GNN 2</a:t>
-            </a:r>
-            <a:br>
-              <a:rPr lang="en-US"/>
-            </a:br>
-            <a:r>
-              <a:rPr lang="en-US"/>
-              <a:t>(e.g. GAT)</a:t>
-            </a:r>
-          </a:p>
-        </p:txBody>
-      </p:sp>
-      <p:sp>
-        <p:nvSpPr>
-          <p:cNvPr id="243" name="Rectangle 242">
-            <a:extLst>
-              <a:ext uri="{FF2B5EF4-FFF2-40B4-BE49-F238E27FC236}">
-                <a16:creationId xmlns:a16="http://schemas.microsoft.com/office/drawing/2014/main" id="{84CA11CF-60F4-FC47-A864-0178A5911173}"/>
-              </a:ext>
-            </a:extLst>
-          </p:cNvPr>
-          <p:cNvSpPr/>
-          <p:nvPr/>
-        </p:nvSpPr>
-        <p:spPr>
-          <a:xfrm>
-            <a:off x="9253184" y="3527155"/>
-            <a:ext cx="1987475" cy="645277"/>
-          </a:xfrm>
-          <a:prstGeom prst="rect">
-            <a:avLst/>
-          </a:prstGeom>
-        </p:spPr>
-        <p:style>
-          <a:lnRef idx="1">
-            <a:schemeClr val="accent6"/>
-          </a:lnRef>
-          <a:fillRef idx="2">
-            <a:schemeClr val="accent6"/>
-          </a:fillRef>
-          <a:effectRef idx="1">
-            <a:schemeClr val="accent6"/>
-          </a:effectRef>
-          <a:fontRef idx="minor">
-            <a:schemeClr val="dk1"/>
-          </a:fontRef>
-        </p:style>
-        <p:txBody>
-          <a:bodyPr rtlCol="0" anchor="ctr"/>
-          <a:lstStyle/>
-          <a:p>
-            <a:pPr algn="ctr"/>
-            <a:r>
-              <a:rPr lang="en-US" sz="1600" b="1"/>
-              <a:t>Move.v.2</a:t>
-            </a:r>
-            <a:br>
-              <a:rPr lang="en-US" sz="1600" b="1"/>
-            </a:br>
-            <a:r>
-              <a:rPr lang="en-US" sz="1600" b="1">
-                <a:solidFill>
-                  <a:schemeClr val="tx1"/>
-                </a:solidFill>
-              </a:rPr>
-              <a:t>Sense Node State</a:t>
-            </a:r>
-          </a:p>
-        </p:txBody>
-      </p:sp>
-      <p:sp>
-        <p:nvSpPr>
-          <p:cNvPr id="244" name="Down Arrow 243">
-            <a:extLst>
-              <a:ext uri="{FF2B5EF4-FFF2-40B4-BE49-F238E27FC236}">
-                <a16:creationId xmlns:a16="http://schemas.microsoft.com/office/drawing/2014/main" id="{0DA49BFB-6749-8843-9177-952B3C468E60}"/>
-              </a:ext>
-            </a:extLst>
-          </p:cNvPr>
-          <p:cNvSpPr/>
-          <p:nvPr/>
-        </p:nvSpPr>
-        <p:spPr>
-          <a:xfrm>
-            <a:off x="10055938" y="3043719"/>
-            <a:ext cx="381964" cy="473605"/>
-          </a:xfrm>
-          <a:prstGeom prst="downArrow">
-            <a:avLst/>
-          </a:prstGeom>
-          <a:solidFill>
-            <a:schemeClr val="bg1"/>
-          </a:solidFill>
-        </p:spPr>
-        <p:style>
-          <a:lnRef idx="2">
-            <a:schemeClr val="accent1">
-              <a:shade val="50000"/>
-            </a:schemeClr>
-          </a:lnRef>
-          <a:fillRef idx="1">
-            <a:schemeClr val="accent1"/>
-          </a:fillRef>
-          <a:effectRef idx="0">
-            <a:schemeClr val="accent1"/>
-          </a:effectRef>
-          <a:fontRef idx="minor">
-            <a:schemeClr val="lt1"/>
-          </a:fontRef>
-        </p:style>
-        <p:txBody>
-          <a:bodyPr rtlCol="0" anchor="ctr"/>
-          <a:lstStyle/>
-          <a:p>
-            <a:pPr algn="ctr"/>
-            <a:endParaRPr lang="en-US"/>
-          </a:p>
-        </p:txBody>
-      </p:sp>
-      <p:sp>
-        <p:nvSpPr>
-          <p:cNvPr id="246" name="Rectangle 245">
-            <a:extLst>
-              <a:ext uri="{FF2B5EF4-FFF2-40B4-BE49-F238E27FC236}">
-                <a16:creationId xmlns:a16="http://schemas.microsoft.com/office/drawing/2014/main" id="{21EBD558-2A2F-AE47-AA00-988700403061}"/>
-              </a:ext>
-            </a:extLst>
-          </p:cNvPr>
-          <p:cNvSpPr/>
-          <p:nvPr/>
-        </p:nvSpPr>
-        <p:spPr>
-          <a:xfrm>
-            <a:off x="2498784" y="4675942"/>
-            <a:ext cx="1987475" cy="645277"/>
-          </a:xfrm>
-          <a:prstGeom prst="rect">
-            <a:avLst/>
-          </a:prstGeom>
-          <a:solidFill>
-            <a:schemeClr val="accent2">
-              <a:lumMod val="60000"/>
-              <a:lumOff val="40000"/>
-            </a:schemeClr>
-          </a:solidFill>
-        </p:spPr>
-        <p:style>
-          <a:lnRef idx="2">
-            <a:schemeClr val="accent4">
-              <a:shade val="50000"/>
-            </a:schemeClr>
-          </a:lnRef>
-          <a:fillRef idx="1">
-            <a:schemeClr val="accent4"/>
-          </a:fillRef>
-          <a:effectRef idx="0">
-            <a:schemeClr val="accent4"/>
-          </a:effectRef>
-          <a:fontRef idx="minor">
-            <a:schemeClr val="lt1"/>
-          </a:fontRef>
-        </p:style>
-        <p:txBody>
-          <a:bodyPr rtlCol="0" anchor="ctr"/>
-          <a:lstStyle/>
-          <a:p>
-            <a:pPr algn="ctr"/>
-            <a:r>
-              <a:rPr lang="en-US" sz="1600"/>
-              <a:t>move.global</a:t>
-            </a:r>
-            <a:br>
-              <a:rPr lang="en-US" sz="1600" b="1"/>
-            </a:br>
-            <a:r>
-              <a:rPr lang="en-US" sz="1600" b="1">
-                <a:solidFill>
-                  <a:schemeClr val="tx1"/>
-                </a:solidFill>
-              </a:rPr>
-              <a:t>Word Embedding</a:t>
-            </a:r>
-          </a:p>
-        </p:txBody>
-      </p:sp>
-      <p:sp>
-        <p:nvSpPr>
-          <p:cNvPr id="247" name="Rectangle 246">
-            <a:extLst>
-              <a:ext uri="{FF2B5EF4-FFF2-40B4-BE49-F238E27FC236}">
-                <a16:creationId xmlns:a16="http://schemas.microsoft.com/office/drawing/2014/main" id="{4FE39300-1A73-8E45-BF1A-6C75B44DC8C0}"/>
-              </a:ext>
-            </a:extLst>
-          </p:cNvPr>
-          <p:cNvSpPr/>
-          <p:nvPr/>
-        </p:nvSpPr>
-        <p:spPr>
-          <a:xfrm>
-            <a:off x="4509628" y="4675942"/>
-            <a:ext cx="1987475" cy="645277"/>
-          </a:xfrm>
-          <a:prstGeom prst="rect">
-            <a:avLst/>
-          </a:prstGeom>
-        </p:spPr>
-        <p:style>
-          <a:lnRef idx="2">
-            <a:schemeClr val="accent4">
-              <a:shade val="50000"/>
-            </a:schemeClr>
-          </a:lnRef>
-          <a:fillRef idx="1">
-            <a:schemeClr val="accent4"/>
-          </a:fillRef>
-          <a:effectRef idx="0">
-            <a:schemeClr val="accent4"/>
-          </a:effectRef>
-          <a:fontRef idx="minor">
-            <a:schemeClr val="lt1"/>
-          </a:fontRef>
-        </p:style>
-        <p:txBody>
-          <a:bodyPr rtlCol="0" anchor="ctr"/>
-          <a:lstStyle/>
-          <a:p>
-            <a:pPr algn="ctr"/>
-            <a:r>
-              <a:rPr lang="en-US" sz="1600"/>
-              <a:t>move.global</a:t>
-            </a:r>
-            <a:br>
-              <a:rPr lang="en-US" sz="1600" b="1"/>
-            </a:br>
-            <a:r>
-              <a:rPr lang="en-US" sz="1600" b="1">
-                <a:solidFill>
-                  <a:schemeClr val="tx1"/>
-                </a:solidFill>
-              </a:rPr>
-              <a:t>Word Node State</a:t>
-            </a:r>
-          </a:p>
-        </p:txBody>
-      </p:sp>
-      <p:sp>
-        <p:nvSpPr>
           <p:cNvPr id="248" name="Rectangle 247">
             <a:extLst>
               <a:ext uri="{FF2B5EF4-FFF2-40B4-BE49-F238E27FC236}">
@@ -5542,7 +5473,7 @@
         </p:nvSpPr>
         <p:spPr>
           <a:xfrm>
-            <a:off x="6520472" y="4675942"/>
+            <a:off x="6658616" y="3680413"/>
             <a:ext cx="1987475" cy="645277"/>
           </a:xfrm>
           <a:prstGeom prst="rect">
@@ -5604,7 +5535,7 @@
         </p:nvSpPr>
         <p:spPr>
           <a:xfrm>
-            <a:off x="808882" y="4991329"/>
+            <a:off x="838722" y="3869277"/>
             <a:ext cx="1602487" cy="369332"/>
           </a:xfrm>
           <a:prstGeom prst="rect">
@@ -5625,132 +5556,6 @@
           </a:p>
         </p:txBody>
       </p:sp>
-      <p:cxnSp>
-        <p:nvCxnSpPr>
-          <p:cNvPr id="251" name="Straight Arrow Connector 250">
-            <a:extLst>
-              <a:ext uri="{FF2B5EF4-FFF2-40B4-BE49-F238E27FC236}">
-                <a16:creationId xmlns:a16="http://schemas.microsoft.com/office/drawing/2014/main" id="{05A03702-9650-124E-8F2F-D57C4BCDBF27}"/>
-              </a:ext>
-            </a:extLst>
-          </p:cNvPr>
-          <p:cNvCxnSpPr>
-            <a:stCxn id="57" idx="2"/>
-            <a:endCxn id="246" idx="0"/>
-          </p:cNvCxnSpPr>
-          <p:nvPr/>
-        </p:nvCxnSpPr>
-        <p:spPr>
-          <a:xfrm>
-            <a:off x="1475481" y="1546981"/>
-            <a:ext cx="2017040" cy="3128961"/>
-          </a:xfrm>
-          <a:prstGeom prst="straightConnector1">
-            <a:avLst/>
-          </a:prstGeom>
-          <a:ln>
-            <a:tailEnd type="triangle"/>
-          </a:ln>
-        </p:spPr>
-        <p:style>
-          <a:lnRef idx="1">
-            <a:schemeClr val="dk1"/>
-          </a:lnRef>
-          <a:fillRef idx="0">
-            <a:schemeClr val="dk1"/>
-          </a:fillRef>
-          <a:effectRef idx="0">
-            <a:schemeClr val="dk1"/>
-          </a:effectRef>
-          <a:fontRef idx="minor">
-            <a:schemeClr val="tx1"/>
-          </a:fontRef>
-        </p:style>
-      </p:cxnSp>
-      <p:cxnSp>
-        <p:nvCxnSpPr>
-          <p:cNvPr id="252" name="Straight Arrow Connector 251">
-            <a:extLst>
-              <a:ext uri="{FF2B5EF4-FFF2-40B4-BE49-F238E27FC236}">
-                <a16:creationId xmlns:a16="http://schemas.microsoft.com/office/drawing/2014/main" id="{E2539D3D-161B-7045-BFAE-9C6773EE27C1}"/>
-              </a:ext>
-            </a:extLst>
-          </p:cNvPr>
-          <p:cNvCxnSpPr>
-            <a:cxnSpLocks/>
-            <a:stCxn id="222" idx="2"/>
-          </p:cNvCxnSpPr>
-          <p:nvPr/>
-        </p:nvCxnSpPr>
-        <p:spPr>
-          <a:xfrm>
-            <a:off x="5495919" y="4171473"/>
-            <a:ext cx="7447" cy="504468"/>
-          </a:xfrm>
-          <a:prstGeom prst="straightConnector1">
-            <a:avLst/>
-          </a:prstGeom>
-          <a:ln>
-            <a:tailEnd type="triangle"/>
-          </a:ln>
-        </p:spPr>
-        <p:style>
-          <a:lnRef idx="1">
-            <a:schemeClr val="dk1"/>
-          </a:lnRef>
-          <a:fillRef idx="0">
-            <a:schemeClr val="dk1"/>
-          </a:fillRef>
-          <a:effectRef idx="0">
-            <a:schemeClr val="dk1"/>
-          </a:effectRef>
-          <a:fontRef idx="minor">
-            <a:schemeClr val="tx1"/>
-          </a:fontRef>
-        </p:style>
-      </p:cxnSp>
-      <p:cxnSp>
-        <p:nvCxnSpPr>
-          <p:cNvPr id="255" name="Straight Arrow Connector 254">
-            <a:extLst>
-              <a:ext uri="{FF2B5EF4-FFF2-40B4-BE49-F238E27FC236}">
-                <a16:creationId xmlns:a16="http://schemas.microsoft.com/office/drawing/2014/main" id="{2ABD30DF-312D-3D45-B2CD-9E696DD20694}"/>
-              </a:ext>
-            </a:extLst>
-          </p:cNvPr>
-          <p:cNvCxnSpPr>
-            <a:cxnSpLocks/>
-            <a:endCxn id="248" idx="0"/>
-          </p:cNvCxnSpPr>
-          <p:nvPr/>
-        </p:nvCxnSpPr>
-        <p:spPr>
-          <a:xfrm flipH="1">
-            <a:off x="7514209" y="3848835"/>
-            <a:ext cx="1733692" cy="827107"/>
-          </a:xfrm>
-          <a:prstGeom prst="straightConnector1">
-            <a:avLst/>
-          </a:prstGeom>
-          <a:ln>
-            <a:tailEnd type="triangle"/>
-          </a:ln>
-        </p:spPr>
-        <p:style>
-          <a:lnRef idx="1">
-            <a:schemeClr val="dk1"/>
-          </a:lnRef>
-          <a:fillRef idx="0">
-            <a:schemeClr val="dk1"/>
-          </a:fillRef>
-          <a:effectRef idx="0">
-            <a:schemeClr val="dk1"/>
-          </a:effectRef>
-          <a:fontRef idx="minor">
-            <a:schemeClr val="tx1"/>
-          </a:fontRef>
-        </p:style>
-      </p:cxnSp>
       <p:sp>
         <p:nvSpPr>
           <p:cNvPr id="257" name="Down Arrow 256">
@@ -5765,7 +5570,7 @@
         </p:nvSpPr>
         <p:spPr>
           <a:xfrm>
-            <a:off x="5319695" y="5520402"/>
+            <a:off x="5075919" y="4525190"/>
             <a:ext cx="381964" cy="473605"/>
           </a:xfrm>
           <a:prstGeom prst="downArrow">
@@ -5814,7 +5619,7 @@
         </p:nvSpPr>
         <p:spPr>
           <a:xfrm rot="-5400000">
-            <a:off x="5359392" y="2177174"/>
+            <a:off x="5497536" y="1181645"/>
             <a:ext cx="299326" cy="6370202"/>
           </a:xfrm>
           <a:prstGeom prst="leftBracket">
@@ -5859,7 +5664,7 @@
         </p:nvSpPr>
         <p:spPr>
           <a:xfrm>
-            <a:off x="4297976" y="6022004"/>
+            <a:off x="4054200" y="5026792"/>
             <a:ext cx="2423155" cy="756806"/>
           </a:xfrm>
           <a:prstGeom prst="diamond">
@@ -5908,7 +5713,7 @@
         </p:nvSpPr>
         <p:spPr>
           <a:xfrm>
-            <a:off x="4486259" y="6795142"/>
+            <a:off x="4242483" y="5799930"/>
             <a:ext cx="1987475" cy="299327"/>
           </a:xfrm>
           <a:prstGeom prst="rect">
@@ -5967,7 +5772,7 @@
         </p:nvSpPr>
         <p:spPr>
           <a:xfrm>
-            <a:off x="4297362" y="9021377"/>
+            <a:off x="4053586" y="8026165"/>
             <a:ext cx="2423155" cy="835996"/>
           </a:xfrm>
           <a:prstGeom prst="diamond">
@@ -6024,7 +5829,7 @@
         </p:nvSpPr>
         <p:spPr>
           <a:xfrm>
-            <a:off x="4539468" y="10318576"/>
+            <a:off x="4295692" y="9323364"/>
             <a:ext cx="1987475" cy="530651"/>
           </a:xfrm>
           <a:prstGeom prst="rect">
@@ -6083,7 +5888,7 @@
         </p:nvSpPr>
         <p:spPr>
           <a:xfrm>
-            <a:off x="5132761" y="11274148"/>
+            <a:off x="4888985" y="10278936"/>
             <a:ext cx="752354" cy="755561"/>
           </a:xfrm>
           <a:prstGeom prst="ellipse">
@@ -6130,7 +5935,7 @@
         </p:nvSpPr>
         <p:spPr>
           <a:xfrm>
-            <a:off x="5340143" y="8185382"/>
+            <a:off x="5096367" y="7190170"/>
             <a:ext cx="381964" cy="835995"/>
           </a:xfrm>
           <a:prstGeom prst="downArrow">
@@ -6179,7 +5984,7 @@
         </p:nvSpPr>
         <p:spPr>
           <a:xfrm>
-            <a:off x="5329532" y="9857373"/>
+            <a:off x="5085756" y="8862161"/>
             <a:ext cx="381964" cy="428262"/>
           </a:xfrm>
           <a:prstGeom prst="downArrow">
@@ -6228,7 +6033,7 @@
         </p:nvSpPr>
         <p:spPr>
           <a:xfrm>
-            <a:off x="5317956" y="10841849"/>
+            <a:off x="5074180" y="9846637"/>
             <a:ext cx="381964" cy="428262"/>
           </a:xfrm>
           <a:prstGeom prst="downArrow">
@@ -6277,7 +6082,7 @@
         </p:nvSpPr>
         <p:spPr>
           <a:xfrm>
-            <a:off x="5317956" y="12039200"/>
+            <a:off x="5074180" y="11043988"/>
             <a:ext cx="381964" cy="428262"/>
           </a:xfrm>
           <a:prstGeom prst="downArrow">
@@ -6326,7 +6131,7 @@
         </p:nvSpPr>
         <p:spPr>
           <a:xfrm>
-            <a:off x="4515201" y="12467463"/>
+            <a:off x="4271425" y="11472251"/>
             <a:ext cx="1987475" cy="755561"/>
           </a:xfrm>
           <a:prstGeom prst="rect">
@@ -6385,7 +6190,7 @@
         </p:nvSpPr>
         <p:spPr>
           <a:xfrm>
-            <a:off x="7698356" y="10269299"/>
+            <a:off x="7454580" y="9274087"/>
             <a:ext cx="1987475" cy="530651"/>
           </a:xfrm>
           <a:prstGeom prst="rect">
@@ -6444,7 +6249,7 @@
         </p:nvSpPr>
         <p:spPr>
           <a:xfrm>
-            <a:off x="8291649" y="11224871"/>
+            <a:off x="8047873" y="10229659"/>
             <a:ext cx="752354" cy="755561"/>
           </a:xfrm>
           <a:prstGeom prst="ellipse">
@@ -6491,7 +6296,7 @@
         </p:nvSpPr>
         <p:spPr>
           <a:xfrm>
-            <a:off x="8476844" y="10792572"/>
+            <a:off x="8233068" y="9797360"/>
             <a:ext cx="381964" cy="428262"/>
           </a:xfrm>
           <a:prstGeom prst="downArrow">
@@ -6540,7 +6345,7 @@
         </p:nvSpPr>
         <p:spPr>
           <a:xfrm>
-            <a:off x="8476844" y="11989923"/>
+            <a:off x="8233068" y="10994711"/>
             <a:ext cx="381964" cy="428262"/>
           </a:xfrm>
           <a:prstGeom prst="downArrow">
@@ -6589,7 +6394,7 @@
         </p:nvSpPr>
         <p:spPr>
           <a:xfrm>
-            <a:off x="7674089" y="12418186"/>
+            <a:off x="7430313" y="11422974"/>
             <a:ext cx="1987475" cy="755561"/>
           </a:xfrm>
           <a:prstGeom prst="rect">
@@ -6651,7 +6456,7 @@
         </p:nvCxnSpPr>
         <p:spPr>
           <a:xfrm>
-            <a:off x="6473734" y="6944806"/>
+            <a:off x="6229958" y="5949594"/>
             <a:ext cx="1374996" cy="344069"/>
           </a:xfrm>
           <a:prstGeom prst="straightConnector1">
@@ -6690,7 +6495,7 @@
         </p:nvSpPr>
         <p:spPr>
           <a:xfrm>
-            <a:off x="7460760" y="9019235"/>
+            <a:off x="7216984" y="8024023"/>
             <a:ext cx="2423155" cy="835996"/>
           </a:xfrm>
           <a:prstGeom prst="diamond">
@@ -6747,7 +6552,7 @@
         </p:nvSpPr>
         <p:spPr>
           <a:xfrm>
-            <a:off x="8472906" y="8163960"/>
+            <a:off x="8229130" y="7168748"/>
             <a:ext cx="381964" cy="868992"/>
           </a:xfrm>
           <a:prstGeom prst="downArrow">
@@ -6796,7 +6601,7 @@
         </p:nvSpPr>
         <p:spPr>
           <a:xfrm>
-            <a:off x="8471157" y="9833871"/>
+            <a:off x="8227381" y="8838659"/>
             <a:ext cx="381964" cy="428262"/>
           </a:xfrm>
           <a:prstGeom prst="downArrow">
@@ -6845,7 +6650,7 @@
         </p:nvSpPr>
         <p:spPr>
           <a:xfrm>
-            <a:off x="2942194" y="6227180"/>
+            <a:off x="2698418" y="5231968"/>
             <a:ext cx="299326" cy="1111170"/>
           </a:xfrm>
           <a:prstGeom prst="leftBracket">
@@ -6890,7 +6695,7 @@
         </p:nvSpPr>
         <p:spPr>
           <a:xfrm>
-            <a:off x="1967696" y="6493397"/>
+            <a:off x="1723920" y="5498185"/>
             <a:ext cx="1040022" cy="369332"/>
           </a:xfrm>
           <a:prstGeom prst="rect">
@@ -6925,7 +6730,7 @@
         </p:nvSpPr>
         <p:spPr>
           <a:xfrm>
-            <a:off x="4308067" y="7100480"/>
+            <a:off x="4064291" y="6105268"/>
             <a:ext cx="2423155" cy="756806"/>
           </a:xfrm>
           <a:prstGeom prst="diamond">
@@ -6974,7 +6779,7 @@
         </p:nvSpPr>
         <p:spPr>
           <a:xfrm>
-            <a:off x="4486258" y="7876565"/>
+            <a:off x="4242482" y="6881353"/>
             <a:ext cx="1987475" cy="299327"/>
           </a:xfrm>
           <a:prstGeom prst="rect">
@@ -7033,7 +6838,7 @@
         </p:nvSpPr>
         <p:spPr>
           <a:xfrm>
-            <a:off x="7452311" y="7085503"/>
+            <a:off x="7208535" y="6090291"/>
             <a:ext cx="2423155" cy="756806"/>
           </a:xfrm>
           <a:prstGeom prst="diamond">
@@ -7082,7 +6887,7 @@
         </p:nvSpPr>
         <p:spPr>
           <a:xfrm>
-            <a:off x="7670890" y="7849475"/>
+            <a:off x="7427114" y="6854263"/>
             <a:ext cx="1987475" cy="299327"/>
           </a:xfrm>
           <a:prstGeom prst="rect">

</xml_diff>

<commit_message>
=Building full self-attention mechanism as a separate torchModule
Former-commit-id: ab7e0f62507d2009afa6ced0afb69e1d670b6916 [formerly 38ac81147f458534b1d76d78c02a2bd609598963]
Former-commit-id: cd81107e5369952dd9cddb382f249d34ba785ff6
Former-commit-id: 3ee31838971b95e653e57f277a1eef51a8fde199
</commit_message>
<xml_diff>
--- a/Media/SenseArchitecture.pptx
+++ b/Media/SenseArchitecture.pptx
@@ -6,9 +6,10 @@
   </p:sldMasterIdLst>
   <p:sldIdLst>
     <p:sldId id="257" r:id="rId2"/>
-    <p:sldId id="258" r:id="rId3"/>
-    <p:sldId id="260" r:id="rId4"/>
-    <p:sldId id="259" r:id="rId5"/>
+    <p:sldId id="261" r:id="rId3"/>
+    <p:sldId id="258" r:id="rId4"/>
+    <p:sldId id="260" r:id="rId5"/>
+    <p:sldId id="259" r:id="rId6"/>
   </p:sldIdLst>
   <p:sldSz cx="12192000" cy="13716000"/>
   <p:notesSz cx="6858000" cy="9144000"/>
@@ -245,7 +246,7 @@
           <a:lstStyle/>
           <a:p>
             <a:fld id="{803220A4-8895-6D46-A558-2CE2469121C7}" type="datetimeFigureOut">
-              <a:t>4/12/20</a:t>
+              <a:t>4/18/20</a:t>
             </a:fld>
             <a:endParaRPr lang="en-US"/>
           </a:p>
@@ -414,7 +415,7 @@
           <a:lstStyle/>
           <a:p>
             <a:fld id="{803220A4-8895-6D46-A558-2CE2469121C7}" type="datetimeFigureOut">
-              <a:t>4/12/20</a:t>
+              <a:t>4/18/20</a:t>
             </a:fld>
             <a:endParaRPr lang="en-US"/>
           </a:p>
@@ -593,7 +594,7 @@
           <a:lstStyle/>
           <a:p>
             <a:fld id="{803220A4-8895-6D46-A558-2CE2469121C7}" type="datetimeFigureOut">
-              <a:t>4/12/20</a:t>
+              <a:t>4/18/20</a:t>
             </a:fld>
             <a:endParaRPr lang="en-US"/>
           </a:p>
@@ -762,7 +763,7 @@
           <a:lstStyle/>
           <a:p>
             <a:fld id="{803220A4-8895-6D46-A558-2CE2469121C7}" type="datetimeFigureOut">
-              <a:t>4/12/20</a:t>
+              <a:t>4/18/20</a:t>
             </a:fld>
             <a:endParaRPr lang="en-US"/>
           </a:p>
@@ -1005,7 +1006,7 @@
           <a:lstStyle/>
           <a:p>
             <a:fld id="{803220A4-8895-6D46-A558-2CE2469121C7}" type="datetimeFigureOut">
-              <a:t>4/12/20</a:t>
+              <a:t>4/18/20</a:t>
             </a:fld>
             <a:endParaRPr lang="en-US"/>
           </a:p>
@@ -1236,7 +1237,7 @@
           <a:lstStyle/>
           <a:p>
             <a:fld id="{803220A4-8895-6D46-A558-2CE2469121C7}" type="datetimeFigureOut">
-              <a:t>4/12/20</a:t>
+              <a:t>4/18/20</a:t>
             </a:fld>
             <a:endParaRPr lang="en-US"/>
           </a:p>
@@ -1602,7 +1603,7 @@
           <a:lstStyle/>
           <a:p>
             <a:fld id="{803220A4-8895-6D46-A558-2CE2469121C7}" type="datetimeFigureOut">
-              <a:t>4/12/20</a:t>
+              <a:t>4/18/20</a:t>
             </a:fld>
             <a:endParaRPr lang="en-US"/>
           </a:p>
@@ -1719,7 +1720,7 @@
           <a:lstStyle/>
           <a:p>
             <a:fld id="{803220A4-8895-6D46-A558-2CE2469121C7}" type="datetimeFigureOut">
-              <a:t>4/12/20</a:t>
+              <a:t>4/18/20</a:t>
             </a:fld>
             <a:endParaRPr lang="en-US"/>
           </a:p>
@@ -1813,7 +1814,7 @@
           <a:lstStyle/>
           <a:p>
             <a:fld id="{803220A4-8895-6D46-A558-2CE2469121C7}" type="datetimeFigureOut">
-              <a:t>4/12/20</a:t>
+              <a:t>4/18/20</a:t>
             </a:fld>
             <a:endParaRPr lang="en-US"/>
           </a:p>
@@ -2089,7 +2090,7 @@
           <a:lstStyle/>
           <a:p>
             <a:fld id="{803220A4-8895-6D46-A558-2CE2469121C7}" type="datetimeFigureOut">
-              <a:t>4/12/20</a:t>
+              <a:t>4/18/20</a:t>
             </a:fld>
             <a:endParaRPr lang="en-US"/>
           </a:p>
@@ -2345,7 +2346,7 @@
           <a:lstStyle/>
           <a:p>
             <a:fld id="{803220A4-8895-6D46-A558-2CE2469121C7}" type="datetimeFigureOut">
-              <a:t>4/12/20</a:t>
+              <a:t>4/18/20</a:t>
             </a:fld>
             <a:endParaRPr lang="en-US"/>
           </a:p>
@@ -2557,7 +2558,7 @@
           </a:lstStyle>
           <a:p>
             <a:fld id="{803220A4-8895-6D46-A558-2CE2469121C7}" type="datetimeFigureOut">
-              <a:t>4/12/20</a:t>
+              <a:t>4/18/20</a:t>
             </a:fld>
             <a:endParaRPr lang="en-US"/>
           </a:p>
@@ -5413,7 +5414,7 @@
         </p:nvSpPr>
         <p:spPr>
           <a:xfrm>
-            <a:off x="4647772" y="3680413"/>
+            <a:off x="4082423" y="3680412"/>
             <a:ext cx="1987475" cy="645277"/>
           </a:xfrm>
           <a:prstGeom prst="rect">
@@ -5570,7 +5571,7 @@
         </p:nvSpPr>
         <p:spPr>
           <a:xfrm>
-            <a:off x="5075919" y="4525190"/>
+            <a:off x="4510570" y="4525189"/>
             <a:ext cx="381964" cy="473605"/>
           </a:xfrm>
           <a:prstGeom prst="downArrow">
@@ -5664,7 +5665,7 @@
         </p:nvSpPr>
         <p:spPr>
           <a:xfrm>
-            <a:off x="4054200" y="5026792"/>
+            <a:off x="3488851" y="5026791"/>
             <a:ext cx="2423155" cy="756806"/>
           </a:xfrm>
           <a:prstGeom prst="diamond">
@@ -5713,7 +5714,7 @@
         </p:nvSpPr>
         <p:spPr>
           <a:xfrm>
-            <a:off x="4242483" y="5799930"/>
+            <a:off x="3677134" y="5799929"/>
             <a:ext cx="1987475" cy="299327"/>
           </a:xfrm>
           <a:prstGeom prst="rect">
@@ -5772,7 +5773,7 @@
         </p:nvSpPr>
         <p:spPr>
           <a:xfrm>
-            <a:off x="4053586" y="8026165"/>
+            <a:off x="3488237" y="8026164"/>
             <a:ext cx="2423155" cy="835996"/>
           </a:xfrm>
           <a:prstGeom prst="diamond">
@@ -5829,7 +5830,7 @@
         </p:nvSpPr>
         <p:spPr>
           <a:xfrm>
-            <a:off x="4295692" y="9323364"/>
+            <a:off x="3730343" y="9323363"/>
             <a:ext cx="1987475" cy="530651"/>
           </a:xfrm>
           <a:prstGeom prst="rect">
@@ -5888,7 +5889,7 @@
         </p:nvSpPr>
         <p:spPr>
           <a:xfrm>
-            <a:off x="4888985" y="10278936"/>
+            <a:off x="4323636" y="10278935"/>
             <a:ext cx="752354" cy="755561"/>
           </a:xfrm>
           <a:prstGeom prst="ellipse">
@@ -5935,7 +5936,7 @@
         </p:nvSpPr>
         <p:spPr>
           <a:xfrm>
-            <a:off x="5096367" y="7190170"/>
+            <a:off x="4531018" y="7190169"/>
             <a:ext cx="381964" cy="835995"/>
           </a:xfrm>
           <a:prstGeom prst="downArrow">
@@ -5984,7 +5985,7 @@
         </p:nvSpPr>
         <p:spPr>
           <a:xfrm>
-            <a:off x="5085756" y="8862161"/>
+            <a:off x="4520407" y="8862160"/>
             <a:ext cx="381964" cy="428262"/>
           </a:xfrm>
           <a:prstGeom prst="downArrow">
@@ -6033,7 +6034,7 @@
         </p:nvSpPr>
         <p:spPr>
           <a:xfrm>
-            <a:off x="5074180" y="9846637"/>
+            <a:off x="4508831" y="9846636"/>
             <a:ext cx="381964" cy="428262"/>
           </a:xfrm>
           <a:prstGeom prst="downArrow">
@@ -6082,7 +6083,7 @@
         </p:nvSpPr>
         <p:spPr>
           <a:xfrm>
-            <a:off x="5074180" y="11043988"/>
+            <a:off x="4508831" y="11043987"/>
             <a:ext cx="381964" cy="428262"/>
           </a:xfrm>
           <a:prstGeom prst="downArrow">
@@ -6131,7 +6132,7 @@
         </p:nvSpPr>
         <p:spPr>
           <a:xfrm>
-            <a:off x="4271425" y="11472251"/>
+            <a:off x="3706076" y="11472250"/>
             <a:ext cx="1987475" cy="755561"/>
           </a:xfrm>
           <a:prstGeom prst="rect">
@@ -6439,48 +6440,6 @@
           </a:p>
         </p:txBody>
       </p:sp>
-      <p:cxnSp>
-        <p:nvCxnSpPr>
-          <p:cNvPr id="103" name="Straight Arrow Connector 102">
-            <a:extLst>
-              <a:ext uri="{FF2B5EF4-FFF2-40B4-BE49-F238E27FC236}">
-                <a16:creationId xmlns:a16="http://schemas.microsoft.com/office/drawing/2014/main" id="{48E82184-43C1-7D46-9834-06EBC665D3F5}"/>
-              </a:ext>
-            </a:extLst>
-          </p:cNvPr>
-          <p:cNvCxnSpPr>
-            <a:cxnSpLocks/>
-            <a:stCxn id="86" idx="3"/>
-          </p:cNvCxnSpPr>
-          <p:nvPr/>
-        </p:nvCxnSpPr>
-        <p:spPr>
-          <a:xfrm>
-            <a:off x="6229958" y="5949594"/>
-            <a:ext cx="1374996" cy="344069"/>
-          </a:xfrm>
-          <a:prstGeom prst="straightConnector1">
-            <a:avLst/>
-          </a:prstGeom>
-          <a:ln>
-            <a:tailEnd type="triangle"/>
-          </a:ln>
-        </p:spPr>
-        <p:style>
-          <a:lnRef idx="1">
-            <a:schemeClr val="dk1"/>
-          </a:lnRef>
-          <a:fillRef idx="0">
-            <a:schemeClr val="dk1"/>
-          </a:fillRef>
-          <a:effectRef idx="0">
-            <a:schemeClr val="dk1"/>
-          </a:effectRef>
-          <a:fontRef idx="minor">
-            <a:schemeClr val="tx1"/>
-          </a:fontRef>
-        </p:style>
-      </p:cxnSp>
       <p:sp>
         <p:nvSpPr>
           <p:cNvPr id="110" name="Diamond 109">
@@ -6650,8 +6609,8 @@
         </p:nvSpPr>
         <p:spPr>
           <a:xfrm>
-            <a:off x="2698418" y="5231968"/>
-            <a:ext cx="299326" cy="1111170"/>
+            <a:off x="2698417" y="5026791"/>
+            <a:ext cx="440421" cy="2126799"/>
           </a:xfrm>
           <a:prstGeom prst="leftBracket">
             <a:avLst/>
@@ -6730,7 +6689,7 @@
         </p:nvSpPr>
         <p:spPr>
           <a:xfrm>
-            <a:off x="4064291" y="6105268"/>
+            <a:off x="3498942" y="6105267"/>
             <a:ext cx="2423155" cy="756806"/>
           </a:xfrm>
           <a:prstGeom prst="diamond">
@@ -6779,7 +6738,7 @@
         </p:nvSpPr>
         <p:spPr>
           <a:xfrm>
-            <a:off x="4242482" y="6881353"/>
+            <a:off x="3677133" y="6881352"/>
             <a:ext cx="1987475" cy="299327"/>
           </a:xfrm>
           <a:prstGeom prst="rect">
@@ -6964,36 +6923,42 @@
       </p:grpSpPr>
       <p:sp>
         <p:nvSpPr>
-          <p:cNvPr id="4" name="Diamond 3">
-            <a:extLst>
-              <a:ext uri="{FF2B5EF4-FFF2-40B4-BE49-F238E27FC236}">
-                <a16:creationId xmlns:a16="http://schemas.microsoft.com/office/drawing/2014/main" id="{DBB06CCC-4012-7142-8209-4D3CA3521F99}"/>
-              </a:ext>
-            </a:extLst>
-          </p:cNvPr>
-          <p:cNvSpPr/>
-          <p:nvPr/>
-        </p:nvSpPr>
-        <p:spPr>
-          <a:xfrm>
-            <a:off x="4354286" y="3857263"/>
-            <a:ext cx="2423155" cy="835996"/>
-          </a:xfrm>
-          <a:prstGeom prst="diamond">
-            <a:avLst/>
-          </a:prstGeom>
+          <p:cNvPr id="246" name="Rectangle 245">
+            <a:extLst>
+              <a:ext uri="{FF2B5EF4-FFF2-40B4-BE49-F238E27FC236}">
+                <a16:creationId xmlns:a16="http://schemas.microsoft.com/office/drawing/2014/main" id="{21EBD558-2A2F-AE47-AA00-988700403061}"/>
+              </a:ext>
+            </a:extLst>
+          </p:cNvPr>
+          <p:cNvSpPr/>
+          <p:nvPr/>
+        </p:nvSpPr>
+        <p:spPr>
+          <a:xfrm>
+            <a:off x="2636928" y="3680413"/>
+            <a:ext cx="1987475" cy="645277"/>
+          </a:xfrm>
+          <a:prstGeom prst="rect">
+            <a:avLst/>
+          </a:prstGeom>
+          <a:solidFill>
+            <a:schemeClr val="accent2">
+              <a:lumMod val="60000"/>
+              <a:lumOff val="40000"/>
+            </a:schemeClr>
+          </a:solidFill>
         </p:spPr>
         <p:style>
           <a:lnRef idx="2">
-            <a:schemeClr val="accent1">
+            <a:schemeClr val="accent4">
               <a:shade val="50000"/>
             </a:schemeClr>
           </a:lnRef>
           <a:fillRef idx="1">
-            <a:schemeClr val="accent1"/>
-          </a:fillRef>
-          <a:effectRef idx="0">
-            <a:schemeClr val="accent1"/>
+            <a:schemeClr val="accent4"/>
+          </a:fillRef>
+          <a:effectRef idx="0">
+            <a:schemeClr val="accent4"/>
           </a:effectRef>
           <a:fontRef idx="minor">
             <a:schemeClr val="lt1"/>
@@ -7005,91 +6970,339 @@
           <a:p>
             <a:pPr algn="ctr"/>
             <a:r>
-              <a:rPr lang="en-US"/>
-              <a:t>2-layers</a:t>
+              <a:rPr lang="en-US" sz="1600"/>
+              <a:t>move.global</a:t>
             </a:r>
             <a:br>
-              <a:rPr lang="en-US"/>
+              <a:rPr lang="en-US" sz="1600" b="1"/>
             </a:br>
             <a:r>
-              <a:rPr lang="en-US"/>
-              <a:t>GRU</a:t>
-            </a:r>
-          </a:p>
-        </p:txBody>
-      </p:sp>
-      <p:sp>
-        <p:nvSpPr>
-          <p:cNvPr id="5" name="Down Arrow 4">
-            <a:extLst>
-              <a:ext uri="{FF2B5EF4-FFF2-40B4-BE49-F238E27FC236}">
-                <a16:creationId xmlns:a16="http://schemas.microsoft.com/office/drawing/2014/main" id="{2E1E1C2B-5B16-004D-95B2-00203BDC4738}"/>
-              </a:ext>
-            </a:extLst>
-          </p:cNvPr>
-          <p:cNvSpPr/>
-          <p:nvPr/>
-        </p:nvSpPr>
-        <p:spPr>
-          <a:xfrm>
-            <a:off x="5386454" y="3429001"/>
-            <a:ext cx="381964" cy="428262"/>
-          </a:xfrm>
-          <a:prstGeom prst="downArrow">
-            <a:avLst/>
-          </a:prstGeom>
-          <a:solidFill>
-            <a:schemeClr val="bg1"/>
-          </a:solidFill>
-        </p:spPr>
-        <p:style>
-          <a:lnRef idx="2">
-            <a:schemeClr val="accent1">
-              <a:shade val="50000"/>
-            </a:schemeClr>
-          </a:lnRef>
-          <a:fillRef idx="1">
-            <a:schemeClr val="accent1"/>
-          </a:fillRef>
-          <a:effectRef idx="0">
-            <a:schemeClr val="accent1"/>
-          </a:effectRef>
-          <a:fontRef idx="minor">
-            <a:schemeClr val="lt1"/>
-          </a:fontRef>
-        </p:style>
-        <p:txBody>
-          <a:bodyPr wrap="none" rtlCol="0" anchor="ctr"/>
-          <a:lstStyle/>
-          <a:p>
-            <a:pPr algn="ctr"/>
-            <a:r>
-              <a:rPr lang="en-US" b="1">
+              <a:rPr lang="en-US" sz="1600" b="1">
                 <a:solidFill>
                   <a:schemeClr val="tx1"/>
                 </a:solidFill>
               </a:rPr>
-              <a:t>I n p u t</a:t>
-            </a:r>
-          </a:p>
-        </p:txBody>
-      </p:sp>
-      <p:sp>
-        <p:nvSpPr>
-          <p:cNvPr id="7" name="Rectangle 6">
-            <a:extLst>
-              <a:ext uri="{FF2B5EF4-FFF2-40B4-BE49-F238E27FC236}">
-                <a16:creationId xmlns:a16="http://schemas.microsoft.com/office/drawing/2014/main" id="{CEB94528-BBB3-B44D-860D-084ECFCFE803}"/>
-              </a:ext>
-            </a:extLst>
-          </p:cNvPr>
-          <p:cNvSpPr/>
-          <p:nvPr/>
-        </p:nvSpPr>
-        <p:spPr>
-          <a:xfrm>
-            <a:off x="4572125" y="5038712"/>
-            <a:ext cx="1987475" cy="530651"/>
+              <a:t>Word Embedding</a:t>
+            </a:r>
+          </a:p>
+        </p:txBody>
+      </p:sp>
+      <p:sp>
+        <p:nvSpPr>
+          <p:cNvPr id="247" name="Rectangle 246">
+            <a:extLst>
+              <a:ext uri="{FF2B5EF4-FFF2-40B4-BE49-F238E27FC236}">
+                <a16:creationId xmlns:a16="http://schemas.microsoft.com/office/drawing/2014/main" id="{4FE39300-1A73-8E45-BF1A-6C75B44DC8C0}"/>
+              </a:ext>
+            </a:extLst>
+          </p:cNvPr>
+          <p:cNvSpPr/>
+          <p:nvPr/>
+        </p:nvSpPr>
+        <p:spPr>
+          <a:xfrm>
+            <a:off x="4647772" y="3680413"/>
+            <a:ext cx="1987475" cy="645277"/>
+          </a:xfrm>
+          <a:prstGeom prst="rect">
+            <a:avLst/>
+          </a:prstGeom>
+        </p:spPr>
+        <p:style>
+          <a:lnRef idx="2">
+            <a:schemeClr val="accent4">
+              <a:shade val="50000"/>
+            </a:schemeClr>
+          </a:lnRef>
+          <a:fillRef idx="1">
+            <a:schemeClr val="accent4"/>
+          </a:fillRef>
+          <a:effectRef idx="0">
+            <a:schemeClr val="accent4"/>
+          </a:effectRef>
+          <a:fontRef idx="minor">
+            <a:schemeClr val="lt1"/>
+          </a:fontRef>
+        </p:style>
+        <p:txBody>
+          <a:bodyPr rtlCol="0" anchor="ctr"/>
+          <a:lstStyle/>
+          <a:p>
+            <a:pPr algn="ctr"/>
+            <a:r>
+              <a:rPr lang="en-US" sz="1600"/>
+              <a:t>move.global</a:t>
+            </a:r>
+            <a:br>
+              <a:rPr lang="en-US" sz="1600" b="1"/>
+            </a:br>
+            <a:r>
+              <a:rPr lang="en-US" sz="1600" b="1">
+                <a:solidFill>
+                  <a:schemeClr val="tx1"/>
+                </a:solidFill>
+              </a:rPr>
+              <a:t>Word Node State</a:t>
+            </a:r>
+          </a:p>
+        </p:txBody>
+      </p:sp>
+      <p:sp>
+        <p:nvSpPr>
+          <p:cNvPr id="248" name="Rectangle 247">
+            <a:extLst>
+              <a:ext uri="{FF2B5EF4-FFF2-40B4-BE49-F238E27FC236}">
+                <a16:creationId xmlns:a16="http://schemas.microsoft.com/office/drawing/2014/main" id="{D35CF018-7FC4-684A-9DA9-60D958BF6D57}"/>
+              </a:ext>
+            </a:extLst>
+          </p:cNvPr>
+          <p:cNvSpPr/>
+          <p:nvPr/>
+        </p:nvSpPr>
+        <p:spPr>
+          <a:xfrm>
+            <a:off x="6658616" y="3680413"/>
+            <a:ext cx="1987475" cy="645277"/>
+          </a:xfrm>
+          <a:prstGeom prst="rect">
+            <a:avLst/>
+          </a:prstGeom>
+        </p:spPr>
+        <p:style>
+          <a:lnRef idx="1">
+            <a:schemeClr val="accent6"/>
+          </a:lnRef>
+          <a:fillRef idx="2">
+            <a:schemeClr val="accent6"/>
+          </a:fillRef>
+          <a:effectRef idx="1">
+            <a:schemeClr val="accent6"/>
+          </a:effectRef>
+          <a:fontRef idx="minor">
+            <a:schemeClr val="dk1"/>
+          </a:fontRef>
+        </p:style>
+        <p:txBody>
+          <a:bodyPr rtlCol="0" anchor="ctr"/>
+          <a:lstStyle/>
+          <a:p>
+            <a:pPr algn="ctr"/>
+            <a:r>
+              <a:rPr lang="en-US" sz="1600"/>
+              <a:t>Move.v.2</a:t>
+            </a:r>
+            <a:br>
+              <a:rPr lang="en-US" sz="1600" b="1"/>
+            </a:br>
+            <a:r>
+              <a:rPr lang="en-US" sz="1600" b="1"/>
+              <a:t>Sense </a:t>
+            </a:r>
+            <a:r>
+              <a:rPr lang="en-US" sz="1600" b="1">
+                <a:solidFill>
+                  <a:schemeClr val="tx1"/>
+                </a:solidFill>
+              </a:rPr>
+              <a:t>Node State</a:t>
+            </a:r>
+          </a:p>
+        </p:txBody>
+      </p:sp>
+      <p:sp>
+        <p:nvSpPr>
+          <p:cNvPr id="249" name="TextBox 248">
+            <a:extLst>
+              <a:ext uri="{FF2B5EF4-FFF2-40B4-BE49-F238E27FC236}">
+                <a16:creationId xmlns:a16="http://schemas.microsoft.com/office/drawing/2014/main" id="{1AD4AF1E-29BB-C843-81FD-DB36FE67382B}"/>
+              </a:ext>
+            </a:extLst>
+          </p:cNvPr>
+          <p:cNvSpPr txBox="1"/>
+          <p:nvPr/>
+        </p:nvSpPr>
+        <p:spPr>
+          <a:xfrm>
+            <a:off x="838722" y="3869277"/>
+            <a:ext cx="1602487" cy="369332"/>
+          </a:xfrm>
+          <a:prstGeom prst="rect">
+            <a:avLst/>
+          </a:prstGeom>
+          <a:noFill/>
+        </p:spPr>
+        <p:txBody>
+          <a:bodyPr wrap="square" rtlCol="0">
+            <a:spAutoFit/>
+          </a:bodyPr>
+          <a:lstStyle/>
+          <a:p>
+            <a:r>
+              <a:rPr lang="en-US"/>
+              <a:t>Concatenated:</a:t>
+            </a:r>
+          </a:p>
+        </p:txBody>
+      </p:sp>
+      <p:sp>
+        <p:nvSpPr>
+          <p:cNvPr id="257" name="Down Arrow 256">
+            <a:extLst>
+              <a:ext uri="{FF2B5EF4-FFF2-40B4-BE49-F238E27FC236}">
+                <a16:creationId xmlns:a16="http://schemas.microsoft.com/office/drawing/2014/main" id="{18F0D862-3477-2D4C-BA18-3CA75A087836}"/>
+              </a:ext>
+            </a:extLst>
+          </p:cNvPr>
+          <p:cNvSpPr/>
+          <p:nvPr/>
+        </p:nvSpPr>
+        <p:spPr>
+          <a:xfrm>
+            <a:off x="5075919" y="4525190"/>
+            <a:ext cx="381964" cy="473605"/>
+          </a:xfrm>
+          <a:prstGeom prst="downArrow">
+            <a:avLst/>
+          </a:prstGeom>
+          <a:solidFill>
+            <a:schemeClr val="bg1"/>
+          </a:solidFill>
+        </p:spPr>
+        <p:style>
+          <a:lnRef idx="2">
+            <a:schemeClr val="accent1">
+              <a:shade val="50000"/>
+            </a:schemeClr>
+          </a:lnRef>
+          <a:fillRef idx="1">
+            <a:schemeClr val="accent1"/>
+          </a:fillRef>
+          <a:effectRef idx="0">
+            <a:schemeClr val="accent1"/>
+          </a:effectRef>
+          <a:fontRef idx="minor">
+            <a:schemeClr val="lt1"/>
+          </a:fontRef>
+        </p:style>
+        <p:txBody>
+          <a:bodyPr rtlCol="0" anchor="ctr"/>
+          <a:lstStyle/>
+          <a:p>
+            <a:pPr algn="ctr"/>
+            <a:endParaRPr lang="en-US"/>
+          </a:p>
+        </p:txBody>
+      </p:sp>
+      <p:sp>
+        <p:nvSpPr>
+          <p:cNvPr id="258" name="Left Bracket 257">
+            <a:extLst>
+              <a:ext uri="{FF2B5EF4-FFF2-40B4-BE49-F238E27FC236}">
+                <a16:creationId xmlns:a16="http://schemas.microsoft.com/office/drawing/2014/main" id="{161D59A0-97E8-A340-937B-F8E6E9BF767B}"/>
+              </a:ext>
+            </a:extLst>
+          </p:cNvPr>
+          <p:cNvSpPr/>
+          <p:nvPr/>
+        </p:nvSpPr>
+        <p:spPr>
+          <a:xfrm rot="-5400000">
+            <a:off x="5497536" y="1181645"/>
+            <a:ext cx="299326" cy="6370202"/>
+          </a:xfrm>
+          <a:prstGeom prst="leftBracket">
+            <a:avLst/>
+          </a:prstGeom>
+          <a:ln w="12700"/>
+        </p:spPr>
+        <p:style>
+          <a:lnRef idx="1">
+            <a:schemeClr val="accent1"/>
+          </a:lnRef>
+          <a:fillRef idx="0">
+            <a:schemeClr val="accent1"/>
+          </a:fillRef>
+          <a:effectRef idx="0">
+            <a:schemeClr val="accent1"/>
+          </a:effectRef>
+          <a:fontRef idx="minor">
+            <a:schemeClr val="tx1"/>
+          </a:fontRef>
+        </p:style>
+        <p:txBody>
+          <a:bodyPr rtlCol="0" anchor="ctr"/>
+          <a:lstStyle/>
+          <a:p>
+            <a:pPr algn="ctr"/>
+            <a:endParaRPr lang="en-US"/>
+          </a:p>
+        </p:txBody>
+      </p:sp>
+      <p:sp>
+        <p:nvSpPr>
+          <p:cNvPr id="259" name="Diamond 258">
+            <a:extLst>
+              <a:ext uri="{FF2B5EF4-FFF2-40B4-BE49-F238E27FC236}">
+                <a16:creationId xmlns:a16="http://schemas.microsoft.com/office/drawing/2014/main" id="{39D90A8D-B5BB-4B48-AC59-75E00CEEE05C}"/>
+              </a:ext>
+            </a:extLst>
+          </p:cNvPr>
+          <p:cNvSpPr/>
+          <p:nvPr/>
+        </p:nvSpPr>
+        <p:spPr>
+          <a:xfrm>
+            <a:off x="4054200" y="5026792"/>
+            <a:ext cx="2423155" cy="756806"/>
+          </a:xfrm>
+          <a:prstGeom prst="diamond">
+            <a:avLst/>
+          </a:prstGeom>
+        </p:spPr>
+        <p:style>
+          <a:lnRef idx="2">
+            <a:schemeClr val="accent1">
+              <a:shade val="50000"/>
+            </a:schemeClr>
+          </a:lnRef>
+          <a:fillRef idx="1">
+            <a:schemeClr val="accent1"/>
+          </a:fillRef>
+          <a:effectRef idx="0">
+            <a:schemeClr val="accent1"/>
+          </a:effectRef>
+          <a:fontRef idx="minor">
+            <a:schemeClr val="lt1"/>
+          </a:fontRef>
+        </p:style>
+        <p:txBody>
+          <a:bodyPr rtlCol="0" anchor="ctr"/>
+          <a:lstStyle/>
+          <a:p>
+            <a:pPr algn="ctr"/>
+            <a:r>
+              <a:rPr lang="en-US"/>
+              <a:t>Layer 1 of GRU</a:t>
+            </a:r>
+          </a:p>
+        </p:txBody>
+      </p:sp>
+      <p:sp>
+        <p:nvSpPr>
+          <p:cNvPr id="86" name="Rectangle 85">
+            <a:extLst>
+              <a:ext uri="{FF2B5EF4-FFF2-40B4-BE49-F238E27FC236}">
+                <a16:creationId xmlns:a16="http://schemas.microsoft.com/office/drawing/2014/main" id="{04720A63-B472-2649-946A-1480BD193270}"/>
+              </a:ext>
+            </a:extLst>
+          </p:cNvPr>
+          <p:cNvSpPr/>
+          <p:nvPr/>
+        </p:nvSpPr>
+        <p:spPr>
+          <a:xfrm>
+            <a:off x="4242483" y="5799930"/>
+            <a:ext cx="1987475" cy="299327"/>
           </a:xfrm>
           <a:prstGeom prst="rect">
             <a:avLst/>
@@ -7128,46 +7341,26 @@
                   <a:schemeClr val="tx1"/>
                 </a:solidFill>
               </a:rPr>
-              <a:t>Encoding </a:t>
-            </a:r>
-            <a:br>
-              <a:rPr lang="en-US" sz="1600">
-                <a:solidFill>
-                  <a:schemeClr val="tx1"/>
-                </a:solidFill>
-              </a:rPr>
-            </a:br>
-            <a:r>
-              <a:rPr lang="en-US" sz="1600">
-                <a:solidFill>
-                  <a:schemeClr val="tx1"/>
-                </a:solidFill>
-              </a:rPr>
-              <a:t>(Hidden state 2)</a:t>
-            </a:r>
-            <a:endParaRPr lang="en-US" sz="1600" b="1">
-              <a:solidFill>
-                <a:schemeClr val="tx1"/>
-              </a:solidFill>
-            </a:endParaRPr>
-          </a:p>
-        </p:txBody>
-      </p:sp>
-      <p:sp>
-        <p:nvSpPr>
-          <p:cNvPr id="10" name="Diamond 9">
-            <a:extLst>
-              <a:ext uri="{FF2B5EF4-FFF2-40B4-BE49-F238E27FC236}">
-                <a16:creationId xmlns:a16="http://schemas.microsoft.com/office/drawing/2014/main" id="{E26FEDF0-E397-024D-A02E-1E1D21E34639}"/>
-              </a:ext>
-            </a:extLst>
-          </p:cNvPr>
-          <p:cNvSpPr/>
-          <p:nvPr/>
-        </p:nvSpPr>
-        <p:spPr>
-          <a:xfrm>
-            <a:off x="4354284" y="6014410"/>
+              <a:t>Hidden state 1</a:t>
+            </a:r>
+          </a:p>
+        </p:txBody>
+      </p:sp>
+      <p:sp>
+        <p:nvSpPr>
+          <p:cNvPr id="87" name="Diamond 86">
+            <a:extLst>
+              <a:ext uri="{FF2B5EF4-FFF2-40B4-BE49-F238E27FC236}">
+                <a16:creationId xmlns:a16="http://schemas.microsoft.com/office/drawing/2014/main" id="{D720A14A-448F-C74D-9782-DA58BDCF5657}"/>
+              </a:ext>
+            </a:extLst>
+          </p:cNvPr>
+          <p:cNvSpPr/>
+          <p:nvPr/>
+        </p:nvSpPr>
+        <p:spPr>
+          <a:xfrm>
+            <a:off x="4053586" y="8026165"/>
             <a:ext cx="2423155" cy="835996"/>
           </a:xfrm>
           <a:prstGeom prst="diamond">
@@ -7212,19 +7405,19 @@
       </p:sp>
       <p:sp>
         <p:nvSpPr>
-          <p:cNvPr id="12" name="Rectangle 11">
-            <a:extLst>
-              <a:ext uri="{FF2B5EF4-FFF2-40B4-BE49-F238E27FC236}">
-                <a16:creationId xmlns:a16="http://schemas.microsoft.com/office/drawing/2014/main" id="{BF9CF074-2BFA-2E4A-A782-5519DDEB6F3B}"/>
-              </a:ext>
-            </a:extLst>
-          </p:cNvPr>
-          <p:cNvSpPr/>
-          <p:nvPr/>
-        </p:nvSpPr>
-        <p:spPr>
-          <a:xfrm>
-            <a:off x="4596390" y="7311609"/>
+          <p:cNvPr id="88" name="Rectangle 87">
+            <a:extLst>
+              <a:ext uri="{FF2B5EF4-FFF2-40B4-BE49-F238E27FC236}">
+                <a16:creationId xmlns:a16="http://schemas.microsoft.com/office/drawing/2014/main" id="{B6224982-B82A-1543-8A21-0A983FA65669}"/>
+              </a:ext>
+            </a:extLst>
+          </p:cNvPr>
+          <p:cNvSpPr/>
+          <p:nvPr/>
+        </p:nvSpPr>
+        <p:spPr>
+          <a:xfrm>
+            <a:off x="4295692" y="9323364"/>
             <a:ext cx="1987475" cy="530651"/>
           </a:xfrm>
           <a:prstGeom prst="rect">
@@ -7271,109 +7464,20 @@
       </p:sp>
       <p:sp>
         <p:nvSpPr>
-          <p:cNvPr id="14" name="Oval 13">
-            <a:extLst>
-              <a:ext uri="{FF2B5EF4-FFF2-40B4-BE49-F238E27FC236}">
-                <a16:creationId xmlns:a16="http://schemas.microsoft.com/office/drawing/2014/main" id="{CC2973EE-8363-8F47-BA1C-C19ED98DECD3}"/>
-              </a:ext>
-            </a:extLst>
-          </p:cNvPr>
-          <p:cNvSpPr/>
-          <p:nvPr/>
-        </p:nvSpPr>
-        <p:spPr>
-          <a:xfrm>
-            <a:off x="5189683" y="8267181"/>
-            <a:ext cx="752354" cy="755561"/>
-          </a:xfrm>
-          <a:prstGeom prst="ellipse">
-            <a:avLst/>
-          </a:prstGeom>
-        </p:spPr>
-        <p:style>
-          <a:lnRef idx="1">
-            <a:schemeClr val="accent3"/>
-          </a:lnRef>
-          <a:fillRef idx="2">
-            <a:schemeClr val="accent3"/>
-          </a:fillRef>
-          <a:effectRef idx="1">
-            <a:schemeClr val="accent3"/>
-          </a:effectRef>
-          <a:fontRef idx="minor">
-            <a:schemeClr val="dk1"/>
-          </a:fontRef>
-        </p:style>
-        <p:txBody>
-          <a:bodyPr wrap="none" rtlCol="0" anchor="ctr"/>
-          <a:lstStyle/>
-          <a:p>
-            <a:pPr algn="ctr"/>
-            <a:r>
-              <a:rPr lang="en-US"/>
-              <a:t>Softmax</a:t>
-            </a:r>
-          </a:p>
-        </p:txBody>
-      </p:sp>
-      <p:cxnSp>
-        <p:nvCxnSpPr>
-          <p:cNvPr id="16" name="Straight Arrow Connector 15">
-            <a:extLst>
-              <a:ext uri="{FF2B5EF4-FFF2-40B4-BE49-F238E27FC236}">
-                <a16:creationId xmlns:a16="http://schemas.microsoft.com/office/drawing/2014/main" id="{085041C8-9843-9647-A903-D4B6FE815AA6}"/>
-              </a:ext>
-            </a:extLst>
-          </p:cNvPr>
-          <p:cNvCxnSpPr>
-            <a:stCxn id="4" idx="2"/>
-            <a:endCxn id="7" idx="0"/>
-          </p:cNvCxnSpPr>
-          <p:nvPr/>
-        </p:nvCxnSpPr>
-        <p:spPr>
-          <a:xfrm flipH="1">
-            <a:off x="5565863" y="4693259"/>
-            <a:ext cx="1" cy="345452"/>
-          </a:xfrm>
-          <a:prstGeom prst="straightConnector1">
-            <a:avLst/>
-          </a:prstGeom>
-          <a:ln>
-            <a:tailEnd type="triangle"/>
-          </a:ln>
-        </p:spPr>
-        <p:style>
-          <a:lnRef idx="1">
-            <a:schemeClr val="dk1"/>
-          </a:lnRef>
-          <a:fillRef idx="0">
-            <a:schemeClr val="dk1"/>
-          </a:fillRef>
-          <a:effectRef idx="0">
-            <a:schemeClr val="dk1"/>
-          </a:effectRef>
-          <a:fontRef idx="minor">
-            <a:schemeClr val="tx1"/>
-          </a:fontRef>
-        </p:style>
-      </p:cxnSp>
-      <p:sp>
-        <p:nvSpPr>
-          <p:cNvPr id="17" name="Down Arrow 16">
-            <a:extLst>
-              <a:ext uri="{FF2B5EF4-FFF2-40B4-BE49-F238E27FC236}">
-                <a16:creationId xmlns:a16="http://schemas.microsoft.com/office/drawing/2014/main" id="{DBF5080D-6078-4A4D-A114-6B041E937229}"/>
-              </a:ext>
-            </a:extLst>
-          </p:cNvPr>
-          <p:cNvSpPr/>
-          <p:nvPr/>
-        </p:nvSpPr>
-        <p:spPr>
-          <a:xfrm>
-            <a:off x="5386454" y="5564633"/>
-            <a:ext cx="381964" cy="428262"/>
+          <p:cNvPr id="92" name="Down Arrow 91">
+            <a:extLst>
+              <a:ext uri="{FF2B5EF4-FFF2-40B4-BE49-F238E27FC236}">
+                <a16:creationId xmlns:a16="http://schemas.microsoft.com/office/drawing/2014/main" id="{8B86E277-3EBE-4D4D-906B-94475D1125B4}"/>
+              </a:ext>
+            </a:extLst>
+          </p:cNvPr>
+          <p:cNvSpPr/>
+          <p:nvPr/>
+        </p:nvSpPr>
+        <p:spPr>
+          <a:xfrm>
+            <a:off x="5096367" y="7190170"/>
+            <a:ext cx="381964" cy="835995"/>
           </a:xfrm>
           <a:prstGeom prst="downArrow">
             <a:avLst/>
@@ -7409,19 +7513,19 @@
       </p:sp>
       <p:sp>
         <p:nvSpPr>
-          <p:cNvPr id="18" name="Down Arrow 17">
-            <a:extLst>
-              <a:ext uri="{FF2B5EF4-FFF2-40B4-BE49-F238E27FC236}">
-                <a16:creationId xmlns:a16="http://schemas.microsoft.com/office/drawing/2014/main" id="{78948B97-2EB5-7C44-8661-F8FF659EEC11}"/>
-              </a:ext>
-            </a:extLst>
-          </p:cNvPr>
-          <p:cNvSpPr/>
-          <p:nvPr/>
-        </p:nvSpPr>
-        <p:spPr>
-          <a:xfrm>
-            <a:off x="5386454" y="6850406"/>
+          <p:cNvPr id="93" name="Down Arrow 92">
+            <a:extLst>
+              <a:ext uri="{FF2B5EF4-FFF2-40B4-BE49-F238E27FC236}">
+                <a16:creationId xmlns:a16="http://schemas.microsoft.com/office/drawing/2014/main" id="{5A0602D7-C1C7-184A-B336-BDBBEA25EBA2}"/>
+              </a:ext>
+            </a:extLst>
+          </p:cNvPr>
+          <p:cNvSpPr/>
+          <p:nvPr/>
+        </p:nvSpPr>
+        <p:spPr>
+          <a:xfrm>
+            <a:off x="5085756" y="8862161"/>
             <a:ext cx="381964" cy="428262"/>
           </a:xfrm>
           <a:prstGeom prst="downArrow">
@@ -7458,19 +7562,19 @@
       </p:sp>
       <p:sp>
         <p:nvSpPr>
-          <p:cNvPr id="19" name="Down Arrow 18">
-            <a:extLst>
-              <a:ext uri="{FF2B5EF4-FFF2-40B4-BE49-F238E27FC236}">
-                <a16:creationId xmlns:a16="http://schemas.microsoft.com/office/drawing/2014/main" id="{8C470EB7-41A5-5C4D-8682-9F0FDF9C952B}"/>
-              </a:ext>
-            </a:extLst>
-          </p:cNvPr>
-          <p:cNvSpPr/>
-          <p:nvPr/>
-        </p:nvSpPr>
-        <p:spPr>
-          <a:xfrm>
-            <a:off x="5374878" y="7834882"/>
+          <p:cNvPr id="94" name="Down Arrow 93">
+            <a:extLst>
+              <a:ext uri="{FF2B5EF4-FFF2-40B4-BE49-F238E27FC236}">
+                <a16:creationId xmlns:a16="http://schemas.microsoft.com/office/drawing/2014/main" id="{9C0E5ABE-5384-D840-81FE-E7F6C349D18F}"/>
+              </a:ext>
+            </a:extLst>
+          </p:cNvPr>
+          <p:cNvSpPr/>
+          <p:nvPr/>
+        </p:nvSpPr>
+        <p:spPr>
+          <a:xfrm>
+            <a:off x="5074180" y="9846637"/>
             <a:ext cx="381964" cy="428262"/>
           </a:xfrm>
           <a:prstGeom prst="downArrow">
@@ -7507,127 +7611,19 @@
       </p:sp>
       <p:sp>
         <p:nvSpPr>
-          <p:cNvPr id="20" name="Down Arrow 19">
-            <a:extLst>
-              <a:ext uri="{FF2B5EF4-FFF2-40B4-BE49-F238E27FC236}">
-                <a16:creationId xmlns:a16="http://schemas.microsoft.com/office/drawing/2014/main" id="{3D411D0C-0351-B247-8E17-DF97F0AC5EA3}"/>
-              </a:ext>
-            </a:extLst>
-          </p:cNvPr>
-          <p:cNvSpPr/>
-          <p:nvPr/>
-        </p:nvSpPr>
-        <p:spPr>
-          <a:xfrm>
-            <a:off x="5374878" y="9032233"/>
-            <a:ext cx="381964" cy="428262"/>
-          </a:xfrm>
-          <a:prstGeom prst="downArrow">
-            <a:avLst/>
-          </a:prstGeom>
-          <a:solidFill>
-            <a:schemeClr val="bg1"/>
-          </a:solidFill>
-        </p:spPr>
-        <p:style>
-          <a:lnRef idx="2">
-            <a:schemeClr val="accent1">
-              <a:shade val="50000"/>
-            </a:schemeClr>
-          </a:lnRef>
-          <a:fillRef idx="1">
-            <a:schemeClr val="accent1"/>
-          </a:fillRef>
-          <a:effectRef idx="0">
-            <a:schemeClr val="accent1"/>
-          </a:effectRef>
-          <a:fontRef idx="minor">
-            <a:schemeClr val="lt1"/>
-          </a:fontRef>
-        </p:style>
-        <p:txBody>
-          <a:bodyPr rtlCol="0" anchor="ctr"/>
-          <a:lstStyle/>
-          <a:p>
-            <a:pPr algn="ctr"/>
-            <a:endParaRPr lang="en-US"/>
-          </a:p>
-        </p:txBody>
-      </p:sp>
-      <p:sp>
-        <p:nvSpPr>
-          <p:cNvPr id="21" name="Rectangle 20">
-            <a:extLst>
-              <a:ext uri="{FF2B5EF4-FFF2-40B4-BE49-F238E27FC236}">
-                <a16:creationId xmlns:a16="http://schemas.microsoft.com/office/drawing/2014/main" id="{5BACE416-FE57-2945-89A6-FCFC8709676C}"/>
-              </a:ext>
-            </a:extLst>
-          </p:cNvPr>
-          <p:cNvSpPr/>
-          <p:nvPr/>
-        </p:nvSpPr>
-        <p:spPr>
-          <a:xfrm>
-            <a:off x="4572123" y="9460496"/>
-            <a:ext cx="1987475" cy="755561"/>
-          </a:xfrm>
-          <a:prstGeom prst="rect">
-            <a:avLst/>
-          </a:prstGeom>
-          <a:solidFill>
-            <a:schemeClr val="accent4">
-              <a:lumMod val="40000"/>
-              <a:lumOff val="60000"/>
-            </a:schemeClr>
-          </a:solidFill>
-        </p:spPr>
-        <p:style>
-          <a:lnRef idx="2">
-            <a:schemeClr val="accent5">
-              <a:shade val="50000"/>
-            </a:schemeClr>
-          </a:lnRef>
-          <a:fillRef idx="1">
-            <a:schemeClr val="accent5"/>
-          </a:fillRef>
-          <a:effectRef idx="0">
-            <a:schemeClr val="accent5"/>
-          </a:effectRef>
-          <a:fontRef idx="minor">
-            <a:schemeClr val="lt1"/>
-          </a:fontRef>
-        </p:style>
-        <p:txBody>
-          <a:bodyPr rtlCol="0" anchor="ctr"/>
-          <a:lstStyle/>
-          <a:p>
-            <a:pPr algn="ctr"/>
-            <a:r>
-              <a:rPr lang="en-US" sz="1600">
-                <a:solidFill>
-                  <a:schemeClr val="tx1"/>
-                </a:solidFill>
-              </a:rPr>
-              <a:t>Predicted probabilities – next global word</a:t>
-            </a:r>
-          </a:p>
-        </p:txBody>
-      </p:sp>
-      <p:sp>
-        <p:nvSpPr>
-          <p:cNvPr id="22" name="Rectangle 21">
-            <a:extLst>
-              <a:ext uri="{FF2B5EF4-FFF2-40B4-BE49-F238E27FC236}">
-                <a16:creationId xmlns:a16="http://schemas.microsoft.com/office/drawing/2014/main" id="{3F7175FE-C5F5-9A4E-A7A6-7C7AE95F8F13}"/>
-              </a:ext>
-            </a:extLst>
-          </p:cNvPr>
-          <p:cNvSpPr/>
-          <p:nvPr/>
-        </p:nvSpPr>
-        <p:spPr>
-          <a:xfrm>
-            <a:off x="8348517" y="7311609"/>
+          <p:cNvPr id="97" name="Rectangle 96">
+            <a:extLst>
+              <a:ext uri="{FF2B5EF4-FFF2-40B4-BE49-F238E27FC236}">
+                <a16:creationId xmlns:a16="http://schemas.microsoft.com/office/drawing/2014/main" id="{A58CB02F-E5F6-DC40-9916-827FEEA07178}"/>
+              </a:ext>
+            </a:extLst>
+          </p:cNvPr>
+          <p:cNvSpPr/>
+          <p:nvPr/>
+        </p:nvSpPr>
+        <p:spPr>
+          <a:xfrm>
+            <a:off x="7454580" y="9274087"/>
             <a:ext cx="1987475" cy="530651"/>
           </a:xfrm>
           <a:prstGeom prst="rect">
@@ -7674,66 +7670,19 @@
       </p:sp>
       <p:sp>
         <p:nvSpPr>
-          <p:cNvPr id="23" name="Oval 22">
-            <a:extLst>
-              <a:ext uri="{FF2B5EF4-FFF2-40B4-BE49-F238E27FC236}">
-                <a16:creationId xmlns:a16="http://schemas.microsoft.com/office/drawing/2014/main" id="{6EE07ECA-65A2-0641-AE45-4F768DCC5DBD}"/>
-              </a:ext>
-            </a:extLst>
-          </p:cNvPr>
-          <p:cNvSpPr/>
-          <p:nvPr/>
-        </p:nvSpPr>
-        <p:spPr>
-          <a:xfrm>
-            <a:off x="8941810" y="8267181"/>
-            <a:ext cx="752354" cy="755561"/>
-          </a:xfrm>
-          <a:prstGeom prst="ellipse">
-            <a:avLst/>
-          </a:prstGeom>
-        </p:spPr>
-        <p:style>
-          <a:lnRef idx="1">
-            <a:schemeClr val="accent3"/>
-          </a:lnRef>
-          <a:fillRef idx="2">
-            <a:schemeClr val="accent3"/>
-          </a:fillRef>
-          <a:effectRef idx="1">
-            <a:schemeClr val="accent3"/>
-          </a:effectRef>
-          <a:fontRef idx="minor">
-            <a:schemeClr val="dk1"/>
-          </a:fontRef>
-        </p:style>
-        <p:txBody>
-          <a:bodyPr wrap="none" rtlCol="0" anchor="ctr"/>
-          <a:lstStyle/>
-          <a:p>
-            <a:pPr algn="ctr"/>
-            <a:r>
-              <a:rPr lang="en-US"/>
-              <a:t>Softmax</a:t>
-            </a:r>
-          </a:p>
-        </p:txBody>
-      </p:sp>
-      <p:sp>
-        <p:nvSpPr>
-          <p:cNvPr id="24" name="Down Arrow 23">
-            <a:extLst>
-              <a:ext uri="{FF2B5EF4-FFF2-40B4-BE49-F238E27FC236}">
-                <a16:creationId xmlns:a16="http://schemas.microsoft.com/office/drawing/2014/main" id="{5B8A8200-1A61-9A43-8F04-80F717E9B000}"/>
-              </a:ext>
-            </a:extLst>
-          </p:cNvPr>
-          <p:cNvSpPr/>
-          <p:nvPr/>
-        </p:nvSpPr>
-        <p:spPr>
-          <a:xfrm>
-            <a:off x="9127005" y="7834882"/>
+          <p:cNvPr id="99" name="Down Arrow 98">
+            <a:extLst>
+              <a:ext uri="{FF2B5EF4-FFF2-40B4-BE49-F238E27FC236}">
+                <a16:creationId xmlns:a16="http://schemas.microsoft.com/office/drawing/2014/main" id="{F51D490F-46EF-B84B-A119-C4E3B360FA11}"/>
+              </a:ext>
+            </a:extLst>
+          </p:cNvPr>
+          <p:cNvSpPr/>
+          <p:nvPr/>
+        </p:nvSpPr>
+        <p:spPr>
+          <a:xfrm>
+            <a:off x="8233068" y="9797360"/>
             <a:ext cx="381964" cy="428262"/>
           </a:xfrm>
           <a:prstGeom prst="downArrow">
@@ -7768,22 +7717,121 @@
           </a:p>
         </p:txBody>
       </p:sp>
-      <p:sp>
-        <p:nvSpPr>
-          <p:cNvPr id="25" name="Down Arrow 24">
-            <a:extLst>
-              <a:ext uri="{FF2B5EF4-FFF2-40B4-BE49-F238E27FC236}">
-                <a16:creationId xmlns:a16="http://schemas.microsoft.com/office/drawing/2014/main" id="{454F61DD-CF26-0343-993B-E71B9524B95F}"/>
-              </a:ext>
-            </a:extLst>
-          </p:cNvPr>
-          <p:cNvSpPr/>
-          <p:nvPr/>
-        </p:nvSpPr>
-        <p:spPr>
-          <a:xfrm>
-            <a:off x="9127005" y="9032233"/>
-            <a:ext cx="381964" cy="428262"/>
+      <p:cxnSp>
+        <p:nvCxnSpPr>
+          <p:cNvPr id="103" name="Straight Arrow Connector 102">
+            <a:extLst>
+              <a:ext uri="{FF2B5EF4-FFF2-40B4-BE49-F238E27FC236}">
+                <a16:creationId xmlns:a16="http://schemas.microsoft.com/office/drawing/2014/main" id="{48E82184-43C1-7D46-9834-06EBC665D3F5}"/>
+              </a:ext>
+            </a:extLst>
+          </p:cNvPr>
+          <p:cNvCxnSpPr>
+            <a:cxnSpLocks/>
+            <a:stCxn id="86" idx="3"/>
+          </p:cNvCxnSpPr>
+          <p:nvPr/>
+        </p:nvCxnSpPr>
+        <p:spPr>
+          <a:xfrm>
+            <a:off x="6229958" y="5949594"/>
+            <a:ext cx="1374996" cy="344069"/>
+          </a:xfrm>
+          <a:prstGeom prst="straightConnector1">
+            <a:avLst/>
+          </a:prstGeom>
+          <a:ln>
+            <a:tailEnd type="triangle"/>
+          </a:ln>
+        </p:spPr>
+        <p:style>
+          <a:lnRef idx="1">
+            <a:schemeClr val="dk1"/>
+          </a:lnRef>
+          <a:fillRef idx="0">
+            <a:schemeClr val="dk1"/>
+          </a:fillRef>
+          <a:effectRef idx="0">
+            <a:schemeClr val="dk1"/>
+          </a:effectRef>
+          <a:fontRef idx="minor">
+            <a:schemeClr val="tx1"/>
+          </a:fontRef>
+        </p:style>
+      </p:cxnSp>
+      <p:sp>
+        <p:nvSpPr>
+          <p:cNvPr id="110" name="Diamond 109">
+            <a:extLst>
+              <a:ext uri="{FF2B5EF4-FFF2-40B4-BE49-F238E27FC236}">
+                <a16:creationId xmlns:a16="http://schemas.microsoft.com/office/drawing/2014/main" id="{AE4C2E08-C7CA-1A4F-8A6E-6E8D16B38182}"/>
+              </a:ext>
+            </a:extLst>
+          </p:cNvPr>
+          <p:cNvSpPr/>
+          <p:nvPr/>
+        </p:nvSpPr>
+        <p:spPr>
+          <a:xfrm>
+            <a:off x="7216984" y="8024023"/>
+            <a:ext cx="2423155" cy="835996"/>
+          </a:xfrm>
+          <a:prstGeom prst="diamond">
+            <a:avLst/>
+          </a:prstGeom>
+        </p:spPr>
+        <p:style>
+          <a:lnRef idx="2">
+            <a:schemeClr val="accent1">
+              <a:shade val="50000"/>
+            </a:schemeClr>
+          </a:lnRef>
+          <a:fillRef idx="1">
+            <a:schemeClr val="accent1"/>
+          </a:fillRef>
+          <a:effectRef idx="0">
+            <a:schemeClr val="accent1"/>
+          </a:effectRef>
+          <a:fontRef idx="minor">
+            <a:schemeClr val="lt1"/>
+          </a:fontRef>
+        </p:style>
+        <p:txBody>
+          <a:bodyPr wrap="none" lIns="36000" rIns="36000" rtlCol="0" anchor="ctr"/>
+          <a:lstStyle/>
+          <a:p>
+            <a:pPr algn="ctr"/>
+            <a:r>
+              <a:rPr lang="en-GB"/>
+              <a:t>FF-NN:</a:t>
+            </a:r>
+            <a:br>
+              <a:rPr lang="en-GB"/>
+            </a:br>
+            <a:r>
+              <a:rPr lang="en-GB"/>
+              <a:t>linear2senses</a:t>
+            </a:r>
+            <a:endParaRPr lang="en-US"/>
+          </a:p>
+        </p:txBody>
+      </p:sp>
+      <p:sp>
+        <p:nvSpPr>
+          <p:cNvPr id="111" name="Down Arrow 110">
+            <a:extLst>
+              <a:ext uri="{FF2B5EF4-FFF2-40B4-BE49-F238E27FC236}">
+                <a16:creationId xmlns:a16="http://schemas.microsoft.com/office/drawing/2014/main" id="{C4A77C34-6AAE-CF4F-9234-5F76595DAA01}"/>
+              </a:ext>
+            </a:extLst>
+          </p:cNvPr>
+          <p:cNvSpPr/>
+          <p:nvPr/>
+        </p:nvSpPr>
+        <p:spPr>
+          <a:xfrm>
+            <a:off x="8229130" y="7168748"/>
+            <a:ext cx="381964" cy="868992"/>
           </a:xfrm>
           <a:prstGeom prst="downArrow">
             <a:avLst/>
@@ -7819,26 +7867,204 @@
       </p:sp>
       <p:sp>
         <p:nvSpPr>
-          <p:cNvPr id="26" name="Rectangle 25">
-            <a:extLst>
-              <a:ext uri="{FF2B5EF4-FFF2-40B4-BE49-F238E27FC236}">
-                <a16:creationId xmlns:a16="http://schemas.microsoft.com/office/drawing/2014/main" id="{F289D602-95DA-9B40-AE72-9263EC9FE3D9}"/>
-              </a:ext>
-            </a:extLst>
-          </p:cNvPr>
-          <p:cNvSpPr/>
-          <p:nvPr/>
-        </p:nvSpPr>
-        <p:spPr>
-          <a:xfrm>
-            <a:off x="8324250" y="9460496"/>
-            <a:ext cx="1987475" cy="755561"/>
+          <p:cNvPr id="112" name="Down Arrow 111">
+            <a:extLst>
+              <a:ext uri="{FF2B5EF4-FFF2-40B4-BE49-F238E27FC236}">
+                <a16:creationId xmlns:a16="http://schemas.microsoft.com/office/drawing/2014/main" id="{FDC1CB01-C028-6C48-95D2-4C7288B55F66}"/>
+              </a:ext>
+            </a:extLst>
+          </p:cNvPr>
+          <p:cNvSpPr/>
+          <p:nvPr/>
+        </p:nvSpPr>
+        <p:spPr>
+          <a:xfrm>
+            <a:off x="8227381" y="8838659"/>
+            <a:ext cx="381964" cy="428262"/>
+          </a:xfrm>
+          <a:prstGeom prst="downArrow">
+            <a:avLst/>
+          </a:prstGeom>
+          <a:solidFill>
+            <a:schemeClr val="bg1"/>
+          </a:solidFill>
+        </p:spPr>
+        <p:style>
+          <a:lnRef idx="2">
+            <a:schemeClr val="accent1">
+              <a:shade val="50000"/>
+            </a:schemeClr>
+          </a:lnRef>
+          <a:fillRef idx="1">
+            <a:schemeClr val="accent1"/>
+          </a:fillRef>
+          <a:effectRef idx="0">
+            <a:schemeClr val="accent1"/>
+          </a:effectRef>
+          <a:fontRef idx="minor">
+            <a:schemeClr val="lt1"/>
+          </a:fontRef>
+        </p:style>
+        <p:txBody>
+          <a:bodyPr rtlCol="0" anchor="ctr"/>
+          <a:lstStyle/>
+          <a:p>
+            <a:pPr algn="ctr"/>
+            <a:endParaRPr lang="en-US"/>
+          </a:p>
+        </p:txBody>
+      </p:sp>
+      <p:sp>
+        <p:nvSpPr>
+          <p:cNvPr id="114" name="Left Bracket 113">
+            <a:extLst>
+              <a:ext uri="{FF2B5EF4-FFF2-40B4-BE49-F238E27FC236}">
+                <a16:creationId xmlns:a16="http://schemas.microsoft.com/office/drawing/2014/main" id="{D6FA0586-C9C1-0645-96D3-C580A6E207AE}"/>
+              </a:ext>
+            </a:extLst>
+          </p:cNvPr>
+          <p:cNvSpPr/>
+          <p:nvPr/>
+        </p:nvSpPr>
+        <p:spPr>
+          <a:xfrm>
+            <a:off x="2698418" y="5231968"/>
+            <a:ext cx="299326" cy="1111170"/>
+          </a:xfrm>
+          <a:prstGeom prst="leftBracket">
+            <a:avLst/>
+          </a:prstGeom>
+          <a:ln w="12700"/>
+        </p:spPr>
+        <p:style>
+          <a:lnRef idx="1">
+            <a:schemeClr val="accent1"/>
+          </a:lnRef>
+          <a:fillRef idx="0">
+            <a:schemeClr val="accent1"/>
+          </a:fillRef>
+          <a:effectRef idx="0">
+            <a:schemeClr val="accent1"/>
+          </a:effectRef>
+          <a:fontRef idx="minor">
+            <a:schemeClr val="tx1"/>
+          </a:fontRef>
+        </p:style>
+        <p:txBody>
+          <a:bodyPr rtlCol="0" anchor="ctr"/>
+          <a:lstStyle/>
+          <a:p>
+            <a:pPr algn="ctr"/>
+            <a:endParaRPr lang="en-US"/>
+          </a:p>
+        </p:txBody>
+      </p:sp>
+      <p:sp>
+        <p:nvSpPr>
+          <p:cNvPr id="2" name="TextBox 1">
+            <a:extLst>
+              <a:ext uri="{FF2B5EF4-FFF2-40B4-BE49-F238E27FC236}">
+                <a16:creationId xmlns:a16="http://schemas.microsoft.com/office/drawing/2014/main" id="{CD51F447-4C90-B042-B3E2-0278C3F50ABF}"/>
+              </a:ext>
+            </a:extLst>
+          </p:cNvPr>
+          <p:cNvSpPr txBox="1"/>
+          <p:nvPr/>
+        </p:nvSpPr>
+        <p:spPr>
+          <a:xfrm>
+            <a:off x="1723920" y="5498185"/>
+            <a:ext cx="1040022" cy="369332"/>
           </a:xfrm>
           <a:prstGeom prst="rect">
             <a:avLst/>
           </a:prstGeom>
+          <a:noFill/>
+        </p:spPr>
+        <p:txBody>
+          <a:bodyPr wrap="square" rtlCol="0">
+            <a:spAutoFit/>
+          </a:bodyPr>
+          <a:lstStyle/>
+          <a:p>
+            <a:r>
+              <a:rPr lang="en-US" b="1"/>
+              <a:t>GRU</a:t>
+            </a:r>
+          </a:p>
+        </p:txBody>
+      </p:sp>
+      <p:sp>
+        <p:nvSpPr>
+          <p:cNvPr id="115" name="Diamond 114">
+            <a:extLst>
+              <a:ext uri="{FF2B5EF4-FFF2-40B4-BE49-F238E27FC236}">
+                <a16:creationId xmlns:a16="http://schemas.microsoft.com/office/drawing/2014/main" id="{F069E149-BA77-2B4D-A2C9-3C304350BADE}"/>
+              </a:ext>
+            </a:extLst>
+          </p:cNvPr>
+          <p:cNvSpPr/>
+          <p:nvPr/>
+        </p:nvSpPr>
+        <p:spPr>
+          <a:xfrm>
+            <a:off x="4064291" y="6105268"/>
+            <a:ext cx="2423155" cy="756806"/>
+          </a:xfrm>
+          <a:prstGeom prst="diamond">
+            <a:avLst/>
+          </a:prstGeom>
+        </p:spPr>
+        <p:style>
+          <a:lnRef idx="2">
+            <a:schemeClr val="accent1">
+              <a:shade val="50000"/>
+            </a:schemeClr>
+          </a:lnRef>
+          <a:fillRef idx="1">
+            <a:schemeClr val="accent1"/>
+          </a:fillRef>
+          <a:effectRef idx="0">
+            <a:schemeClr val="accent1"/>
+          </a:effectRef>
+          <a:fontRef idx="minor">
+            <a:schemeClr val="lt1"/>
+          </a:fontRef>
+        </p:style>
+        <p:txBody>
+          <a:bodyPr rtlCol="0" anchor="ctr"/>
+          <a:lstStyle/>
+          <a:p>
+            <a:pPr algn="ctr"/>
+            <a:r>
+              <a:rPr lang="en-US"/>
+              <a:t>Layer 2 of GRU</a:t>
+            </a:r>
+          </a:p>
+        </p:txBody>
+      </p:sp>
+      <p:sp>
+        <p:nvSpPr>
+          <p:cNvPr id="116" name="Rectangle 115">
+            <a:extLst>
+              <a:ext uri="{FF2B5EF4-FFF2-40B4-BE49-F238E27FC236}">
+                <a16:creationId xmlns:a16="http://schemas.microsoft.com/office/drawing/2014/main" id="{DFA289A8-0F99-5146-8DC5-32B647A8B770}"/>
+              </a:ext>
+            </a:extLst>
+          </p:cNvPr>
+          <p:cNvSpPr/>
+          <p:nvPr/>
+        </p:nvSpPr>
+        <p:spPr>
+          <a:xfrm>
+            <a:off x="4242482" y="6881353"/>
+            <a:ext cx="1987475" cy="299327"/>
+          </a:xfrm>
+          <a:prstGeom prst="rect">
+            <a:avLst/>
+          </a:prstGeom>
           <a:solidFill>
-            <a:schemeClr val="accent4">
+            <a:schemeClr val="accent5">
               <a:lumMod val="40000"/>
               <a:lumOff val="60000"/>
             </a:schemeClr>
@@ -7871,34 +8097,31 @@
                   <a:schemeClr val="tx1"/>
                 </a:solidFill>
               </a:rPr>
-              <a:t>Predicted probabilities – next word sense</a:t>
-            </a:r>
-          </a:p>
-        </p:txBody>
-      </p:sp>
-      <p:sp>
-        <p:nvSpPr>
-          <p:cNvPr id="28" name="Down Arrow 27">
-            <a:extLst>
-              <a:ext uri="{FF2B5EF4-FFF2-40B4-BE49-F238E27FC236}">
-                <a16:creationId xmlns:a16="http://schemas.microsoft.com/office/drawing/2014/main" id="{60FC0E32-05FF-644D-A9BE-9952CF06BC45}"/>
-              </a:ext>
-            </a:extLst>
-          </p:cNvPr>
-          <p:cNvSpPr/>
-          <p:nvPr/>
-        </p:nvSpPr>
-        <p:spPr>
-          <a:xfrm>
-            <a:off x="9127004" y="3429000"/>
-            <a:ext cx="381964" cy="1264260"/>
-          </a:xfrm>
-          <a:prstGeom prst="downArrow">
-            <a:avLst/>
-          </a:prstGeom>
-          <a:solidFill>
-            <a:schemeClr val="bg1"/>
-          </a:solidFill>
+              <a:t>Hidden state 2</a:t>
+            </a:r>
+          </a:p>
+        </p:txBody>
+      </p:sp>
+      <p:sp>
+        <p:nvSpPr>
+          <p:cNvPr id="117" name="Diamond 116">
+            <a:extLst>
+              <a:ext uri="{FF2B5EF4-FFF2-40B4-BE49-F238E27FC236}">
+                <a16:creationId xmlns:a16="http://schemas.microsoft.com/office/drawing/2014/main" id="{FA4779EC-9A0D-CB41-868F-70F7E232C442}"/>
+              </a:ext>
+            </a:extLst>
+          </p:cNvPr>
+          <p:cNvSpPr/>
+          <p:nvPr/>
+        </p:nvSpPr>
+        <p:spPr>
+          <a:xfrm>
+            <a:off x="7208535" y="6090291"/>
+            <a:ext cx="2423155" cy="756806"/>
+          </a:xfrm>
+          <a:prstGeom prst="diamond">
+            <a:avLst/>
+          </a:prstGeom>
         </p:spPr>
         <p:style>
           <a:lnRef idx="2">
@@ -7917,545 +8140,80 @@
           </a:fontRef>
         </p:style>
         <p:txBody>
-          <a:bodyPr wrap="none" rtlCol="0" anchor="ctr"/>
-          <a:lstStyle/>
-          <a:p>
-            <a:pPr algn="ctr"/>
-            <a:r>
-              <a:rPr lang="en-US" b="1">
+          <a:bodyPr rtlCol="0" anchor="ctr"/>
+          <a:lstStyle/>
+          <a:p>
+            <a:pPr algn="ctr"/>
+            <a:r>
+              <a:rPr lang="en-US"/>
+              <a:t>Layer 2b of GRU</a:t>
+            </a:r>
+          </a:p>
+        </p:txBody>
+      </p:sp>
+      <p:sp>
+        <p:nvSpPr>
+          <p:cNvPr id="118" name="Rectangle 117">
+            <a:extLst>
+              <a:ext uri="{FF2B5EF4-FFF2-40B4-BE49-F238E27FC236}">
+                <a16:creationId xmlns:a16="http://schemas.microsoft.com/office/drawing/2014/main" id="{1D7FA5EB-8E41-BE4A-9971-CF1924145332}"/>
+              </a:ext>
+            </a:extLst>
+          </p:cNvPr>
+          <p:cNvSpPr/>
+          <p:nvPr/>
+        </p:nvSpPr>
+        <p:spPr>
+          <a:xfrm>
+            <a:off x="7427114" y="6854263"/>
+            <a:ext cx="1987475" cy="299327"/>
+          </a:xfrm>
+          <a:prstGeom prst="rect">
+            <a:avLst/>
+          </a:prstGeom>
+          <a:solidFill>
+            <a:schemeClr val="accent5">
+              <a:lumMod val="40000"/>
+              <a:lumOff val="60000"/>
+            </a:schemeClr>
+          </a:solidFill>
+        </p:spPr>
+        <p:style>
+          <a:lnRef idx="2">
+            <a:schemeClr val="accent5">
+              <a:shade val="50000"/>
+            </a:schemeClr>
+          </a:lnRef>
+          <a:fillRef idx="1">
+            <a:schemeClr val="accent5"/>
+          </a:fillRef>
+          <a:effectRef idx="0">
+            <a:schemeClr val="accent5"/>
+          </a:effectRef>
+          <a:fontRef idx="minor">
+            <a:schemeClr val="lt1"/>
+          </a:fontRef>
+        </p:style>
+        <p:txBody>
+          <a:bodyPr rtlCol="0" anchor="ctr"/>
+          <a:lstStyle/>
+          <a:p>
+            <a:pPr algn="ctr"/>
+            <a:r>
+              <a:rPr lang="en-US" sz="1600">
                 <a:solidFill>
                   <a:schemeClr val="tx1"/>
                 </a:solidFill>
               </a:rPr>
-              <a:t>I n p u t</a:t>
-            </a:r>
-          </a:p>
-        </p:txBody>
-      </p:sp>
-      <p:cxnSp>
-        <p:nvCxnSpPr>
-          <p:cNvPr id="29" name="Straight Arrow Connector 28">
-            <a:extLst>
-              <a:ext uri="{FF2B5EF4-FFF2-40B4-BE49-F238E27FC236}">
-                <a16:creationId xmlns:a16="http://schemas.microsoft.com/office/drawing/2014/main" id="{CB7E18E4-7196-0F45-BCF5-E91BA4004445}"/>
-              </a:ext>
-            </a:extLst>
-          </p:cNvPr>
-          <p:cNvCxnSpPr>
-            <a:cxnSpLocks/>
-            <a:stCxn id="7" idx="3"/>
-          </p:cNvCxnSpPr>
-          <p:nvPr/>
-        </p:nvCxnSpPr>
-        <p:spPr>
-          <a:xfrm flipV="1">
-            <a:off x="6559600" y="5284699"/>
-            <a:ext cx="1577403" cy="19338"/>
-          </a:xfrm>
-          <a:prstGeom prst="straightConnector1">
-            <a:avLst/>
-          </a:prstGeom>
-          <a:ln>
-            <a:tailEnd type="triangle"/>
-          </a:ln>
-        </p:spPr>
-        <p:style>
-          <a:lnRef idx="1">
-            <a:schemeClr val="dk1"/>
-          </a:lnRef>
-          <a:fillRef idx="0">
-            <a:schemeClr val="dk1"/>
-          </a:fillRef>
-          <a:effectRef idx="0">
-            <a:schemeClr val="dk1"/>
-          </a:effectRef>
-          <a:fontRef idx="minor">
-            <a:schemeClr val="tx1"/>
-          </a:fontRef>
-        </p:style>
-      </p:cxnSp>
-      <p:sp>
-        <p:nvSpPr>
-          <p:cNvPr id="32" name="TextBox 31">
-            <a:extLst>
-              <a:ext uri="{FF2B5EF4-FFF2-40B4-BE49-F238E27FC236}">
-                <a16:creationId xmlns:a16="http://schemas.microsoft.com/office/drawing/2014/main" id="{F5562014-DAFF-0F47-A405-000F54031463}"/>
-              </a:ext>
-            </a:extLst>
-          </p:cNvPr>
-          <p:cNvSpPr txBox="1"/>
-          <p:nvPr/>
-        </p:nvSpPr>
-        <p:spPr>
-          <a:xfrm>
-            <a:off x="8683037" y="4618911"/>
-            <a:ext cx="1602487" cy="369332"/>
-          </a:xfrm>
-          <a:prstGeom prst="rect">
-            <a:avLst/>
-          </a:prstGeom>
-          <a:noFill/>
-        </p:spPr>
-        <p:txBody>
-          <a:bodyPr wrap="square" rtlCol="0">
-            <a:spAutoFit/>
-          </a:bodyPr>
-          <a:lstStyle/>
-          <a:p>
-            <a:r>
-              <a:rPr lang="en-US"/>
-              <a:t>Concatenate:</a:t>
-            </a:r>
-          </a:p>
-        </p:txBody>
-      </p:sp>
-      <p:sp>
-        <p:nvSpPr>
-          <p:cNvPr id="33" name="Rectangle 32">
-            <a:extLst>
-              <a:ext uri="{FF2B5EF4-FFF2-40B4-BE49-F238E27FC236}">
-                <a16:creationId xmlns:a16="http://schemas.microsoft.com/office/drawing/2014/main" id="{CBBDC58C-FB79-9743-AC32-4E975544F29D}"/>
-              </a:ext>
-            </a:extLst>
-          </p:cNvPr>
-          <p:cNvSpPr/>
-          <p:nvPr/>
-        </p:nvSpPr>
-        <p:spPr>
-          <a:xfrm>
-            <a:off x="9030815" y="5049521"/>
-            <a:ext cx="906930" cy="554077"/>
-          </a:xfrm>
-          <a:prstGeom prst="rect">
-            <a:avLst/>
-          </a:prstGeom>
-          <a:solidFill>
-            <a:schemeClr val="accent2">
-              <a:lumMod val="60000"/>
-              <a:lumOff val="40000"/>
-            </a:schemeClr>
-          </a:solidFill>
-        </p:spPr>
-        <p:style>
-          <a:lnRef idx="2">
-            <a:schemeClr val="accent4">
-              <a:shade val="50000"/>
-            </a:schemeClr>
-          </a:lnRef>
-          <a:fillRef idx="1">
-            <a:schemeClr val="accent4"/>
-          </a:fillRef>
-          <a:effectRef idx="0">
-            <a:schemeClr val="accent4"/>
-          </a:effectRef>
-          <a:fontRef idx="minor">
-            <a:schemeClr val="lt1"/>
-          </a:fontRef>
-        </p:style>
-        <p:txBody>
-          <a:bodyPr rtlCol="0" anchor="ctr"/>
-          <a:lstStyle/>
-          <a:p>
-            <a:pPr algn="ctr"/>
-            <a:r>
-              <a:rPr lang="en-US" sz="1200" b="1">
-                <a:solidFill>
-                  <a:schemeClr val="tx1"/>
-                </a:solidFill>
-              </a:rPr>
-              <a:t>Word Embedding</a:t>
-            </a:r>
-          </a:p>
-        </p:txBody>
-      </p:sp>
-      <p:sp>
-        <p:nvSpPr>
-          <p:cNvPr id="34" name="Rectangle 33">
-            <a:extLst>
-              <a:ext uri="{FF2B5EF4-FFF2-40B4-BE49-F238E27FC236}">
-                <a16:creationId xmlns:a16="http://schemas.microsoft.com/office/drawing/2014/main" id="{CEE65BB6-CFD3-7948-933E-EBD1D87BDFF3}"/>
-              </a:ext>
-            </a:extLst>
-          </p:cNvPr>
-          <p:cNvSpPr/>
-          <p:nvPr/>
-        </p:nvSpPr>
-        <p:spPr>
-          <a:xfrm>
-            <a:off x="9937745" y="5038712"/>
-            <a:ext cx="973594" cy="564886"/>
-          </a:xfrm>
-          <a:prstGeom prst="rect">
-            <a:avLst/>
-          </a:prstGeom>
-        </p:spPr>
-        <p:style>
-          <a:lnRef idx="2">
-            <a:schemeClr val="accent4">
-              <a:shade val="50000"/>
-            </a:schemeClr>
-          </a:lnRef>
-          <a:fillRef idx="1">
-            <a:schemeClr val="accent4"/>
-          </a:fillRef>
-          <a:effectRef idx="0">
-            <a:schemeClr val="accent4"/>
-          </a:effectRef>
-          <a:fontRef idx="minor">
-            <a:schemeClr val="lt1"/>
-          </a:fontRef>
-        </p:style>
-        <p:txBody>
-          <a:bodyPr rtlCol="0" anchor="ctr"/>
-          <a:lstStyle/>
-          <a:p>
-            <a:pPr algn="ctr"/>
-            <a:r>
-              <a:rPr lang="en-US" sz="1200" b="1">
-                <a:solidFill>
-                  <a:schemeClr val="tx1"/>
-                </a:solidFill>
-              </a:rPr>
-              <a:t>Word Node State</a:t>
-            </a:r>
-          </a:p>
-        </p:txBody>
-      </p:sp>
-      <p:sp>
-        <p:nvSpPr>
-          <p:cNvPr id="35" name="Rectangle 34">
-            <a:extLst>
-              <a:ext uri="{FF2B5EF4-FFF2-40B4-BE49-F238E27FC236}">
-                <a16:creationId xmlns:a16="http://schemas.microsoft.com/office/drawing/2014/main" id="{75DA4D2A-83BD-AB40-B037-4DABB3945422}"/>
-              </a:ext>
-            </a:extLst>
-          </p:cNvPr>
-          <p:cNvSpPr/>
-          <p:nvPr/>
-        </p:nvSpPr>
-        <p:spPr>
-          <a:xfrm>
-            <a:off x="10911340" y="5037547"/>
-            <a:ext cx="732793" cy="564884"/>
-          </a:xfrm>
-          <a:prstGeom prst="rect">
-            <a:avLst/>
-          </a:prstGeom>
-        </p:spPr>
-        <p:style>
-          <a:lnRef idx="1">
-            <a:schemeClr val="accent6"/>
-          </a:lnRef>
-          <a:fillRef idx="2">
-            <a:schemeClr val="accent6"/>
-          </a:fillRef>
-          <a:effectRef idx="1">
-            <a:schemeClr val="accent6"/>
-          </a:effectRef>
-          <a:fontRef idx="minor">
-            <a:schemeClr val="dk1"/>
-          </a:fontRef>
-        </p:style>
-        <p:txBody>
-          <a:bodyPr rtlCol="0" anchor="ctr"/>
-          <a:lstStyle/>
-          <a:p>
-            <a:pPr algn="ctr"/>
-            <a:r>
-              <a:rPr lang="en-US" sz="1200" b="1"/>
-              <a:t>Sense </a:t>
-            </a:r>
-            <a:r>
-              <a:rPr lang="en-US" sz="1200" b="1">
-                <a:solidFill>
-                  <a:schemeClr val="tx1"/>
-                </a:solidFill>
-              </a:rPr>
-              <a:t>Node State</a:t>
-            </a:r>
-          </a:p>
-        </p:txBody>
-      </p:sp>
-      <p:sp>
-        <p:nvSpPr>
-          <p:cNvPr id="38" name="TextBox 37">
-            <a:extLst>
-              <a:ext uri="{FF2B5EF4-FFF2-40B4-BE49-F238E27FC236}">
-                <a16:creationId xmlns:a16="http://schemas.microsoft.com/office/drawing/2014/main" id="{61B43942-276C-6D46-8BD6-0F7B64E361B8}"/>
-              </a:ext>
-            </a:extLst>
-          </p:cNvPr>
-          <p:cNvSpPr txBox="1"/>
-          <p:nvPr/>
-        </p:nvSpPr>
-        <p:spPr>
-          <a:xfrm>
-            <a:off x="6877573" y="4826984"/>
-            <a:ext cx="1364765" cy="954107"/>
-          </a:xfrm>
-          <a:prstGeom prst="rect">
-            <a:avLst/>
-          </a:prstGeom>
-          <a:noFill/>
-        </p:spPr>
-        <p:txBody>
-          <a:bodyPr wrap="square" rtlCol="0">
-            <a:spAutoFit/>
-          </a:bodyPr>
-          <a:lstStyle/>
-          <a:p>
-            <a:r>
-              <a:rPr lang="en-US" sz="1400"/>
-              <a:t>Copy without gradient</a:t>
-            </a:r>
-            <a:br>
-              <a:rPr lang="en-US" sz="1400"/>
-            </a:br>
-            <a:r>
-              <a:rPr lang="en-US" sz="1400"/>
-              <a:t>(photo of the current context)</a:t>
-            </a:r>
-          </a:p>
-        </p:txBody>
-      </p:sp>
-      <p:sp>
-        <p:nvSpPr>
-          <p:cNvPr id="39" name="Rectangle 38">
-            <a:extLst>
-              <a:ext uri="{FF2B5EF4-FFF2-40B4-BE49-F238E27FC236}">
-                <a16:creationId xmlns:a16="http://schemas.microsoft.com/office/drawing/2014/main" id="{457E5AAA-6CCC-434B-95B5-DA10C85A4334}"/>
-              </a:ext>
-            </a:extLst>
-          </p:cNvPr>
-          <p:cNvSpPr/>
-          <p:nvPr/>
-        </p:nvSpPr>
-        <p:spPr>
-          <a:xfrm>
-            <a:off x="8134355" y="5050139"/>
-            <a:ext cx="896461" cy="552292"/>
-          </a:xfrm>
-          <a:prstGeom prst="rect">
-            <a:avLst/>
-          </a:prstGeom>
-          <a:solidFill>
-            <a:schemeClr val="accent5">
-              <a:lumMod val="40000"/>
-              <a:lumOff val="60000"/>
-            </a:schemeClr>
-          </a:solidFill>
-        </p:spPr>
-        <p:style>
-          <a:lnRef idx="2">
-            <a:schemeClr val="accent5">
-              <a:shade val="50000"/>
-            </a:schemeClr>
-          </a:lnRef>
-          <a:fillRef idx="1">
-            <a:schemeClr val="accent5"/>
-          </a:fillRef>
-          <a:effectRef idx="0">
-            <a:schemeClr val="accent5"/>
-          </a:effectRef>
-          <a:fontRef idx="minor">
-            <a:schemeClr val="lt1"/>
-          </a:fontRef>
-        </p:style>
-        <p:txBody>
-          <a:bodyPr rtlCol="0" anchor="ctr"/>
-          <a:lstStyle/>
-          <a:p>
-            <a:pPr algn="ctr"/>
-            <a:r>
-              <a:rPr lang="en-US" sz="1400">
-                <a:solidFill>
-                  <a:schemeClr val="tx1"/>
-                </a:solidFill>
-              </a:rPr>
-              <a:t>Encoding </a:t>
-            </a:r>
-            <a:br>
-              <a:rPr lang="en-US" sz="1400">
-                <a:solidFill>
-                  <a:schemeClr val="tx1"/>
-                </a:solidFill>
-              </a:rPr>
-            </a:br>
-            <a:r>
-              <a:rPr lang="en-US" sz="1400">
-                <a:solidFill>
-                  <a:schemeClr val="tx1"/>
-                </a:solidFill>
-              </a:rPr>
-              <a:t>(Hidden state 2)</a:t>
-            </a:r>
-            <a:endParaRPr lang="en-US" sz="1400" b="1">
-              <a:solidFill>
-                <a:schemeClr val="tx1"/>
-              </a:solidFill>
-            </a:endParaRPr>
-          </a:p>
-        </p:txBody>
-      </p:sp>
-      <p:sp>
-        <p:nvSpPr>
-          <p:cNvPr id="40" name="Diamond 39">
-            <a:extLst>
-              <a:ext uri="{FF2B5EF4-FFF2-40B4-BE49-F238E27FC236}">
-                <a16:creationId xmlns:a16="http://schemas.microsoft.com/office/drawing/2014/main" id="{811FA52D-6D28-F24F-8E62-DF24DACE56DD}"/>
-              </a:ext>
-            </a:extLst>
-          </p:cNvPr>
-          <p:cNvSpPr/>
-          <p:nvPr/>
-        </p:nvSpPr>
-        <p:spPr>
-          <a:xfrm>
-            <a:off x="8089148" y="6040185"/>
-            <a:ext cx="2423155" cy="835996"/>
-          </a:xfrm>
-          <a:prstGeom prst="diamond">
-            <a:avLst/>
-          </a:prstGeom>
-        </p:spPr>
-        <p:style>
-          <a:lnRef idx="2">
-            <a:schemeClr val="accent1">
-              <a:shade val="50000"/>
-            </a:schemeClr>
-          </a:lnRef>
-          <a:fillRef idx="1">
-            <a:schemeClr val="accent1"/>
-          </a:fillRef>
-          <a:effectRef idx="0">
-            <a:schemeClr val="accent1"/>
-          </a:effectRef>
-          <a:fontRef idx="minor">
-            <a:schemeClr val="lt1"/>
-          </a:fontRef>
-        </p:style>
-        <p:txBody>
-          <a:bodyPr wrap="none" lIns="36000" rIns="36000" rtlCol="0" anchor="ctr"/>
-          <a:lstStyle/>
-          <a:p>
-            <a:pPr algn="ctr"/>
-            <a:r>
-              <a:rPr lang="en-GB"/>
-              <a:t>FF-NN:</a:t>
-            </a:r>
-            <a:br>
-              <a:rPr lang="en-GB"/>
-            </a:br>
-            <a:r>
-              <a:rPr lang="en-GB"/>
-              <a:t>linear2senses</a:t>
-            </a:r>
-            <a:endParaRPr lang="en-US"/>
-          </a:p>
-        </p:txBody>
-      </p:sp>
-      <p:sp>
-        <p:nvSpPr>
-          <p:cNvPr id="41" name="Down Arrow 40">
-            <a:extLst>
-              <a:ext uri="{FF2B5EF4-FFF2-40B4-BE49-F238E27FC236}">
-                <a16:creationId xmlns:a16="http://schemas.microsoft.com/office/drawing/2014/main" id="{AB2C63ED-0E0E-1D4D-A763-A7BA067BFD03}"/>
-              </a:ext>
-            </a:extLst>
-          </p:cNvPr>
-          <p:cNvSpPr/>
-          <p:nvPr/>
-        </p:nvSpPr>
-        <p:spPr>
-          <a:xfrm>
-            <a:off x="9121318" y="5590408"/>
-            <a:ext cx="381964" cy="428262"/>
-          </a:xfrm>
-          <a:prstGeom prst="downArrow">
-            <a:avLst/>
-          </a:prstGeom>
-          <a:solidFill>
-            <a:schemeClr val="bg1"/>
-          </a:solidFill>
-        </p:spPr>
-        <p:style>
-          <a:lnRef idx="2">
-            <a:schemeClr val="accent1">
-              <a:shade val="50000"/>
-            </a:schemeClr>
-          </a:lnRef>
-          <a:fillRef idx="1">
-            <a:schemeClr val="accent1"/>
-          </a:fillRef>
-          <a:effectRef idx="0">
-            <a:schemeClr val="accent1"/>
-          </a:effectRef>
-          <a:fontRef idx="minor">
-            <a:schemeClr val="lt1"/>
-          </a:fontRef>
-        </p:style>
-        <p:txBody>
-          <a:bodyPr rtlCol="0" anchor="ctr"/>
-          <a:lstStyle/>
-          <a:p>
-            <a:pPr algn="ctr"/>
-            <a:endParaRPr lang="en-US"/>
-          </a:p>
-        </p:txBody>
-      </p:sp>
-      <p:sp>
-        <p:nvSpPr>
-          <p:cNvPr id="42" name="Down Arrow 41">
-            <a:extLst>
-              <a:ext uri="{FF2B5EF4-FFF2-40B4-BE49-F238E27FC236}">
-                <a16:creationId xmlns:a16="http://schemas.microsoft.com/office/drawing/2014/main" id="{66F620D5-822A-5248-8FB1-03CE9BBC3DC1}"/>
-              </a:ext>
-            </a:extLst>
-          </p:cNvPr>
-          <p:cNvSpPr/>
-          <p:nvPr/>
-        </p:nvSpPr>
-        <p:spPr>
-          <a:xfrm>
-            <a:off x="9121318" y="6876181"/>
-            <a:ext cx="381964" cy="428262"/>
-          </a:xfrm>
-          <a:prstGeom prst="downArrow">
-            <a:avLst/>
-          </a:prstGeom>
-          <a:solidFill>
-            <a:schemeClr val="bg1"/>
-          </a:solidFill>
-        </p:spPr>
-        <p:style>
-          <a:lnRef idx="2">
-            <a:schemeClr val="accent1">
-              <a:shade val="50000"/>
-            </a:schemeClr>
-          </a:lnRef>
-          <a:fillRef idx="1">
-            <a:schemeClr val="accent1"/>
-          </a:fillRef>
-          <a:effectRef idx="0">
-            <a:schemeClr val="accent1"/>
-          </a:effectRef>
-          <a:fontRef idx="minor">
-            <a:schemeClr val="lt1"/>
-          </a:fontRef>
-        </p:style>
-        <p:txBody>
-          <a:bodyPr rtlCol="0" anchor="ctr"/>
-          <a:lstStyle/>
-          <a:p>
-            <a:pPr algn="ctr"/>
-            <a:endParaRPr lang="en-US"/>
+              <a:t>Hidden state 2b</a:t>
+            </a:r>
           </a:p>
         </p:txBody>
       </p:sp>
     </p:spTree>
     <p:extLst>
       <p:ext uri="{BB962C8B-B14F-4D97-AF65-F5344CB8AC3E}">
-        <p14:creationId xmlns:p14="http://schemas.microsoft.com/office/powerpoint/2010/main" val="1331181461"/>
+        <p14:creationId xmlns:p14="http://schemas.microsoft.com/office/powerpoint/2010/main" val="657849569"/>
       </p:ext>
     </p:extLst>
   </p:cSld>
@@ -8484,6 +8242,1526 @@
       </p:grpSpPr>
       <p:sp>
         <p:nvSpPr>
+          <p:cNvPr id="4" name="Diamond 3">
+            <a:extLst>
+              <a:ext uri="{FF2B5EF4-FFF2-40B4-BE49-F238E27FC236}">
+                <a16:creationId xmlns:a16="http://schemas.microsoft.com/office/drawing/2014/main" id="{DBB06CCC-4012-7142-8209-4D3CA3521F99}"/>
+              </a:ext>
+            </a:extLst>
+          </p:cNvPr>
+          <p:cNvSpPr/>
+          <p:nvPr/>
+        </p:nvSpPr>
+        <p:spPr>
+          <a:xfrm>
+            <a:off x="4354286" y="3857263"/>
+            <a:ext cx="2423155" cy="835996"/>
+          </a:xfrm>
+          <a:prstGeom prst="diamond">
+            <a:avLst/>
+          </a:prstGeom>
+        </p:spPr>
+        <p:style>
+          <a:lnRef idx="2">
+            <a:schemeClr val="accent1">
+              <a:shade val="50000"/>
+            </a:schemeClr>
+          </a:lnRef>
+          <a:fillRef idx="1">
+            <a:schemeClr val="accent1"/>
+          </a:fillRef>
+          <a:effectRef idx="0">
+            <a:schemeClr val="accent1"/>
+          </a:effectRef>
+          <a:fontRef idx="minor">
+            <a:schemeClr val="lt1"/>
+          </a:fontRef>
+        </p:style>
+        <p:txBody>
+          <a:bodyPr rtlCol="0" anchor="ctr"/>
+          <a:lstStyle/>
+          <a:p>
+            <a:pPr algn="ctr"/>
+            <a:r>
+              <a:rPr lang="en-US"/>
+              <a:t>2-layers</a:t>
+            </a:r>
+            <a:br>
+              <a:rPr lang="en-US"/>
+            </a:br>
+            <a:r>
+              <a:rPr lang="en-US"/>
+              <a:t>GRU</a:t>
+            </a:r>
+          </a:p>
+        </p:txBody>
+      </p:sp>
+      <p:sp>
+        <p:nvSpPr>
+          <p:cNvPr id="5" name="Down Arrow 4">
+            <a:extLst>
+              <a:ext uri="{FF2B5EF4-FFF2-40B4-BE49-F238E27FC236}">
+                <a16:creationId xmlns:a16="http://schemas.microsoft.com/office/drawing/2014/main" id="{2E1E1C2B-5B16-004D-95B2-00203BDC4738}"/>
+              </a:ext>
+            </a:extLst>
+          </p:cNvPr>
+          <p:cNvSpPr/>
+          <p:nvPr/>
+        </p:nvSpPr>
+        <p:spPr>
+          <a:xfrm>
+            <a:off x="5386454" y="3429001"/>
+            <a:ext cx="381964" cy="428262"/>
+          </a:xfrm>
+          <a:prstGeom prst="downArrow">
+            <a:avLst/>
+          </a:prstGeom>
+          <a:solidFill>
+            <a:schemeClr val="bg1"/>
+          </a:solidFill>
+        </p:spPr>
+        <p:style>
+          <a:lnRef idx="2">
+            <a:schemeClr val="accent1">
+              <a:shade val="50000"/>
+            </a:schemeClr>
+          </a:lnRef>
+          <a:fillRef idx="1">
+            <a:schemeClr val="accent1"/>
+          </a:fillRef>
+          <a:effectRef idx="0">
+            <a:schemeClr val="accent1"/>
+          </a:effectRef>
+          <a:fontRef idx="minor">
+            <a:schemeClr val="lt1"/>
+          </a:fontRef>
+        </p:style>
+        <p:txBody>
+          <a:bodyPr wrap="none" rtlCol="0" anchor="ctr"/>
+          <a:lstStyle/>
+          <a:p>
+            <a:pPr algn="ctr"/>
+            <a:r>
+              <a:rPr lang="en-US" b="1">
+                <a:solidFill>
+                  <a:schemeClr val="tx1"/>
+                </a:solidFill>
+              </a:rPr>
+              <a:t>I n p u t</a:t>
+            </a:r>
+          </a:p>
+        </p:txBody>
+      </p:sp>
+      <p:sp>
+        <p:nvSpPr>
+          <p:cNvPr id="7" name="Rectangle 6">
+            <a:extLst>
+              <a:ext uri="{FF2B5EF4-FFF2-40B4-BE49-F238E27FC236}">
+                <a16:creationId xmlns:a16="http://schemas.microsoft.com/office/drawing/2014/main" id="{CEB94528-BBB3-B44D-860D-084ECFCFE803}"/>
+              </a:ext>
+            </a:extLst>
+          </p:cNvPr>
+          <p:cNvSpPr/>
+          <p:nvPr/>
+        </p:nvSpPr>
+        <p:spPr>
+          <a:xfrm>
+            <a:off x="4572125" y="5038712"/>
+            <a:ext cx="1987475" cy="530651"/>
+          </a:xfrm>
+          <a:prstGeom prst="rect">
+            <a:avLst/>
+          </a:prstGeom>
+          <a:solidFill>
+            <a:schemeClr val="accent5">
+              <a:lumMod val="40000"/>
+              <a:lumOff val="60000"/>
+            </a:schemeClr>
+          </a:solidFill>
+        </p:spPr>
+        <p:style>
+          <a:lnRef idx="2">
+            <a:schemeClr val="accent5">
+              <a:shade val="50000"/>
+            </a:schemeClr>
+          </a:lnRef>
+          <a:fillRef idx="1">
+            <a:schemeClr val="accent5"/>
+          </a:fillRef>
+          <a:effectRef idx="0">
+            <a:schemeClr val="accent5"/>
+          </a:effectRef>
+          <a:fontRef idx="minor">
+            <a:schemeClr val="lt1"/>
+          </a:fontRef>
+        </p:style>
+        <p:txBody>
+          <a:bodyPr rtlCol="0" anchor="ctr"/>
+          <a:lstStyle/>
+          <a:p>
+            <a:pPr algn="ctr"/>
+            <a:r>
+              <a:rPr lang="en-US" sz="1600">
+                <a:solidFill>
+                  <a:schemeClr val="tx1"/>
+                </a:solidFill>
+              </a:rPr>
+              <a:t>Encoding </a:t>
+            </a:r>
+            <a:br>
+              <a:rPr lang="en-US" sz="1600">
+                <a:solidFill>
+                  <a:schemeClr val="tx1"/>
+                </a:solidFill>
+              </a:rPr>
+            </a:br>
+            <a:r>
+              <a:rPr lang="en-US" sz="1600">
+                <a:solidFill>
+                  <a:schemeClr val="tx1"/>
+                </a:solidFill>
+              </a:rPr>
+              <a:t>(Hidden state 2)</a:t>
+            </a:r>
+            <a:endParaRPr lang="en-US" sz="1600" b="1">
+              <a:solidFill>
+                <a:schemeClr val="tx1"/>
+              </a:solidFill>
+            </a:endParaRPr>
+          </a:p>
+        </p:txBody>
+      </p:sp>
+      <p:sp>
+        <p:nvSpPr>
+          <p:cNvPr id="10" name="Diamond 9">
+            <a:extLst>
+              <a:ext uri="{FF2B5EF4-FFF2-40B4-BE49-F238E27FC236}">
+                <a16:creationId xmlns:a16="http://schemas.microsoft.com/office/drawing/2014/main" id="{E26FEDF0-E397-024D-A02E-1E1D21E34639}"/>
+              </a:ext>
+            </a:extLst>
+          </p:cNvPr>
+          <p:cNvSpPr/>
+          <p:nvPr/>
+        </p:nvSpPr>
+        <p:spPr>
+          <a:xfrm>
+            <a:off x="4354284" y="6014410"/>
+            <a:ext cx="2423155" cy="835996"/>
+          </a:xfrm>
+          <a:prstGeom prst="diamond">
+            <a:avLst/>
+          </a:prstGeom>
+        </p:spPr>
+        <p:style>
+          <a:lnRef idx="2">
+            <a:schemeClr val="accent1">
+              <a:shade val="50000"/>
+            </a:schemeClr>
+          </a:lnRef>
+          <a:fillRef idx="1">
+            <a:schemeClr val="accent1"/>
+          </a:fillRef>
+          <a:effectRef idx="0">
+            <a:schemeClr val="accent1"/>
+          </a:effectRef>
+          <a:fontRef idx="minor">
+            <a:schemeClr val="lt1"/>
+          </a:fontRef>
+        </p:style>
+        <p:txBody>
+          <a:bodyPr wrap="none" lIns="36000" rIns="36000" rtlCol="0" anchor="ctr"/>
+          <a:lstStyle/>
+          <a:p>
+            <a:pPr algn="ctr"/>
+            <a:r>
+              <a:rPr lang="en-GB"/>
+              <a:t>FF-NN:</a:t>
+            </a:r>
+            <a:br>
+              <a:rPr lang="en-GB"/>
+            </a:br>
+            <a:r>
+              <a:rPr lang="en-GB"/>
+              <a:t>linear2global</a:t>
+            </a:r>
+            <a:endParaRPr lang="en-US"/>
+          </a:p>
+        </p:txBody>
+      </p:sp>
+      <p:sp>
+        <p:nvSpPr>
+          <p:cNvPr id="12" name="Rectangle 11">
+            <a:extLst>
+              <a:ext uri="{FF2B5EF4-FFF2-40B4-BE49-F238E27FC236}">
+                <a16:creationId xmlns:a16="http://schemas.microsoft.com/office/drawing/2014/main" id="{BF9CF074-2BFA-2E4A-A782-5519DDEB6F3B}"/>
+              </a:ext>
+            </a:extLst>
+          </p:cNvPr>
+          <p:cNvSpPr/>
+          <p:nvPr/>
+        </p:nvSpPr>
+        <p:spPr>
+          <a:xfrm>
+            <a:off x="4596390" y="7311609"/>
+            <a:ext cx="1987475" cy="530651"/>
+          </a:xfrm>
+          <a:prstGeom prst="rect">
+            <a:avLst/>
+          </a:prstGeom>
+          <a:solidFill>
+            <a:schemeClr val="accent5">
+              <a:lumMod val="40000"/>
+              <a:lumOff val="60000"/>
+            </a:schemeClr>
+          </a:solidFill>
+        </p:spPr>
+        <p:style>
+          <a:lnRef idx="2">
+            <a:schemeClr val="accent5">
+              <a:shade val="50000"/>
+            </a:schemeClr>
+          </a:lnRef>
+          <a:fillRef idx="1">
+            <a:schemeClr val="accent5"/>
+          </a:fillRef>
+          <a:effectRef idx="0">
+            <a:schemeClr val="accent5"/>
+          </a:effectRef>
+          <a:fontRef idx="minor">
+            <a:schemeClr val="lt1"/>
+          </a:fontRef>
+        </p:style>
+        <p:txBody>
+          <a:bodyPr rtlCol="0" anchor="ctr"/>
+          <a:lstStyle/>
+          <a:p>
+            <a:pPr algn="ctr"/>
+            <a:r>
+              <a:rPr lang="en-US" sz="1600">
+                <a:solidFill>
+                  <a:schemeClr val="tx1"/>
+                </a:solidFill>
+              </a:rPr>
+              <a:t>Logits of global words</a:t>
+            </a:r>
+          </a:p>
+        </p:txBody>
+      </p:sp>
+      <p:sp>
+        <p:nvSpPr>
+          <p:cNvPr id="14" name="Oval 13">
+            <a:extLst>
+              <a:ext uri="{FF2B5EF4-FFF2-40B4-BE49-F238E27FC236}">
+                <a16:creationId xmlns:a16="http://schemas.microsoft.com/office/drawing/2014/main" id="{CC2973EE-8363-8F47-BA1C-C19ED98DECD3}"/>
+              </a:ext>
+            </a:extLst>
+          </p:cNvPr>
+          <p:cNvSpPr/>
+          <p:nvPr/>
+        </p:nvSpPr>
+        <p:spPr>
+          <a:xfrm>
+            <a:off x="5189683" y="8267181"/>
+            <a:ext cx="752354" cy="755561"/>
+          </a:xfrm>
+          <a:prstGeom prst="ellipse">
+            <a:avLst/>
+          </a:prstGeom>
+        </p:spPr>
+        <p:style>
+          <a:lnRef idx="1">
+            <a:schemeClr val="accent3"/>
+          </a:lnRef>
+          <a:fillRef idx="2">
+            <a:schemeClr val="accent3"/>
+          </a:fillRef>
+          <a:effectRef idx="1">
+            <a:schemeClr val="accent3"/>
+          </a:effectRef>
+          <a:fontRef idx="minor">
+            <a:schemeClr val="dk1"/>
+          </a:fontRef>
+        </p:style>
+        <p:txBody>
+          <a:bodyPr wrap="none" rtlCol="0" anchor="ctr"/>
+          <a:lstStyle/>
+          <a:p>
+            <a:pPr algn="ctr"/>
+            <a:r>
+              <a:rPr lang="en-US"/>
+              <a:t>Softmax</a:t>
+            </a:r>
+          </a:p>
+        </p:txBody>
+      </p:sp>
+      <p:cxnSp>
+        <p:nvCxnSpPr>
+          <p:cNvPr id="16" name="Straight Arrow Connector 15">
+            <a:extLst>
+              <a:ext uri="{FF2B5EF4-FFF2-40B4-BE49-F238E27FC236}">
+                <a16:creationId xmlns:a16="http://schemas.microsoft.com/office/drawing/2014/main" id="{085041C8-9843-9647-A903-D4B6FE815AA6}"/>
+              </a:ext>
+            </a:extLst>
+          </p:cNvPr>
+          <p:cNvCxnSpPr>
+            <a:stCxn id="4" idx="2"/>
+            <a:endCxn id="7" idx="0"/>
+          </p:cNvCxnSpPr>
+          <p:nvPr/>
+        </p:nvCxnSpPr>
+        <p:spPr>
+          <a:xfrm flipH="1">
+            <a:off x="5565863" y="4693259"/>
+            <a:ext cx="1" cy="345452"/>
+          </a:xfrm>
+          <a:prstGeom prst="straightConnector1">
+            <a:avLst/>
+          </a:prstGeom>
+          <a:ln>
+            <a:tailEnd type="triangle"/>
+          </a:ln>
+        </p:spPr>
+        <p:style>
+          <a:lnRef idx="1">
+            <a:schemeClr val="dk1"/>
+          </a:lnRef>
+          <a:fillRef idx="0">
+            <a:schemeClr val="dk1"/>
+          </a:fillRef>
+          <a:effectRef idx="0">
+            <a:schemeClr val="dk1"/>
+          </a:effectRef>
+          <a:fontRef idx="minor">
+            <a:schemeClr val="tx1"/>
+          </a:fontRef>
+        </p:style>
+      </p:cxnSp>
+      <p:sp>
+        <p:nvSpPr>
+          <p:cNvPr id="17" name="Down Arrow 16">
+            <a:extLst>
+              <a:ext uri="{FF2B5EF4-FFF2-40B4-BE49-F238E27FC236}">
+                <a16:creationId xmlns:a16="http://schemas.microsoft.com/office/drawing/2014/main" id="{DBF5080D-6078-4A4D-A114-6B041E937229}"/>
+              </a:ext>
+            </a:extLst>
+          </p:cNvPr>
+          <p:cNvSpPr/>
+          <p:nvPr/>
+        </p:nvSpPr>
+        <p:spPr>
+          <a:xfrm>
+            <a:off x="5386454" y="5564633"/>
+            <a:ext cx="381964" cy="428262"/>
+          </a:xfrm>
+          <a:prstGeom prst="downArrow">
+            <a:avLst/>
+          </a:prstGeom>
+          <a:solidFill>
+            <a:schemeClr val="bg1"/>
+          </a:solidFill>
+        </p:spPr>
+        <p:style>
+          <a:lnRef idx="2">
+            <a:schemeClr val="accent1">
+              <a:shade val="50000"/>
+            </a:schemeClr>
+          </a:lnRef>
+          <a:fillRef idx="1">
+            <a:schemeClr val="accent1"/>
+          </a:fillRef>
+          <a:effectRef idx="0">
+            <a:schemeClr val="accent1"/>
+          </a:effectRef>
+          <a:fontRef idx="minor">
+            <a:schemeClr val="lt1"/>
+          </a:fontRef>
+        </p:style>
+        <p:txBody>
+          <a:bodyPr rtlCol="0" anchor="ctr"/>
+          <a:lstStyle/>
+          <a:p>
+            <a:pPr algn="ctr"/>
+            <a:endParaRPr lang="en-US"/>
+          </a:p>
+        </p:txBody>
+      </p:sp>
+      <p:sp>
+        <p:nvSpPr>
+          <p:cNvPr id="18" name="Down Arrow 17">
+            <a:extLst>
+              <a:ext uri="{FF2B5EF4-FFF2-40B4-BE49-F238E27FC236}">
+                <a16:creationId xmlns:a16="http://schemas.microsoft.com/office/drawing/2014/main" id="{78948B97-2EB5-7C44-8661-F8FF659EEC11}"/>
+              </a:ext>
+            </a:extLst>
+          </p:cNvPr>
+          <p:cNvSpPr/>
+          <p:nvPr/>
+        </p:nvSpPr>
+        <p:spPr>
+          <a:xfrm>
+            <a:off x="5386454" y="6850406"/>
+            <a:ext cx="381964" cy="428262"/>
+          </a:xfrm>
+          <a:prstGeom prst="downArrow">
+            <a:avLst/>
+          </a:prstGeom>
+          <a:solidFill>
+            <a:schemeClr val="bg1"/>
+          </a:solidFill>
+        </p:spPr>
+        <p:style>
+          <a:lnRef idx="2">
+            <a:schemeClr val="accent1">
+              <a:shade val="50000"/>
+            </a:schemeClr>
+          </a:lnRef>
+          <a:fillRef idx="1">
+            <a:schemeClr val="accent1"/>
+          </a:fillRef>
+          <a:effectRef idx="0">
+            <a:schemeClr val="accent1"/>
+          </a:effectRef>
+          <a:fontRef idx="minor">
+            <a:schemeClr val="lt1"/>
+          </a:fontRef>
+        </p:style>
+        <p:txBody>
+          <a:bodyPr rtlCol="0" anchor="ctr"/>
+          <a:lstStyle/>
+          <a:p>
+            <a:pPr algn="ctr"/>
+            <a:endParaRPr lang="en-US"/>
+          </a:p>
+        </p:txBody>
+      </p:sp>
+      <p:sp>
+        <p:nvSpPr>
+          <p:cNvPr id="19" name="Down Arrow 18">
+            <a:extLst>
+              <a:ext uri="{FF2B5EF4-FFF2-40B4-BE49-F238E27FC236}">
+                <a16:creationId xmlns:a16="http://schemas.microsoft.com/office/drawing/2014/main" id="{8C470EB7-41A5-5C4D-8682-9F0FDF9C952B}"/>
+              </a:ext>
+            </a:extLst>
+          </p:cNvPr>
+          <p:cNvSpPr/>
+          <p:nvPr/>
+        </p:nvSpPr>
+        <p:spPr>
+          <a:xfrm>
+            <a:off x="5374878" y="7834882"/>
+            <a:ext cx="381964" cy="428262"/>
+          </a:xfrm>
+          <a:prstGeom prst="downArrow">
+            <a:avLst/>
+          </a:prstGeom>
+          <a:solidFill>
+            <a:schemeClr val="bg1"/>
+          </a:solidFill>
+        </p:spPr>
+        <p:style>
+          <a:lnRef idx="2">
+            <a:schemeClr val="accent1">
+              <a:shade val="50000"/>
+            </a:schemeClr>
+          </a:lnRef>
+          <a:fillRef idx="1">
+            <a:schemeClr val="accent1"/>
+          </a:fillRef>
+          <a:effectRef idx="0">
+            <a:schemeClr val="accent1"/>
+          </a:effectRef>
+          <a:fontRef idx="minor">
+            <a:schemeClr val="lt1"/>
+          </a:fontRef>
+        </p:style>
+        <p:txBody>
+          <a:bodyPr rtlCol="0" anchor="ctr"/>
+          <a:lstStyle/>
+          <a:p>
+            <a:pPr algn="ctr"/>
+            <a:endParaRPr lang="en-US"/>
+          </a:p>
+        </p:txBody>
+      </p:sp>
+      <p:sp>
+        <p:nvSpPr>
+          <p:cNvPr id="20" name="Down Arrow 19">
+            <a:extLst>
+              <a:ext uri="{FF2B5EF4-FFF2-40B4-BE49-F238E27FC236}">
+                <a16:creationId xmlns:a16="http://schemas.microsoft.com/office/drawing/2014/main" id="{3D411D0C-0351-B247-8E17-DF97F0AC5EA3}"/>
+              </a:ext>
+            </a:extLst>
+          </p:cNvPr>
+          <p:cNvSpPr/>
+          <p:nvPr/>
+        </p:nvSpPr>
+        <p:spPr>
+          <a:xfrm>
+            <a:off x="5374878" y="9032233"/>
+            <a:ext cx="381964" cy="428262"/>
+          </a:xfrm>
+          <a:prstGeom prst="downArrow">
+            <a:avLst/>
+          </a:prstGeom>
+          <a:solidFill>
+            <a:schemeClr val="bg1"/>
+          </a:solidFill>
+        </p:spPr>
+        <p:style>
+          <a:lnRef idx="2">
+            <a:schemeClr val="accent1">
+              <a:shade val="50000"/>
+            </a:schemeClr>
+          </a:lnRef>
+          <a:fillRef idx="1">
+            <a:schemeClr val="accent1"/>
+          </a:fillRef>
+          <a:effectRef idx="0">
+            <a:schemeClr val="accent1"/>
+          </a:effectRef>
+          <a:fontRef idx="minor">
+            <a:schemeClr val="lt1"/>
+          </a:fontRef>
+        </p:style>
+        <p:txBody>
+          <a:bodyPr rtlCol="0" anchor="ctr"/>
+          <a:lstStyle/>
+          <a:p>
+            <a:pPr algn="ctr"/>
+            <a:endParaRPr lang="en-US"/>
+          </a:p>
+        </p:txBody>
+      </p:sp>
+      <p:sp>
+        <p:nvSpPr>
+          <p:cNvPr id="21" name="Rectangle 20">
+            <a:extLst>
+              <a:ext uri="{FF2B5EF4-FFF2-40B4-BE49-F238E27FC236}">
+                <a16:creationId xmlns:a16="http://schemas.microsoft.com/office/drawing/2014/main" id="{5BACE416-FE57-2945-89A6-FCFC8709676C}"/>
+              </a:ext>
+            </a:extLst>
+          </p:cNvPr>
+          <p:cNvSpPr/>
+          <p:nvPr/>
+        </p:nvSpPr>
+        <p:spPr>
+          <a:xfrm>
+            <a:off x="4572123" y="9460496"/>
+            <a:ext cx="1987475" cy="755561"/>
+          </a:xfrm>
+          <a:prstGeom prst="rect">
+            <a:avLst/>
+          </a:prstGeom>
+          <a:solidFill>
+            <a:schemeClr val="accent4">
+              <a:lumMod val="40000"/>
+              <a:lumOff val="60000"/>
+            </a:schemeClr>
+          </a:solidFill>
+        </p:spPr>
+        <p:style>
+          <a:lnRef idx="2">
+            <a:schemeClr val="accent5">
+              <a:shade val="50000"/>
+            </a:schemeClr>
+          </a:lnRef>
+          <a:fillRef idx="1">
+            <a:schemeClr val="accent5"/>
+          </a:fillRef>
+          <a:effectRef idx="0">
+            <a:schemeClr val="accent5"/>
+          </a:effectRef>
+          <a:fontRef idx="minor">
+            <a:schemeClr val="lt1"/>
+          </a:fontRef>
+        </p:style>
+        <p:txBody>
+          <a:bodyPr rtlCol="0" anchor="ctr"/>
+          <a:lstStyle/>
+          <a:p>
+            <a:pPr algn="ctr"/>
+            <a:r>
+              <a:rPr lang="en-US" sz="1600">
+                <a:solidFill>
+                  <a:schemeClr val="tx1"/>
+                </a:solidFill>
+              </a:rPr>
+              <a:t>Predicted probabilities – next global word</a:t>
+            </a:r>
+          </a:p>
+        </p:txBody>
+      </p:sp>
+      <p:sp>
+        <p:nvSpPr>
+          <p:cNvPr id="22" name="Rectangle 21">
+            <a:extLst>
+              <a:ext uri="{FF2B5EF4-FFF2-40B4-BE49-F238E27FC236}">
+                <a16:creationId xmlns:a16="http://schemas.microsoft.com/office/drawing/2014/main" id="{3F7175FE-C5F5-9A4E-A7A6-7C7AE95F8F13}"/>
+              </a:ext>
+            </a:extLst>
+          </p:cNvPr>
+          <p:cNvSpPr/>
+          <p:nvPr/>
+        </p:nvSpPr>
+        <p:spPr>
+          <a:xfrm>
+            <a:off x="8348517" y="7311609"/>
+            <a:ext cx="1987475" cy="530651"/>
+          </a:xfrm>
+          <a:prstGeom prst="rect">
+            <a:avLst/>
+          </a:prstGeom>
+          <a:solidFill>
+            <a:schemeClr val="accent5">
+              <a:lumMod val="40000"/>
+              <a:lumOff val="60000"/>
+            </a:schemeClr>
+          </a:solidFill>
+        </p:spPr>
+        <p:style>
+          <a:lnRef idx="2">
+            <a:schemeClr val="accent5">
+              <a:shade val="50000"/>
+            </a:schemeClr>
+          </a:lnRef>
+          <a:fillRef idx="1">
+            <a:schemeClr val="accent5"/>
+          </a:fillRef>
+          <a:effectRef idx="0">
+            <a:schemeClr val="accent5"/>
+          </a:effectRef>
+          <a:fontRef idx="minor">
+            <a:schemeClr val="lt1"/>
+          </a:fontRef>
+        </p:style>
+        <p:txBody>
+          <a:bodyPr rtlCol="0" anchor="ctr"/>
+          <a:lstStyle/>
+          <a:p>
+            <a:pPr algn="ctr"/>
+            <a:r>
+              <a:rPr lang="en-US" sz="1600">
+                <a:solidFill>
+                  <a:schemeClr val="tx1"/>
+                </a:solidFill>
+              </a:rPr>
+              <a:t>Logits of senses</a:t>
+            </a:r>
+          </a:p>
+        </p:txBody>
+      </p:sp>
+      <p:sp>
+        <p:nvSpPr>
+          <p:cNvPr id="23" name="Oval 22">
+            <a:extLst>
+              <a:ext uri="{FF2B5EF4-FFF2-40B4-BE49-F238E27FC236}">
+                <a16:creationId xmlns:a16="http://schemas.microsoft.com/office/drawing/2014/main" id="{6EE07ECA-65A2-0641-AE45-4F768DCC5DBD}"/>
+              </a:ext>
+            </a:extLst>
+          </p:cNvPr>
+          <p:cNvSpPr/>
+          <p:nvPr/>
+        </p:nvSpPr>
+        <p:spPr>
+          <a:xfrm>
+            <a:off x="8941810" y="8267181"/>
+            <a:ext cx="752354" cy="755561"/>
+          </a:xfrm>
+          <a:prstGeom prst="ellipse">
+            <a:avLst/>
+          </a:prstGeom>
+        </p:spPr>
+        <p:style>
+          <a:lnRef idx="1">
+            <a:schemeClr val="accent3"/>
+          </a:lnRef>
+          <a:fillRef idx="2">
+            <a:schemeClr val="accent3"/>
+          </a:fillRef>
+          <a:effectRef idx="1">
+            <a:schemeClr val="accent3"/>
+          </a:effectRef>
+          <a:fontRef idx="minor">
+            <a:schemeClr val="dk1"/>
+          </a:fontRef>
+        </p:style>
+        <p:txBody>
+          <a:bodyPr wrap="none" rtlCol="0" anchor="ctr"/>
+          <a:lstStyle/>
+          <a:p>
+            <a:pPr algn="ctr"/>
+            <a:r>
+              <a:rPr lang="en-US"/>
+              <a:t>Softmax</a:t>
+            </a:r>
+          </a:p>
+        </p:txBody>
+      </p:sp>
+      <p:sp>
+        <p:nvSpPr>
+          <p:cNvPr id="24" name="Down Arrow 23">
+            <a:extLst>
+              <a:ext uri="{FF2B5EF4-FFF2-40B4-BE49-F238E27FC236}">
+                <a16:creationId xmlns:a16="http://schemas.microsoft.com/office/drawing/2014/main" id="{5B8A8200-1A61-9A43-8F04-80F717E9B000}"/>
+              </a:ext>
+            </a:extLst>
+          </p:cNvPr>
+          <p:cNvSpPr/>
+          <p:nvPr/>
+        </p:nvSpPr>
+        <p:spPr>
+          <a:xfrm>
+            <a:off x="9127005" y="7834882"/>
+            <a:ext cx="381964" cy="428262"/>
+          </a:xfrm>
+          <a:prstGeom prst="downArrow">
+            <a:avLst/>
+          </a:prstGeom>
+          <a:solidFill>
+            <a:schemeClr val="bg1"/>
+          </a:solidFill>
+        </p:spPr>
+        <p:style>
+          <a:lnRef idx="2">
+            <a:schemeClr val="accent1">
+              <a:shade val="50000"/>
+            </a:schemeClr>
+          </a:lnRef>
+          <a:fillRef idx="1">
+            <a:schemeClr val="accent1"/>
+          </a:fillRef>
+          <a:effectRef idx="0">
+            <a:schemeClr val="accent1"/>
+          </a:effectRef>
+          <a:fontRef idx="minor">
+            <a:schemeClr val="lt1"/>
+          </a:fontRef>
+        </p:style>
+        <p:txBody>
+          <a:bodyPr rtlCol="0" anchor="ctr"/>
+          <a:lstStyle/>
+          <a:p>
+            <a:pPr algn="ctr"/>
+            <a:endParaRPr lang="en-US"/>
+          </a:p>
+        </p:txBody>
+      </p:sp>
+      <p:sp>
+        <p:nvSpPr>
+          <p:cNvPr id="25" name="Down Arrow 24">
+            <a:extLst>
+              <a:ext uri="{FF2B5EF4-FFF2-40B4-BE49-F238E27FC236}">
+                <a16:creationId xmlns:a16="http://schemas.microsoft.com/office/drawing/2014/main" id="{454F61DD-CF26-0343-993B-E71B9524B95F}"/>
+              </a:ext>
+            </a:extLst>
+          </p:cNvPr>
+          <p:cNvSpPr/>
+          <p:nvPr/>
+        </p:nvSpPr>
+        <p:spPr>
+          <a:xfrm>
+            <a:off x="9127005" y="9032233"/>
+            <a:ext cx="381964" cy="428262"/>
+          </a:xfrm>
+          <a:prstGeom prst="downArrow">
+            <a:avLst/>
+          </a:prstGeom>
+          <a:solidFill>
+            <a:schemeClr val="bg1"/>
+          </a:solidFill>
+        </p:spPr>
+        <p:style>
+          <a:lnRef idx="2">
+            <a:schemeClr val="accent1">
+              <a:shade val="50000"/>
+            </a:schemeClr>
+          </a:lnRef>
+          <a:fillRef idx="1">
+            <a:schemeClr val="accent1"/>
+          </a:fillRef>
+          <a:effectRef idx="0">
+            <a:schemeClr val="accent1"/>
+          </a:effectRef>
+          <a:fontRef idx="minor">
+            <a:schemeClr val="lt1"/>
+          </a:fontRef>
+        </p:style>
+        <p:txBody>
+          <a:bodyPr rtlCol="0" anchor="ctr"/>
+          <a:lstStyle/>
+          <a:p>
+            <a:pPr algn="ctr"/>
+            <a:endParaRPr lang="en-US"/>
+          </a:p>
+        </p:txBody>
+      </p:sp>
+      <p:sp>
+        <p:nvSpPr>
+          <p:cNvPr id="26" name="Rectangle 25">
+            <a:extLst>
+              <a:ext uri="{FF2B5EF4-FFF2-40B4-BE49-F238E27FC236}">
+                <a16:creationId xmlns:a16="http://schemas.microsoft.com/office/drawing/2014/main" id="{F289D602-95DA-9B40-AE72-9263EC9FE3D9}"/>
+              </a:ext>
+            </a:extLst>
+          </p:cNvPr>
+          <p:cNvSpPr/>
+          <p:nvPr/>
+        </p:nvSpPr>
+        <p:spPr>
+          <a:xfrm>
+            <a:off x="8324250" y="9460496"/>
+            <a:ext cx="1987475" cy="755561"/>
+          </a:xfrm>
+          <a:prstGeom prst="rect">
+            <a:avLst/>
+          </a:prstGeom>
+          <a:solidFill>
+            <a:schemeClr val="accent4">
+              <a:lumMod val="40000"/>
+              <a:lumOff val="60000"/>
+            </a:schemeClr>
+          </a:solidFill>
+        </p:spPr>
+        <p:style>
+          <a:lnRef idx="2">
+            <a:schemeClr val="accent5">
+              <a:shade val="50000"/>
+            </a:schemeClr>
+          </a:lnRef>
+          <a:fillRef idx="1">
+            <a:schemeClr val="accent5"/>
+          </a:fillRef>
+          <a:effectRef idx="0">
+            <a:schemeClr val="accent5"/>
+          </a:effectRef>
+          <a:fontRef idx="minor">
+            <a:schemeClr val="lt1"/>
+          </a:fontRef>
+        </p:style>
+        <p:txBody>
+          <a:bodyPr rtlCol="0" anchor="ctr"/>
+          <a:lstStyle/>
+          <a:p>
+            <a:pPr algn="ctr"/>
+            <a:r>
+              <a:rPr lang="en-US" sz="1600">
+                <a:solidFill>
+                  <a:schemeClr val="tx1"/>
+                </a:solidFill>
+              </a:rPr>
+              <a:t>Predicted probabilities – next word sense</a:t>
+            </a:r>
+          </a:p>
+        </p:txBody>
+      </p:sp>
+      <p:sp>
+        <p:nvSpPr>
+          <p:cNvPr id="28" name="Down Arrow 27">
+            <a:extLst>
+              <a:ext uri="{FF2B5EF4-FFF2-40B4-BE49-F238E27FC236}">
+                <a16:creationId xmlns:a16="http://schemas.microsoft.com/office/drawing/2014/main" id="{60FC0E32-05FF-644D-A9BE-9952CF06BC45}"/>
+              </a:ext>
+            </a:extLst>
+          </p:cNvPr>
+          <p:cNvSpPr/>
+          <p:nvPr/>
+        </p:nvSpPr>
+        <p:spPr>
+          <a:xfrm>
+            <a:off x="9127004" y="3429000"/>
+            <a:ext cx="381964" cy="1264260"/>
+          </a:xfrm>
+          <a:prstGeom prst="downArrow">
+            <a:avLst/>
+          </a:prstGeom>
+          <a:solidFill>
+            <a:schemeClr val="bg1"/>
+          </a:solidFill>
+        </p:spPr>
+        <p:style>
+          <a:lnRef idx="2">
+            <a:schemeClr val="accent1">
+              <a:shade val="50000"/>
+            </a:schemeClr>
+          </a:lnRef>
+          <a:fillRef idx="1">
+            <a:schemeClr val="accent1"/>
+          </a:fillRef>
+          <a:effectRef idx="0">
+            <a:schemeClr val="accent1"/>
+          </a:effectRef>
+          <a:fontRef idx="minor">
+            <a:schemeClr val="lt1"/>
+          </a:fontRef>
+        </p:style>
+        <p:txBody>
+          <a:bodyPr wrap="none" rtlCol="0" anchor="ctr"/>
+          <a:lstStyle/>
+          <a:p>
+            <a:pPr algn="ctr"/>
+            <a:r>
+              <a:rPr lang="en-US" b="1">
+                <a:solidFill>
+                  <a:schemeClr val="tx1"/>
+                </a:solidFill>
+              </a:rPr>
+              <a:t>I n p u t</a:t>
+            </a:r>
+          </a:p>
+        </p:txBody>
+      </p:sp>
+      <p:cxnSp>
+        <p:nvCxnSpPr>
+          <p:cNvPr id="29" name="Straight Arrow Connector 28">
+            <a:extLst>
+              <a:ext uri="{FF2B5EF4-FFF2-40B4-BE49-F238E27FC236}">
+                <a16:creationId xmlns:a16="http://schemas.microsoft.com/office/drawing/2014/main" id="{CB7E18E4-7196-0F45-BCF5-E91BA4004445}"/>
+              </a:ext>
+            </a:extLst>
+          </p:cNvPr>
+          <p:cNvCxnSpPr>
+            <a:cxnSpLocks/>
+            <a:stCxn id="7" idx="3"/>
+          </p:cNvCxnSpPr>
+          <p:nvPr/>
+        </p:nvCxnSpPr>
+        <p:spPr>
+          <a:xfrm flipV="1">
+            <a:off x="6559600" y="5284699"/>
+            <a:ext cx="1577403" cy="19338"/>
+          </a:xfrm>
+          <a:prstGeom prst="straightConnector1">
+            <a:avLst/>
+          </a:prstGeom>
+          <a:ln>
+            <a:tailEnd type="triangle"/>
+          </a:ln>
+        </p:spPr>
+        <p:style>
+          <a:lnRef idx="1">
+            <a:schemeClr val="dk1"/>
+          </a:lnRef>
+          <a:fillRef idx="0">
+            <a:schemeClr val="dk1"/>
+          </a:fillRef>
+          <a:effectRef idx="0">
+            <a:schemeClr val="dk1"/>
+          </a:effectRef>
+          <a:fontRef idx="minor">
+            <a:schemeClr val="tx1"/>
+          </a:fontRef>
+        </p:style>
+      </p:cxnSp>
+      <p:sp>
+        <p:nvSpPr>
+          <p:cNvPr id="32" name="TextBox 31">
+            <a:extLst>
+              <a:ext uri="{FF2B5EF4-FFF2-40B4-BE49-F238E27FC236}">
+                <a16:creationId xmlns:a16="http://schemas.microsoft.com/office/drawing/2014/main" id="{F5562014-DAFF-0F47-A405-000F54031463}"/>
+              </a:ext>
+            </a:extLst>
+          </p:cNvPr>
+          <p:cNvSpPr txBox="1"/>
+          <p:nvPr/>
+        </p:nvSpPr>
+        <p:spPr>
+          <a:xfrm>
+            <a:off x="8683037" y="4618911"/>
+            <a:ext cx="1602487" cy="369332"/>
+          </a:xfrm>
+          <a:prstGeom prst="rect">
+            <a:avLst/>
+          </a:prstGeom>
+          <a:noFill/>
+        </p:spPr>
+        <p:txBody>
+          <a:bodyPr wrap="square" rtlCol="0">
+            <a:spAutoFit/>
+          </a:bodyPr>
+          <a:lstStyle/>
+          <a:p>
+            <a:r>
+              <a:rPr lang="en-US"/>
+              <a:t>Concatenate:</a:t>
+            </a:r>
+          </a:p>
+        </p:txBody>
+      </p:sp>
+      <p:sp>
+        <p:nvSpPr>
+          <p:cNvPr id="33" name="Rectangle 32">
+            <a:extLst>
+              <a:ext uri="{FF2B5EF4-FFF2-40B4-BE49-F238E27FC236}">
+                <a16:creationId xmlns:a16="http://schemas.microsoft.com/office/drawing/2014/main" id="{CBBDC58C-FB79-9743-AC32-4E975544F29D}"/>
+              </a:ext>
+            </a:extLst>
+          </p:cNvPr>
+          <p:cNvSpPr/>
+          <p:nvPr/>
+        </p:nvSpPr>
+        <p:spPr>
+          <a:xfrm>
+            <a:off x="9030815" y="5049521"/>
+            <a:ext cx="906930" cy="554077"/>
+          </a:xfrm>
+          <a:prstGeom prst="rect">
+            <a:avLst/>
+          </a:prstGeom>
+          <a:solidFill>
+            <a:schemeClr val="accent2">
+              <a:lumMod val="60000"/>
+              <a:lumOff val="40000"/>
+            </a:schemeClr>
+          </a:solidFill>
+        </p:spPr>
+        <p:style>
+          <a:lnRef idx="2">
+            <a:schemeClr val="accent4">
+              <a:shade val="50000"/>
+            </a:schemeClr>
+          </a:lnRef>
+          <a:fillRef idx="1">
+            <a:schemeClr val="accent4"/>
+          </a:fillRef>
+          <a:effectRef idx="0">
+            <a:schemeClr val="accent4"/>
+          </a:effectRef>
+          <a:fontRef idx="minor">
+            <a:schemeClr val="lt1"/>
+          </a:fontRef>
+        </p:style>
+        <p:txBody>
+          <a:bodyPr rtlCol="0" anchor="ctr"/>
+          <a:lstStyle/>
+          <a:p>
+            <a:pPr algn="ctr"/>
+            <a:r>
+              <a:rPr lang="en-US" sz="1200" b="1">
+                <a:solidFill>
+                  <a:schemeClr val="tx1"/>
+                </a:solidFill>
+              </a:rPr>
+              <a:t>Word Embedding</a:t>
+            </a:r>
+          </a:p>
+        </p:txBody>
+      </p:sp>
+      <p:sp>
+        <p:nvSpPr>
+          <p:cNvPr id="34" name="Rectangle 33">
+            <a:extLst>
+              <a:ext uri="{FF2B5EF4-FFF2-40B4-BE49-F238E27FC236}">
+                <a16:creationId xmlns:a16="http://schemas.microsoft.com/office/drawing/2014/main" id="{CEE65BB6-CFD3-7948-933E-EBD1D87BDFF3}"/>
+              </a:ext>
+            </a:extLst>
+          </p:cNvPr>
+          <p:cNvSpPr/>
+          <p:nvPr/>
+        </p:nvSpPr>
+        <p:spPr>
+          <a:xfrm>
+            <a:off x="9937745" y="5038712"/>
+            <a:ext cx="973594" cy="564886"/>
+          </a:xfrm>
+          <a:prstGeom prst="rect">
+            <a:avLst/>
+          </a:prstGeom>
+        </p:spPr>
+        <p:style>
+          <a:lnRef idx="2">
+            <a:schemeClr val="accent4">
+              <a:shade val="50000"/>
+            </a:schemeClr>
+          </a:lnRef>
+          <a:fillRef idx="1">
+            <a:schemeClr val="accent4"/>
+          </a:fillRef>
+          <a:effectRef idx="0">
+            <a:schemeClr val="accent4"/>
+          </a:effectRef>
+          <a:fontRef idx="minor">
+            <a:schemeClr val="lt1"/>
+          </a:fontRef>
+        </p:style>
+        <p:txBody>
+          <a:bodyPr rtlCol="0" anchor="ctr"/>
+          <a:lstStyle/>
+          <a:p>
+            <a:pPr algn="ctr"/>
+            <a:r>
+              <a:rPr lang="en-US" sz="1200" b="1">
+                <a:solidFill>
+                  <a:schemeClr val="tx1"/>
+                </a:solidFill>
+              </a:rPr>
+              <a:t>Word Node State</a:t>
+            </a:r>
+          </a:p>
+        </p:txBody>
+      </p:sp>
+      <p:sp>
+        <p:nvSpPr>
+          <p:cNvPr id="35" name="Rectangle 34">
+            <a:extLst>
+              <a:ext uri="{FF2B5EF4-FFF2-40B4-BE49-F238E27FC236}">
+                <a16:creationId xmlns:a16="http://schemas.microsoft.com/office/drawing/2014/main" id="{75DA4D2A-83BD-AB40-B037-4DABB3945422}"/>
+              </a:ext>
+            </a:extLst>
+          </p:cNvPr>
+          <p:cNvSpPr/>
+          <p:nvPr/>
+        </p:nvSpPr>
+        <p:spPr>
+          <a:xfrm>
+            <a:off x="10911340" y="5037547"/>
+            <a:ext cx="732793" cy="564884"/>
+          </a:xfrm>
+          <a:prstGeom prst="rect">
+            <a:avLst/>
+          </a:prstGeom>
+        </p:spPr>
+        <p:style>
+          <a:lnRef idx="1">
+            <a:schemeClr val="accent6"/>
+          </a:lnRef>
+          <a:fillRef idx="2">
+            <a:schemeClr val="accent6"/>
+          </a:fillRef>
+          <a:effectRef idx="1">
+            <a:schemeClr val="accent6"/>
+          </a:effectRef>
+          <a:fontRef idx="minor">
+            <a:schemeClr val="dk1"/>
+          </a:fontRef>
+        </p:style>
+        <p:txBody>
+          <a:bodyPr rtlCol="0" anchor="ctr"/>
+          <a:lstStyle/>
+          <a:p>
+            <a:pPr algn="ctr"/>
+            <a:r>
+              <a:rPr lang="en-US" sz="1200" b="1"/>
+              <a:t>Sense </a:t>
+            </a:r>
+            <a:r>
+              <a:rPr lang="en-US" sz="1200" b="1">
+                <a:solidFill>
+                  <a:schemeClr val="tx1"/>
+                </a:solidFill>
+              </a:rPr>
+              <a:t>Node State</a:t>
+            </a:r>
+          </a:p>
+        </p:txBody>
+      </p:sp>
+      <p:sp>
+        <p:nvSpPr>
+          <p:cNvPr id="38" name="TextBox 37">
+            <a:extLst>
+              <a:ext uri="{FF2B5EF4-FFF2-40B4-BE49-F238E27FC236}">
+                <a16:creationId xmlns:a16="http://schemas.microsoft.com/office/drawing/2014/main" id="{61B43942-276C-6D46-8BD6-0F7B64E361B8}"/>
+              </a:ext>
+            </a:extLst>
+          </p:cNvPr>
+          <p:cNvSpPr txBox="1"/>
+          <p:nvPr/>
+        </p:nvSpPr>
+        <p:spPr>
+          <a:xfrm>
+            <a:off x="6877573" y="4826984"/>
+            <a:ext cx="1364765" cy="954107"/>
+          </a:xfrm>
+          <a:prstGeom prst="rect">
+            <a:avLst/>
+          </a:prstGeom>
+          <a:noFill/>
+        </p:spPr>
+        <p:txBody>
+          <a:bodyPr wrap="square" rtlCol="0">
+            <a:spAutoFit/>
+          </a:bodyPr>
+          <a:lstStyle/>
+          <a:p>
+            <a:r>
+              <a:rPr lang="en-US" sz="1400"/>
+              <a:t>Copy without gradient</a:t>
+            </a:r>
+            <a:br>
+              <a:rPr lang="en-US" sz="1400"/>
+            </a:br>
+            <a:r>
+              <a:rPr lang="en-US" sz="1400"/>
+              <a:t>(photo of the current context)</a:t>
+            </a:r>
+          </a:p>
+        </p:txBody>
+      </p:sp>
+      <p:sp>
+        <p:nvSpPr>
+          <p:cNvPr id="39" name="Rectangle 38">
+            <a:extLst>
+              <a:ext uri="{FF2B5EF4-FFF2-40B4-BE49-F238E27FC236}">
+                <a16:creationId xmlns:a16="http://schemas.microsoft.com/office/drawing/2014/main" id="{457E5AAA-6CCC-434B-95B5-DA10C85A4334}"/>
+              </a:ext>
+            </a:extLst>
+          </p:cNvPr>
+          <p:cNvSpPr/>
+          <p:nvPr/>
+        </p:nvSpPr>
+        <p:spPr>
+          <a:xfrm>
+            <a:off x="8134355" y="5050139"/>
+            <a:ext cx="896461" cy="552292"/>
+          </a:xfrm>
+          <a:prstGeom prst="rect">
+            <a:avLst/>
+          </a:prstGeom>
+          <a:solidFill>
+            <a:schemeClr val="accent5">
+              <a:lumMod val="40000"/>
+              <a:lumOff val="60000"/>
+            </a:schemeClr>
+          </a:solidFill>
+        </p:spPr>
+        <p:style>
+          <a:lnRef idx="2">
+            <a:schemeClr val="accent5">
+              <a:shade val="50000"/>
+            </a:schemeClr>
+          </a:lnRef>
+          <a:fillRef idx="1">
+            <a:schemeClr val="accent5"/>
+          </a:fillRef>
+          <a:effectRef idx="0">
+            <a:schemeClr val="accent5"/>
+          </a:effectRef>
+          <a:fontRef idx="minor">
+            <a:schemeClr val="lt1"/>
+          </a:fontRef>
+        </p:style>
+        <p:txBody>
+          <a:bodyPr rtlCol="0" anchor="ctr"/>
+          <a:lstStyle/>
+          <a:p>
+            <a:pPr algn="ctr"/>
+            <a:r>
+              <a:rPr lang="en-US" sz="1400">
+                <a:solidFill>
+                  <a:schemeClr val="tx1"/>
+                </a:solidFill>
+              </a:rPr>
+              <a:t>Encoding </a:t>
+            </a:r>
+            <a:br>
+              <a:rPr lang="en-US" sz="1400">
+                <a:solidFill>
+                  <a:schemeClr val="tx1"/>
+                </a:solidFill>
+              </a:rPr>
+            </a:br>
+            <a:r>
+              <a:rPr lang="en-US" sz="1400">
+                <a:solidFill>
+                  <a:schemeClr val="tx1"/>
+                </a:solidFill>
+              </a:rPr>
+              <a:t>(Hidden state 2)</a:t>
+            </a:r>
+            <a:endParaRPr lang="en-US" sz="1400" b="1">
+              <a:solidFill>
+                <a:schemeClr val="tx1"/>
+              </a:solidFill>
+            </a:endParaRPr>
+          </a:p>
+        </p:txBody>
+      </p:sp>
+      <p:sp>
+        <p:nvSpPr>
+          <p:cNvPr id="40" name="Diamond 39">
+            <a:extLst>
+              <a:ext uri="{FF2B5EF4-FFF2-40B4-BE49-F238E27FC236}">
+                <a16:creationId xmlns:a16="http://schemas.microsoft.com/office/drawing/2014/main" id="{811FA52D-6D28-F24F-8E62-DF24DACE56DD}"/>
+              </a:ext>
+            </a:extLst>
+          </p:cNvPr>
+          <p:cNvSpPr/>
+          <p:nvPr/>
+        </p:nvSpPr>
+        <p:spPr>
+          <a:xfrm>
+            <a:off x="8089148" y="6040185"/>
+            <a:ext cx="2423155" cy="835996"/>
+          </a:xfrm>
+          <a:prstGeom prst="diamond">
+            <a:avLst/>
+          </a:prstGeom>
+        </p:spPr>
+        <p:style>
+          <a:lnRef idx="2">
+            <a:schemeClr val="accent1">
+              <a:shade val="50000"/>
+            </a:schemeClr>
+          </a:lnRef>
+          <a:fillRef idx="1">
+            <a:schemeClr val="accent1"/>
+          </a:fillRef>
+          <a:effectRef idx="0">
+            <a:schemeClr val="accent1"/>
+          </a:effectRef>
+          <a:fontRef idx="minor">
+            <a:schemeClr val="lt1"/>
+          </a:fontRef>
+        </p:style>
+        <p:txBody>
+          <a:bodyPr wrap="none" lIns="36000" rIns="36000" rtlCol="0" anchor="ctr"/>
+          <a:lstStyle/>
+          <a:p>
+            <a:pPr algn="ctr"/>
+            <a:r>
+              <a:rPr lang="en-GB"/>
+              <a:t>FF-NN:</a:t>
+            </a:r>
+            <a:br>
+              <a:rPr lang="en-GB"/>
+            </a:br>
+            <a:r>
+              <a:rPr lang="en-GB"/>
+              <a:t>linear2senses</a:t>
+            </a:r>
+            <a:endParaRPr lang="en-US"/>
+          </a:p>
+        </p:txBody>
+      </p:sp>
+      <p:sp>
+        <p:nvSpPr>
+          <p:cNvPr id="41" name="Down Arrow 40">
+            <a:extLst>
+              <a:ext uri="{FF2B5EF4-FFF2-40B4-BE49-F238E27FC236}">
+                <a16:creationId xmlns:a16="http://schemas.microsoft.com/office/drawing/2014/main" id="{AB2C63ED-0E0E-1D4D-A763-A7BA067BFD03}"/>
+              </a:ext>
+            </a:extLst>
+          </p:cNvPr>
+          <p:cNvSpPr/>
+          <p:nvPr/>
+        </p:nvSpPr>
+        <p:spPr>
+          <a:xfrm>
+            <a:off x="9121318" y="5590408"/>
+            <a:ext cx="381964" cy="428262"/>
+          </a:xfrm>
+          <a:prstGeom prst="downArrow">
+            <a:avLst/>
+          </a:prstGeom>
+          <a:solidFill>
+            <a:schemeClr val="bg1"/>
+          </a:solidFill>
+        </p:spPr>
+        <p:style>
+          <a:lnRef idx="2">
+            <a:schemeClr val="accent1">
+              <a:shade val="50000"/>
+            </a:schemeClr>
+          </a:lnRef>
+          <a:fillRef idx="1">
+            <a:schemeClr val="accent1"/>
+          </a:fillRef>
+          <a:effectRef idx="0">
+            <a:schemeClr val="accent1"/>
+          </a:effectRef>
+          <a:fontRef idx="minor">
+            <a:schemeClr val="lt1"/>
+          </a:fontRef>
+        </p:style>
+        <p:txBody>
+          <a:bodyPr rtlCol="0" anchor="ctr"/>
+          <a:lstStyle/>
+          <a:p>
+            <a:pPr algn="ctr"/>
+            <a:endParaRPr lang="en-US"/>
+          </a:p>
+        </p:txBody>
+      </p:sp>
+      <p:sp>
+        <p:nvSpPr>
+          <p:cNvPr id="42" name="Down Arrow 41">
+            <a:extLst>
+              <a:ext uri="{FF2B5EF4-FFF2-40B4-BE49-F238E27FC236}">
+                <a16:creationId xmlns:a16="http://schemas.microsoft.com/office/drawing/2014/main" id="{66F620D5-822A-5248-8FB1-03CE9BBC3DC1}"/>
+              </a:ext>
+            </a:extLst>
+          </p:cNvPr>
+          <p:cNvSpPr/>
+          <p:nvPr/>
+        </p:nvSpPr>
+        <p:spPr>
+          <a:xfrm>
+            <a:off x="9121318" y="6876181"/>
+            <a:ext cx="381964" cy="428262"/>
+          </a:xfrm>
+          <a:prstGeom prst="downArrow">
+            <a:avLst/>
+          </a:prstGeom>
+          <a:solidFill>
+            <a:schemeClr val="bg1"/>
+          </a:solidFill>
+        </p:spPr>
+        <p:style>
+          <a:lnRef idx="2">
+            <a:schemeClr val="accent1">
+              <a:shade val="50000"/>
+            </a:schemeClr>
+          </a:lnRef>
+          <a:fillRef idx="1">
+            <a:schemeClr val="accent1"/>
+          </a:fillRef>
+          <a:effectRef idx="0">
+            <a:schemeClr val="accent1"/>
+          </a:effectRef>
+          <a:fontRef idx="minor">
+            <a:schemeClr val="lt1"/>
+          </a:fontRef>
+        </p:style>
+        <p:txBody>
+          <a:bodyPr rtlCol="0" anchor="ctr"/>
+          <a:lstStyle/>
+          <a:p>
+            <a:pPr algn="ctr"/>
+            <a:endParaRPr lang="en-US"/>
+          </a:p>
+        </p:txBody>
+      </p:sp>
+    </p:spTree>
+    <p:extLst>
+      <p:ext uri="{BB962C8B-B14F-4D97-AF65-F5344CB8AC3E}">
+        <p14:creationId xmlns:p14="http://schemas.microsoft.com/office/powerpoint/2010/main" val="1331181461"/>
+      </p:ext>
+    </p:extLst>
+  </p:cSld>
+  <p:clrMapOvr>
+    <a:masterClrMapping/>
+  </p:clrMapOvr>
+</p:sld>
+</file>
+
+<file path=ppt/slides/slide4.xml><?xml version="1.0" encoding="utf-8"?>
+<p:sld xmlns:a="http://schemas.openxmlformats.org/drawingml/2006/main" xmlns:r="http://schemas.openxmlformats.org/officeDocument/2006/relationships" xmlns:p="http://schemas.openxmlformats.org/presentationml/2006/main">
+  <p:cSld>
+    <p:spTree>
+      <p:nvGrpSpPr>
+        <p:cNvPr id="1" name=""/>
+        <p:cNvGrpSpPr/>
+        <p:nvPr/>
+      </p:nvGrpSpPr>
+      <p:grpSpPr>
+        <a:xfrm>
+          <a:off x="0" y="0"/>
+          <a:ext cx="0" cy="0"/>
+          <a:chOff x="0" y="0"/>
+          <a:chExt cx="0" cy="0"/>
+        </a:xfrm>
+      </p:grpSpPr>
+      <p:sp>
+        <p:nvSpPr>
           <p:cNvPr id="4" name="Down Arrow 3">
             <a:extLst>
               <a:ext uri="{FF2B5EF4-FFF2-40B4-BE49-F238E27FC236}">
@@ -9122,7 +10400,7 @@
 </p:sld>
 </file>
 
-<file path=ppt/slides/slide4.xml><?xml version="1.0" encoding="utf-8"?>
+<file path=ppt/slides/slide5.xml><?xml version="1.0" encoding="utf-8"?>
 <p:sld xmlns:a="http://schemas.openxmlformats.org/drawingml/2006/main" xmlns:r="http://schemas.openxmlformats.org/officeDocument/2006/relationships" xmlns:p="http://schemas.openxmlformats.org/presentationml/2006/main">
   <p:cSld>
     <p:spTree>

</xml_diff>